<commit_message>
Correções no plano de projeto
</commit_message>
<xml_diff>
--- a/Projeto-AjudeMais/000-Gerência de Projeto/PPJ-Plano de Projeto.pptx
+++ b/Projeto-AjudeMais/000-Gerência de Projeto/PPJ-Plano de Projeto.pptx
@@ -6,6 +6,9 @@
     <p:sldMasterId id="2147483661" r:id="rId2"/>
     <p:sldMasterId id="2147483674" r:id="rId3"/>
   </p:sldMasterIdLst>
+  <p:notesMasterIdLst>
+    <p:notesMasterId r:id="rId19"/>
+  </p:notesMasterIdLst>
   <p:sldIdLst>
     <p:sldId id="256" r:id="rId4"/>
     <p:sldId id="257" r:id="rId5"/>
@@ -120,6 +123,11 @@
       </a:defRPr>
     </a:lvl9pPr>
   </p:defaultTextStyle>
+  <p:extLst>
+    <p:ext uri="{EFAFB233-063F-42B5-8137-9DF3F51BA10A}">
+      <p15:sldGuideLst xmlns:p15="http://schemas.microsoft.com/office/powerpoint/2012/main"/>
+    </p:ext>
+  </p:extLst>
 </p:presentation>
 </file>
 
@@ -133,6 +141,439 @@
     </p:extLst>
   </p:cmAuthor>
 </p:cmAuthorLst>
+</file>
+
+<file path=ppt/notesMasters/notesMaster1.xml><?xml version="1.0" encoding="utf-8"?>
+<p:notesMaster xmlns:a="http://schemas.openxmlformats.org/drawingml/2006/main" xmlns:r="http://schemas.openxmlformats.org/officeDocument/2006/relationships" xmlns:p="http://schemas.openxmlformats.org/presentationml/2006/main">
+  <p:cSld>
+    <p:bg>
+      <p:bgRef idx="1001">
+        <a:schemeClr val="bg1"/>
+      </p:bgRef>
+    </p:bg>
+    <p:spTree>
+      <p:nvGrpSpPr>
+        <p:cNvPr id="1" name=""/>
+        <p:cNvGrpSpPr/>
+        <p:nvPr/>
+      </p:nvGrpSpPr>
+      <p:grpSpPr>
+        <a:xfrm>
+          <a:off x="0" y="0"/>
+          <a:ext cx="0" cy="0"/>
+          <a:chOff x="0" y="0"/>
+          <a:chExt cx="0" cy="0"/>
+        </a:xfrm>
+      </p:grpSpPr>
+      <p:sp>
+        <p:nvSpPr>
+          <p:cNvPr id="2" name="Espaço Reservado para Cabeçalho 1"/>
+          <p:cNvSpPr>
+            <a:spLocks noGrp="1"/>
+          </p:cNvSpPr>
+          <p:nvPr>
+            <p:ph type="hdr" sz="quarter"/>
+          </p:nvPr>
+        </p:nvSpPr>
+        <p:spPr>
+          <a:xfrm>
+            <a:off x="0" y="0"/>
+            <a:ext cx="3368675" cy="504825"/>
+          </a:xfrm>
+          <a:prstGeom prst="rect">
+            <a:avLst/>
+          </a:prstGeom>
+        </p:spPr>
+        <p:txBody>
+          <a:bodyPr vert="horz" lIns="91440" tIns="45720" rIns="91440" bIns="45720" rtlCol="0"/>
+          <a:lstStyle>
+            <a:lvl1pPr algn="l">
+              <a:defRPr sz="1200"/>
+            </a:lvl1pPr>
+          </a:lstStyle>
+          <a:p>
+            <a:endParaRPr lang="pt-BR"/>
+          </a:p>
+        </p:txBody>
+      </p:sp>
+      <p:sp>
+        <p:nvSpPr>
+          <p:cNvPr id="3" name="Espaço Reservado para Data 2"/>
+          <p:cNvSpPr>
+            <a:spLocks noGrp="1"/>
+          </p:cNvSpPr>
+          <p:nvPr>
+            <p:ph type="dt" idx="1"/>
+          </p:nvPr>
+        </p:nvSpPr>
+        <p:spPr>
+          <a:xfrm>
+            <a:off x="4402138" y="0"/>
+            <a:ext cx="3368675" cy="504825"/>
+          </a:xfrm>
+          <a:prstGeom prst="rect">
+            <a:avLst/>
+          </a:prstGeom>
+        </p:spPr>
+        <p:txBody>
+          <a:bodyPr vert="horz" lIns="91440" tIns="45720" rIns="91440" bIns="45720" rtlCol="0"/>
+          <a:lstStyle>
+            <a:lvl1pPr algn="r">
+              <a:defRPr sz="1200"/>
+            </a:lvl1pPr>
+          </a:lstStyle>
+          <a:p>
+            <a:fld id="{6F19187C-107A-461F-948E-1D51F5B1349A}" type="datetimeFigureOut">
+              <a:rPr lang="pt-BR"/>
+              <a:t>25/03/2017</a:t>
+            </a:fld>
+            <a:endParaRPr lang="pt-BR"/>
+          </a:p>
+        </p:txBody>
+      </p:sp>
+      <p:sp>
+        <p:nvSpPr>
+          <p:cNvPr id="4" name="Espaço Reservado para Imagem de Slide 3"/>
+          <p:cNvSpPr>
+            <a:spLocks noGrp="1" noRot="1" noChangeAspect="1"/>
+          </p:cNvSpPr>
+          <p:nvPr>
+            <p:ph type="sldImg" idx="2"/>
+          </p:nvPr>
+        </p:nvSpPr>
+        <p:spPr>
+          <a:xfrm>
+            <a:off x="1624013" y="1257300"/>
+            <a:ext cx="4524375" cy="3394075"/>
+          </a:xfrm>
+          <a:prstGeom prst="rect">
+            <a:avLst/>
+          </a:prstGeom>
+          <a:noFill/>
+          <a:ln w="12700">
+            <a:solidFill>
+              <a:prstClr val="black"/>
+            </a:solidFill>
+          </a:ln>
+        </p:spPr>
+        <p:txBody>
+          <a:bodyPr vert="horz" lIns="91440" tIns="45720" rIns="91440" bIns="45720" rtlCol="0" anchor="ctr"/>
+          <a:lstStyle/>
+          <a:p>
+            <a:endParaRPr lang="pt-BR"/>
+          </a:p>
+        </p:txBody>
+      </p:sp>
+      <p:sp>
+        <p:nvSpPr>
+          <p:cNvPr id="5" name="Espaço Reservado para Anotações 4"/>
+          <p:cNvSpPr>
+            <a:spLocks noGrp="1"/>
+          </p:cNvSpPr>
+          <p:nvPr>
+            <p:ph type="body" sz="quarter" idx="3"/>
+          </p:nvPr>
+        </p:nvSpPr>
+        <p:spPr>
+          <a:xfrm>
+            <a:off x="777875" y="4840288"/>
+            <a:ext cx="6216650" cy="3960812"/>
+          </a:xfrm>
+          <a:prstGeom prst="rect">
+            <a:avLst/>
+          </a:prstGeom>
+        </p:spPr>
+        <p:txBody>
+          <a:bodyPr vert="horz" lIns="91440" tIns="45720" rIns="91440" bIns="45720" rtlCol="0"/>
+          <a:lstStyle/>
+          <a:p>
+            <a:pPr lvl="0"/>
+            <a:r>
+              <a:rPr lang="pt-BR"/>
+              <a:t>Editar estilos de texto Mestre</a:t>
+            </a:r>
+          </a:p>
+          <a:p>
+            <a:pPr lvl="1"/>
+            <a:r>
+              <a:rPr lang="pt-BR"/>
+              <a:t>Segundo nível</a:t>
+            </a:r>
+          </a:p>
+          <a:p>
+            <a:pPr lvl="2"/>
+            <a:r>
+              <a:rPr lang="pt-BR"/>
+              <a:t>Terceiro nível</a:t>
+            </a:r>
+          </a:p>
+          <a:p>
+            <a:pPr lvl="3"/>
+            <a:r>
+              <a:rPr lang="pt-BR"/>
+              <a:t>Quarto nível</a:t>
+            </a:r>
+          </a:p>
+          <a:p>
+            <a:pPr lvl="4"/>
+            <a:r>
+              <a:rPr lang="pt-BR"/>
+              <a:t>Quinto nível</a:t>
+            </a:r>
+          </a:p>
+        </p:txBody>
+      </p:sp>
+      <p:sp>
+        <p:nvSpPr>
+          <p:cNvPr id="6" name="Espaço Reservado para Rodapé 5"/>
+          <p:cNvSpPr>
+            <a:spLocks noGrp="1"/>
+          </p:cNvSpPr>
+          <p:nvPr>
+            <p:ph type="ftr" sz="quarter" idx="4"/>
+          </p:nvPr>
+        </p:nvSpPr>
+        <p:spPr>
+          <a:xfrm>
+            <a:off x="0" y="9553575"/>
+            <a:ext cx="3368675" cy="504825"/>
+          </a:xfrm>
+          <a:prstGeom prst="rect">
+            <a:avLst/>
+          </a:prstGeom>
+        </p:spPr>
+        <p:txBody>
+          <a:bodyPr vert="horz" lIns="91440" tIns="45720" rIns="91440" bIns="45720" rtlCol="0" anchor="b"/>
+          <a:lstStyle>
+            <a:lvl1pPr algn="l">
+              <a:defRPr sz="1200"/>
+            </a:lvl1pPr>
+          </a:lstStyle>
+          <a:p>
+            <a:endParaRPr lang="pt-BR"/>
+          </a:p>
+        </p:txBody>
+      </p:sp>
+      <p:sp>
+        <p:nvSpPr>
+          <p:cNvPr id="7" name="Espaço Reservado para Número de Slide 6"/>
+          <p:cNvSpPr>
+            <a:spLocks noGrp="1"/>
+          </p:cNvSpPr>
+          <p:nvPr>
+            <p:ph type="sldNum" sz="quarter" idx="5"/>
+          </p:nvPr>
+        </p:nvSpPr>
+        <p:spPr>
+          <a:xfrm>
+            <a:off x="4402138" y="9553575"/>
+            <a:ext cx="3368675" cy="504825"/>
+          </a:xfrm>
+          <a:prstGeom prst="rect">
+            <a:avLst/>
+          </a:prstGeom>
+        </p:spPr>
+        <p:txBody>
+          <a:bodyPr vert="horz" lIns="91440" tIns="45720" rIns="91440" bIns="45720" rtlCol="0" anchor="b"/>
+          <a:lstStyle>
+            <a:lvl1pPr algn="r">
+              <a:defRPr sz="1200"/>
+            </a:lvl1pPr>
+          </a:lstStyle>
+          <a:p>
+            <a:fld id="{2DD07020-CA46-47EE-9199-35777A0F5CCA}" type="slidenum">
+              <a:rPr lang="pt-BR"/>
+              <a:t>‹nº›</a:t>
+            </a:fld>
+            <a:endParaRPr lang="pt-BR"/>
+          </a:p>
+        </p:txBody>
+      </p:sp>
+    </p:spTree>
+    <p:extLst>
+      <p:ext uri="{BB962C8B-B14F-4D97-AF65-F5344CB8AC3E}">
+        <p14:creationId xmlns:p14="http://schemas.microsoft.com/office/powerpoint/2010/main" val="3913912163"/>
+      </p:ext>
+    </p:extLst>
+  </p:cSld>
+  <p:clrMap bg1="lt1" tx1="dk1" bg2="lt2" tx2="dk2" accent1="accent1" accent2="accent2" accent3="accent3" accent4="accent4" accent5="accent5" accent6="accent6" hlink="hlink" folHlink="folHlink"/>
+  <p:notesStyle>
+    <a:lvl1pPr marL="0" algn="l" defTabSz="914400" rtl="0" eaLnBrk="1" latinLnBrk="0" hangingPunct="1">
+      <a:defRPr sz="1200" kern="1200">
+        <a:solidFill>
+          <a:schemeClr val="tx1"/>
+        </a:solidFill>
+        <a:latin typeface="+mn-lt"/>
+        <a:ea typeface="+mn-ea"/>
+        <a:cs typeface="+mn-cs"/>
+      </a:defRPr>
+    </a:lvl1pPr>
+    <a:lvl2pPr marL="457200" algn="l" defTabSz="914400" rtl="0" eaLnBrk="1" latinLnBrk="0" hangingPunct="1">
+      <a:defRPr sz="1200" kern="1200">
+        <a:solidFill>
+          <a:schemeClr val="tx1"/>
+        </a:solidFill>
+        <a:latin typeface="+mn-lt"/>
+        <a:ea typeface="+mn-ea"/>
+        <a:cs typeface="+mn-cs"/>
+      </a:defRPr>
+    </a:lvl2pPr>
+    <a:lvl3pPr marL="914400" algn="l" defTabSz="914400" rtl="0" eaLnBrk="1" latinLnBrk="0" hangingPunct="1">
+      <a:defRPr sz="1200" kern="1200">
+        <a:solidFill>
+          <a:schemeClr val="tx1"/>
+        </a:solidFill>
+        <a:latin typeface="+mn-lt"/>
+        <a:ea typeface="+mn-ea"/>
+        <a:cs typeface="+mn-cs"/>
+      </a:defRPr>
+    </a:lvl3pPr>
+    <a:lvl4pPr marL="1371600" algn="l" defTabSz="914400" rtl="0" eaLnBrk="1" latinLnBrk="0" hangingPunct="1">
+      <a:defRPr sz="1200" kern="1200">
+        <a:solidFill>
+          <a:schemeClr val="tx1"/>
+        </a:solidFill>
+        <a:latin typeface="+mn-lt"/>
+        <a:ea typeface="+mn-ea"/>
+        <a:cs typeface="+mn-cs"/>
+      </a:defRPr>
+    </a:lvl4pPr>
+    <a:lvl5pPr marL="1828800" algn="l" defTabSz="914400" rtl="0" eaLnBrk="1" latinLnBrk="0" hangingPunct="1">
+      <a:defRPr sz="1200" kern="1200">
+        <a:solidFill>
+          <a:schemeClr val="tx1"/>
+        </a:solidFill>
+        <a:latin typeface="+mn-lt"/>
+        <a:ea typeface="+mn-ea"/>
+        <a:cs typeface="+mn-cs"/>
+      </a:defRPr>
+    </a:lvl5pPr>
+    <a:lvl6pPr marL="2286000" algn="l" defTabSz="914400" rtl="0" eaLnBrk="1" latinLnBrk="0" hangingPunct="1">
+      <a:defRPr sz="1200" kern="1200">
+        <a:solidFill>
+          <a:schemeClr val="tx1"/>
+        </a:solidFill>
+        <a:latin typeface="+mn-lt"/>
+        <a:ea typeface="+mn-ea"/>
+        <a:cs typeface="+mn-cs"/>
+      </a:defRPr>
+    </a:lvl6pPr>
+    <a:lvl7pPr marL="2743200" algn="l" defTabSz="914400" rtl="0" eaLnBrk="1" latinLnBrk="0" hangingPunct="1">
+      <a:defRPr sz="1200" kern="1200">
+        <a:solidFill>
+          <a:schemeClr val="tx1"/>
+        </a:solidFill>
+        <a:latin typeface="+mn-lt"/>
+        <a:ea typeface="+mn-ea"/>
+        <a:cs typeface="+mn-cs"/>
+      </a:defRPr>
+    </a:lvl7pPr>
+    <a:lvl8pPr marL="3200400" algn="l" defTabSz="914400" rtl="0" eaLnBrk="1" latinLnBrk="0" hangingPunct="1">
+      <a:defRPr sz="1200" kern="1200">
+        <a:solidFill>
+          <a:schemeClr val="tx1"/>
+        </a:solidFill>
+        <a:latin typeface="+mn-lt"/>
+        <a:ea typeface="+mn-ea"/>
+        <a:cs typeface="+mn-cs"/>
+      </a:defRPr>
+    </a:lvl8pPr>
+    <a:lvl9pPr marL="3657600" algn="l" defTabSz="914400" rtl="0" eaLnBrk="1" latinLnBrk="0" hangingPunct="1">
+      <a:defRPr sz="1200" kern="1200">
+        <a:solidFill>
+          <a:schemeClr val="tx1"/>
+        </a:solidFill>
+        <a:latin typeface="+mn-lt"/>
+        <a:ea typeface="+mn-ea"/>
+        <a:cs typeface="+mn-cs"/>
+      </a:defRPr>
+    </a:lvl9pPr>
+  </p:notesStyle>
+</p:notesMaster>
+</file>
+
+<file path=ppt/notesSlides/notesSlide1.xml><?xml version="1.0" encoding="utf-8"?>
+<p:notes xmlns:a="http://schemas.openxmlformats.org/drawingml/2006/main" xmlns:r="http://schemas.openxmlformats.org/officeDocument/2006/relationships" xmlns:p="http://schemas.openxmlformats.org/presentationml/2006/main">
+  <p:cSld>
+    <p:spTree>
+      <p:nvGrpSpPr>
+        <p:cNvPr id="1" name=""/>
+        <p:cNvGrpSpPr/>
+        <p:nvPr/>
+      </p:nvGrpSpPr>
+      <p:grpSpPr>
+        <a:xfrm>
+          <a:off x="0" y="0"/>
+          <a:ext cx="0" cy="0"/>
+          <a:chOff x="0" y="0"/>
+          <a:chExt cx="0" cy="0"/>
+        </a:xfrm>
+      </p:grpSpPr>
+      <p:sp>
+        <p:nvSpPr>
+          <p:cNvPr id="2" name="Espaço Reservado para Imagem de Slide 1"/>
+          <p:cNvSpPr>
+            <a:spLocks noGrp="1" noRot="1" noChangeAspect="1"/>
+          </p:cNvSpPr>
+          <p:nvPr>
+            <p:ph type="sldImg"/>
+          </p:nvPr>
+        </p:nvSpPr>
+        <p:spPr/>
+      </p:sp>
+      <p:sp>
+        <p:nvSpPr>
+          <p:cNvPr id="3" name="Espaço Reservado para Anotações 2"/>
+          <p:cNvSpPr>
+            <a:spLocks noGrp="1"/>
+          </p:cNvSpPr>
+          <p:nvPr>
+            <p:ph type="body" idx="1"/>
+          </p:nvPr>
+        </p:nvSpPr>
+        <p:spPr/>
+        <p:txBody>
+          <a:bodyPr/>
+          <a:lstStyle/>
+          <a:p>
+            <a:endParaRPr lang="pt-BR"/>
+          </a:p>
+        </p:txBody>
+      </p:sp>
+      <p:sp>
+        <p:nvSpPr>
+          <p:cNvPr id="4" name="Espaço Reservado para Número de Slide 3"/>
+          <p:cNvSpPr>
+            <a:spLocks noGrp="1"/>
+          </p:cNvSpPr>
+          <p:nvPr>
+            <p:ph type="sldNum" sz="quarter" idx="10"/>
+          </p:nvPr>
+        </p:nvSpPr>
+        <p:spPr/>
+        <p:txBody>
+          <a:bodyPr/>
+          <a:lstStyle/>
+          <a:p>
+            <a:fld id="{2DD07020-CA46-47EE-9199-35777A0F5CCA}" type="slidenum">
+              <a:rPr lang="pt-BR"/>
+              <a:t>‹nº›</a:t>
+            </a:fld>
+            <a:endParaRPr lang="pt-BR"/>
+          </a:p>
+        </p:txBody>
+      </p:sp>
+    </p:spTree>
+    <p:extLst>
+      <p:ext uri="{BB962C8B-B14F-4D97-AF65-F5344CB8AC3E}">
+        <p14:creationId xmlns:p14="http://schemas.microsoft.com/office/powerpoint/2010/main" val="580474121"/>
+      </p:ext>
+    </p:extLst>
+  </p:cSld>
+  <p:clrMapOvr>
+    <a:masterClrMapping/>
+  </p:clrMapOvr>
+</p:notes>
 </file>
 
 <file path=ppt/slideLayouts/slideLayout1.xml><?xml version="1.0" encoding="utf-8"?>
@@ -6713,8 +7154,20 @@
             <a:tbl>
               <a:tblPr/>
               <a:tblGrid>
-                <a:gridCol w="4114800"/>
-                <a:gridCol w="4114800"/>
+                <a:gridCol w="4114800">
+                  <a:extLst>
+                    <a:ext uri="{9D8B030D-6E8A-4147-A177-3AD203B41FA5}">
+                      <a16:colId xmlns:a16="http://schemas.microsoft.com/office/drawing/2014/main" val="20000"/>
+                    </a:ext>
+                  </a:extLst>
+                </a:gridCol>
+                <a:gridCol w="4114800">
+                  <a:extLst>
+                    <a:ext uri="{9D8B030D-6E8A-4147-A177-3AD203B41FA5}">
+                      <a16:colId xmlns:a16="http://schemas.microsoft.com/office/drawing/2014/main" val="20001"/>
+                    </a:ext>
+                  </a:extLst>
+                </a:gridCol>
               </a:tblGrid>
               <a:tr h="711720">
                 <a:tc>
@@ -6843,6 +7296,11 @@
                     </a:solidFill>
                   </a:tcPr>
                 </a:tc>
+                <a:extLst>
+                  <a:ext uri="{0D108BD9-81ED-4DB2-BD59-A6C34878D82A}">
+                    <a16:rowId xmlns:a16="http://schemas.microsoft.com/office/drawing/2014/main" val="10000"/>
+                  </a:ext>
+                </a:extLst>
               </a:tr>
               <a:tr h="711720">
                 <a:tc>
@@ -7075,6 +7533,11 @@
                     </a:solidFill>
                   </a:tcPr>
                 </a:tc>
+                <a:extLst>
+                  <a:ext uri="{0D108BD9-81ED-4DB2-BD59-A6C34878D82A}">
+                    <a16:rowId xmlns:a16="http://schemas.microsoft.com/office/drawing/2014/main" val="10001"/>
+                  </a:ext>
+                </a:extLst>
               </a:tr>
               <a:tr h="711720">
                 <a:tc>
@@ -7203,6 +7666,11 @@
                     </a:solidFill>
                   </a:tcPr>
                 </a:tc>
+                <a:extLst>
+                  <a:ext uri="{0D108BD9-81ED-4DB2-BD59-A6C34878D82A}">
+                    <a16:rowId xmlns:a16="http://schemas.microsoft.com/office/drawing/2014/main" val="10002"/>
+                  </a:ext>
+                </a:extLst>
               </a:tr>
               <a:tr h="781920">
                 <a:tc>
@@ -7331,6 +7799,11 @@
                     </a:solidFill>
                   </a:tcPr>
                 </a:tc>
+                <a:extLst>
+                  <a:ext uri="{0D108BD9-81ED-4DB2-BD59-A6C34878D82A}">
+                    <a16:rowId xmlns:a16="http://schemas.microsoft.com/office/drawing/2014/main" val="10003"/>
+                  </a:ext>
+                </a:extLst>
               </a:tr>
               <a:tr h="711720">
                 <a:tc>
@@ -7454,6 +7927,11 @@
                     </a:solidFill>
                   </a:tcPr>
                 </a:tc>
+                <a:extLst>
+                  <a:ext uri="{0D108BD9-81ED-4DB2-BD59-A6C34878D82A}">
+                    <a16:rowId xmlns:a16="http://schemas.microsoft.com/office/drawing/2014/main" val="10004"/>
+                  </a:ext>
+                </a:extLst>
               </a:tr>
             </a:tbl>
           </a:graphicData>
@@ -7601,10 +8079,34 @@
             <a:tbl>
               <a:tblPr/>
               <a:tblGrid>
-                <a:gridCol w="1512000"/>
-                <a:gridCol w="4248360"/>
-                <a:gridCol w="945000"/>
-                <a:gridCol w="1215000"/>
+                <a:gridCol w="1512000">
+                  <a:extLst>
+                    <a:ext uri="{9D8B030D-6E8A-4147-A177-3AD203B41FA5}">
+                      <a16:colId xmlns:a16="http://schemas.microsoft.com/office/drawing/2014/main" val="20000"/>
+                    </a:ext>
+                  </a:extLst>
+                </a:gridCol>
+                <a:gridCol w="4248360">
+                  <a:extLst>
+                    <a:ext uri="{9D8B030D-6E8A-4147-A177-3AD203B41FA5}">
+                      <a16:colId xmlns:a16="http://schemas.microsoft.com/office/drawing/2014/main" val="20001"/>
+                    </a:ext>
+                  </a:extLst>
+                </a:gridCol>
+                <a:gridCol w="945000">
+                  <a:extLst>
+                    <a:ext uri="{9D8B030D-6E8A-4147-A177-3AD203B41FA5}">
+                      <a16:colId xmlns:a16="http://schemas.microsoft.com/office/drawing/2014/main" val="20002"/>
+                    </a:ext>
+                  </a:extLst>
+                </a:gridCol>
+                <a:gridCol w="1215000">
+                  <a:extLst>
+                    <a:ext uri="{9D8B030D-6E8A-4147-A177-3AD203B41FA5}">
+                      <a16:colId xmlns:a16="http://schemas.microsoft.com/office/drawing/2014/main" val="20003"/>
+                    </a:ext>
+                  </a:extLst>
+                </a:gridCol>
               </a:tblGrid>
               <a:tr h="622440">
                 <a:tc>
@@ -7859,6 +8361,11 @@
                     </a:solidFill>
                   </a:tcPr>
                 </a:tc>
+                <a:extLst>
+                  <a:ext uri="{0D108BD9-81ED-4DB2-BD59-A6C34878D82A}">
+                    <a16:rowId xmlns:a16="http://schemas.microsoft.com/office/drawing/2014/main" val="10000"/>
+                  </a:ext>
+                </a:extLst>
               </a:tr>
               <a:tr h="561240">
                 <a:tc>
@@ -7943,7 +8450,7 @@
                         </a:lnSpc>
                       </a:pPr>
                       <a:r>
-                        <a:rPr lang="pt-BR" sz="1600" b="0" strike="noStrike" spc="-1" dirty="0" smtClean="0">
+                        <a:rPr lang="pt-BR" sz="1600" b="0" strike="noStrike" spc="-1" dirty="0">
                           <a:solidFill>
                             <a:srgbClr val="000000"/>
                           </a:solidFill>
@@ -8014,7 +8521,7 @@
                         </a:lnSpc>
                       </a:pPr>
                       <a:r>
-                        <a:rPr lang="pt-BR" sz="1600" b="0" strike="noStrike" spc="-1" dirty="0" smtClean="0">
+                        <a:rPr lang="pt-BR" sz="1600" b="0" strike="noStrike" spc="-1" dirty="0">
                           <a:solidFill>
                             <a:srgbClr val="000000"/>
                           </a:solidFill>
@@ -8085,7 +8592,7 @@
                         </a:lnSpc>
                       </a:pPr>
                       <a:r>
-                        <a:rPr lang="pt-BR" sz="1600" b="0" strike="noStrike" spc="-1" dirty="0" smtClean="0">
+                        <a:rPr lang="pt-BR" sz="1600" b="0" strike="noStrike" spc="-1" dirty="0">
                           <a:solidFill>
                             <a:srgbClr val="000000"/>
                           </a:solidFill>
@@ -8145,6 +8652,11 @@
                     </a:solidFill>
                   </a:tcPr>
                 </a:tc>
+                <a:extLst>
+                  <a:ext uri="{0D108BD9-81ED-4DB2-BD59-A6C34878D82A}">
+                    <a16:rowId xmlns:a16="http://schemas.microsoft.com/office/drawing/2014/main" val="10001"/>
+                  </a:ext>
+                </a:extLst>
               </a:tr>
               <a:tr h="561240">
                 <a:tc>
@@ -8399,6 +8911,11 @@
                     </a:solidFill>
                   </a:tcPr>
                 </a:tc>
+                <a:extLst>
+                  <a:ext uri="{0D108BD9-81ED-4DB2-BD59-A6C34878D82A}">
+                    <a16:rowId xmlns:a16="http://schemas.microsoft.com/office/drawing/2014/main" val="10002"/>
+                  </a:ext>
+                </a:extLst>
               </a:tr>
               <a:tr h="561240">
                 <a:tc>
@@ -8637,6 +9154,11 @@
                     </a:solidFill>
                   </a:tcPr>
                 </a:tc>
+                <a:extLst>
+                  <a:ext uri="{0D108BD9-81ED-4DB2-BD59-A6C34878D82A}">
+                    <a16:rowId xmlns:a16="http://schemas.microsoft.com/office/drawing/2014/main" val="10003"/>
+                  </a:ext>
+                </a:extLst>
               </a:tr>
             </a:tbl>
           </a:graphicData>
@@ -8808,7 +9330,7 @@
               <a:buFont typeface="Arial"/>
               <a:buChar char="•"/>
             </a:pPr>
-            <a:endParaRPr lang="pt-BR" sz="1800" b="0" strike="noStrike" spc="-1" dirty="0" smtClean="0">
+            <a:endParaRPr lang="pt-BR" sz="1800" b="0" strike="noStrike" spc="-1" dirty="0">
               <a:solidFill>
                 <a:srgbClr val="000000"/>
               </a:solidFill>
@@ -8832,7 +9354,7 @@
               <a:buChar char="•"/>
             </a:pPr>
             <a:r>
-              <a:rPr lang="pt-BR" sz="1800" b="0" strike="noStrike" spc="-1" dirty="0" smtClean="0">
+              <a:rPr lang="pt-BR" sz="1800" b="0" strike="noStrike" spc="-1" dirty="0">
                 <a:solidFill>
                   <a:srgbClr val="000000"/>
                 </a:solidFill>
@@ -8858,7 +9380,7 @@
               <a:buChar char="•"/>
             </a:pPr>
             <a:r>
-              <a:rPr lang="pt-BR" spc="-1" dirty="0" smtClean="0">
+              <a:rPr lang="pt-BR" spc="-1" dirty="0">
                 <a:solidFill>
                   <a:srgbClr val="000000"/>
                 </a:solidFill>
@@ -8871,7 +9393,7 @@
               </a:rPr>
               <a:t>....</a:t>
             </a:r>
-            <a:endParaRPr lang="pt-BR" sz="1800" b="0" strike="noStrike" spc="-1" dirty="0" smtClean="0">
+            <a:endParaRPr lang="pt-BR" sz="1800" b="0" strike="noStrike" spc="-1" dirty="0">
               <a:solidFill>
                 <a:srgbClr val="000000"/>
               </a:solidFill>
@@ -8895,7 +9417,7 @@
               <a:buChar char="•"/>
             </a:pPr>
             <a:r>
-              <a:rPr lang="pt-BR" sz="1800" b="0" strike="noStrike" spc="-1" dirty="0" smtClean="0">
+              <a:rPr lang="pt-BR" sz="1800" b="0" strike="noStrike" spc="-1" dirty="0">
                 <a:solidFill>
                   <a:srgbClr val="000000"/>
                 </a:solidFill>
@@ -8908,17 +9430,6 @@
               </a:rPr>
               <a:t>O mensageiro deve haver sido cadastrado previamente pela instituição para ter acesso ao aplicativo. </a:t>
             </a:r>
-            <a:endParaRPr lang="pt-BR" sz="1800" b="0" strike="noStrike" spc="-1" dirty="0">
-              <a:solidFill>
-                <a:srgbClr val="000000"/>
-              </a:solidFill>
-              <a:uFill>
-                <a:solidFill>
-                  <a:srgbClr val="FFFFFF"/>
-                </a:solidFill>
-              </a:uFill>
-              <a:latin typeface="Arial"/>
-            </a:endParaRPr>
           </a:p>
         </p:txBody>
       </p:sp>
@@ -9075,7 +9586,7 @@
           <a:fontRef idx="minor"/>
         </p:style>
         <p:txBody>
-          <a:bodyPr lIns="90000" tIns="45000" rIns="90000" bIns="45000"/>
+          <a:bodyPr lIns="90000" tIns="45000" rIns="90000" bIns="45000" anchor="t"/>
           <a:lstStyle/>
           <a:p>
             <a:pPr marL="343080" indent="-340920" algn="just">
@@ -9140,49 +9651,8 @@
                 <a:latin typeface="Calibri"/>
                 <a:ea typeface="DejaVu Sans"/>
               </a:rPr>
-              <a:t>Google </a:t>
+              <a:t>Google Chrome;</a:t>
             </a:r>
-            <a:r>
-              <a:rPr lang="pt-BR" sz="3200" b="0" strike="noStrike" spc="-1" dirty="0" err="1">
-                <a:solidFill>
-                  <a:srgbClr val="000000"/>
-                </a:solidFill>
-                <a:uFill>
-                  <a:solidFill>
-                    <a:srgbClr val="FFFFFF"/>
-                  </a:solidFill>
-                </a:uFill>
-                <a:latin typeface="Calibri"/>
-                <a:ea typeface="DejaVu Sans"/>
-              </a:rPr>
-              <a:t>Chrome</a:t>
-            </a:r>
-            <a:r>
-              <a:rPr lang="pt-BR" sz="3200" b="0" strike="noStrike" spc="-1" dirty="0">
-                <a:solidFill>
-                  <a:srgbClr val="000000"/>
-                </a:solidFill>
-                <a:uFill>
-                  <a:solidFill>
-                    <a:srgbClr val="FFFFFF"/>
-                  </a:solidFill>
-                </a:uFill>
-                <a:latin typeface="Calibri"/>
-                <a:ea typeface="DejaVu Sans"/>
-              </a:rPr>
-              <a:t>;</a:t>
-            </a:r>
-            <a:endParaRPr lang="pt-BR" sz="1800" b="0" strike="noStrike" spc="-1" dirty="0">
-              <a:solidFill>
-                <a:srgbClr val="000000"/>
-              </a:solidFill>
-              <a:uFill>
-                <a:solidFill>
-                  <a:srgbClr val="FFFFFF"/>
-                </a:solidFill>
-              </a:uFill>
-              <a:latin typeface="Arial"/>
-            </a:endParaRPr>
           </a:p>
           <a:p>
             <a:pPr marL="864000" lvl="1" indent="-322200">
@@ -9207,21 +9677,9 @@
                   </a:solidFill>
                 </a:uFill>
                 <a:latin typeface="Calibri"/>
-                <a:ea typeface="DejaVu Sans"/>
               </a:rPr>
-              <a:t>Mozilla Firefox;</a:t>
+              <a:t>Opera;</a:t>
             </a:r>
-            <a:endParaRPr lang="pt-BR" sz="1800" b="0" strike="noStrike" spc="-1" dirty="0">
-              <a:solidFill>
-                <a:srgbClr val="000000"/>
-              </a:solidFill>
-              <a:uFill>
-                <a:solidFill>
-                  <a:srgbClr val="FFFFFF"/>
-                </a:solidFill>
-              </a:uFill>
-              <a:latin typeface="Arial"/>
-            </a:endParaRPr>
           </a:p>
           <a:p>
             <a:pPr marL="864000" lvl="1" indent="-322200">
@@ -9248,120 +9706,7 @@
                 <a:latin typeface="Calibri"/>
                 <a:ea typeface="DejaVu Sans"/>
               </a:rPr>
-              <a:t>Edge.</a:t>
-            </a:r>
-            <a:endParaRPr lang="pt-BR" sz="1800" b="0" strike="noStrike" spc="-1" dirty="0">
-              <a:solidFill>
-                <a:srgbClr val="000000"/>
-              </a:solidFill>
-              <a:uFill>
-                <a:solidFill>
-                  <a:srgbClr val="FFFFFF"/>
-                </a:solidFill>
-              </a:uFill>
-              <a:latin typeface="Arial"/>
-            </a:endParaRPr>
-          </a:p>
-          <a:p>
-            <a:pPr marL="343080" indent="-340920">
-              <a:lnSpc>
-                <a:spcPct val="100000"/>
-              </a:lnSpc>
-              <a:buClr>
-                <a:srgbClr val="000000"/>
-              </a:buClr>
-              <a:buFont typeface="Arial"/>
-              <a:buChar char="•"/>
-            </a:pPr>
-            <a:r>
-              <a:rPr lang="pt-BR" sz="3200" b="0" strike="noStrike" spc="-1" dirty="0">
-                <a:solidFill>
-                  <a:srgbClr val="000000"/>
-                </a:solidFill>
-                <a:uFill>
-                  <a:solidFill>
-                    <a:srgbClr val="FFFFFF"/>
-                  </a:solidFill>
-                </a:uFill>
-                <a:latin typeface="Calibri"/>
-                <a:ea typeface="DejaVu Sans"/>
-              </a:rPr>
-              <a:t>Módulo mobile deve operar </a:t>
-            </a:r>
-            <a:r>
-              <a:rPr lang="pt-BR" sz="3200" b="0" strike="noStrike" spc="-1" dirty="0" smtClean="0">
-                <a:solidFill>
-                  <a:srgbClr val="000000"/>
-                </a:solidFill>
-                <a:uFill>
-                  <a:solidFill>
-                    <a:srgbClr val="FFFFFF"/>
-                  </a:solidFill>
-                </a:uFill>
-                <a:latin typeface="Calibri"/>
-                <a:ea typeface="DejaVu Sans"/>
-              </a:rPr>
-              <a:t>a partir </a:t>
-            </a:r>
-            <a:r>
-              <a:rPr lang="pt-BR" sz="3200" b="0" strike="noStrike" spc="-1" dirty="0">
-                <a:solidFill>
-                  <a:srgbClr val="000000"/>
-                </a:solidFill>
-                <a:uFill>
-                  <a:solidFill>
-                    <a:srgbClr val="FFFFFF"/>
-                  </a:solidFill>
-                </a:uFill>
-                <a:latin typeface="Calibri"/>
-                <a:ea typeface="DejaVu Sans"/>
-              </a:rPr>
-              <a:t>do sistema operacional </a:t>
-            </a:r>
-            <a:r>
-              <a:rPr lang="pt-BR" sz="3200" b="1" strike="noStrike" spc="-1" dirty="0" err="1">
-                <a:solidFill>
-                  <a:srgbClr val="000000"/>
-                </a:solidFill>
-                <a:uFill>
-                  <a:solidFill>
-                    <a:srgbClr val="FFFFFF"/>
-                  </a:solidFill>
-                </a:uFill>
-                <a:latin typeface="Calibri"/>
-                <a:ea typeface="DejaVu Sans"/>
-              </a:rPr>
-              <a:t>android</a:t>
-            </a:r>
-            <a:r>
-              <a:rPr lang="pt-BR" sz="3200" b="0" strike="noStrike" spc="-1" dirty="0">
-                <a:solidFill>
-                  <a:srgbClr val="000000"/>
-                </a:solidFill>
-                <a:uFill>
-                  <a:solidFill>
-                    <a:srgbClr val="FFFFFF"/>
-                  </a:solidFill>
-                </a:uFill>
-                <a:latin typeface="Calibri"/>
-                <a:ea typeface="DejaVu Sans"/>
-              </a:rPr>
-              <a:t>, a partir da versão </a:t>
-            </a:r>
-            <a:r>
-              <a:rPr lang="pt-BR" sz="3200" b="1" strike="noStrike" spc="-1" dirty="0" smtClean="0">
-                <a:solidFill>
-                  <a:srgbClr val="000000"/>
-                </a:solidFill>
-                <a:uFill>
-                  <a:solidFill>
-                    <a:srgbClr val="FFFFFF"/>
-                  </a:solidFill>
-                </a:uFill>
-                <a:latin typeface="Calibri"/>
-                <a:ea typeface="DejaVu Sans"/>
-              </a:rPr>
-              <a:t>5.0</a:t>
+              <a:t>Mozilla Firefox;</a:t>
             </a:r>
             <a:endParaRPr lang="pt-BR" sz="1800" b="0" strike="noStrike" spc="-1" dirty="0">
               <a:solidFill>
@@ -9400,7 +9745,7 @@
                 <a:latin typeface="Calibri"/>
                 <a:ea typeface="DejaVu Sans"/>
               </a:rPr>
-              <a:t> </a:t>
+              <a:t>Edge.</a:t>
             </a:r>
             <a:endParaRPr lang="pt-BR" sz="1800" b="0" strike="noStrike" spc="-1" dirty="0">
               <a:solidFill>
@@ -9415,16 +9760,15 @@
             </a:endParaRPr>
           </a:p>
           <a:p>
-            <a:pPr marL="864000" lvl="1" indent="-322200">
+            <a:pPr marL="343080" indent="-340920">
               <a:lnSpc>
                 <a:spcPct val="100000"/>
               </a:lnSpc>
               <a:buClr>
-                <a:srgbClr val="FFFFFF"/>
+                <a:srgbClr val="000000"/>
               </a:buClr>
-              <a:buSzPct val="75000"/>
-              <a:buFont typeface="Symbol"/>
-              <a:buChar char=""/>
+              <a:buFont typeface="Arial"/>
+              <a:buChar char="•"/>
             </a:pPr>
             <a:r>
               <a:rPr lang="pt-BR" sz="3200" b="0" strike="noStrike" spc="-1" dirty="0">
@@ -9439,34 +9783,10 @@
                 <a:latin typeface="Calibri"/>
                 <a:ea typeface="DejaVu Sans"/>
               </a:rPr>
-              <a:t> </a:t>
+              <a:t>Módulo mobile deve operar no sistema operacional </a:t>
             </a:r>
-            <a:endParaRPr lang="pt-BR" sz="1800" b="0" strike="noStrike" spc="-1" dirty="0">
-              <a:solidFill>
-                <a:srgbClr val="000000"/>
-              </a:solidFill>
-              <a:uFill>
-                <a:solidFill>
-                  <a:srgbClr val="FFFFFF"/>
-                </a:solidFill>
-              </a:uFill>
-              <a:latin typeface="Arial"/>
-            </a:endParaRPr>
-          </a:p>
-          <a:p>
-            <a:pPr marL="864000" lvl="1" indent="-322200">
-              <a:lnSpc>
-                <a:spcPct val="100000"/>
-              </a:lnSpc>
-              <a:buClr>
-                <a:srgbClr val="FFFFFF"/>
-              </a:buClr>
-              <a:buSzPct val="75000"/>
-              <a:buFont typeface="Symbol"/>
-              <a:buChar char=""/>
-            </a:pPr>
             <a:r>
-              <a:rPr lang="pt-BR" sz="3200" b="0" strike="noStrike" spc="-1" dirty="0">
+              <a:rPr lang="pt-BR" sz="3200" b="1" strike="noStrike" spc="-1" dirty="0">
                 <a:solidFill>
                   <a:srgbClr val="000000"/>
                 </a:solidFill>
@@ -9478,7 +9798,37 @@
                 <a:latin typeface="Calibri"/>
                 <a:ea typeface="DejaVu Sans"/>
               </a:rPr>
-              <a:t> </a:t>
+              <a:t>Android</a:t>
+            </a:r>
+            <a:r>
+              <a:rPr lang="pt-BR" sz="3200" b="0" strike="noStrike" spc="-1" dirty="0">
+                <a:solidFill>
+                  <a:srgbClr val="000000"/>
+                </a:solidFill>
+                <a:uFill>
+                  <a:solidFill>
+                    <a:srgbClr val="FFFFFF"/>
+                  </a:solidFill>
+                </a:uFill>
+                <a:latin typeface="Calibri"/>
+                <a:ea typeface="DejaVu Sans"/>
+              </a:rPr>
+              <a:t>, a partir da versão </a:t>
+            </a:r>
+            <a:r>
+              <a:rPr lang="pt-BR" sz="3200" b="1" strike="noStrike" spc="-1" dirty="0">
+                <a:solidFill>
+                  <a:srgbClr val="000000"/>
+                </a:solidFill>
+                <a:uFill>
+                  <a:solidFill>
+                    <a:srgbClr val="FFFFFF"/>
+                  </a:solidFill>
+                </a:uFill>
+                <a:latin typeface="Calibri"/>
+                <a:ea typeface="DejaVu Sans"/>
+              </a:rPr>
+              <a:t>5.0</a:t>
             </a:r>
             <a:endParaRPr lang="pt-BR" sz="1800" b="0" strike="noStrike" spc="-1" dirty="0">
               <a:solidFill>
@@ -9493,12 +9843,13 @@
             </a:endParaRPr>
           </a:p>
           <a:p>
-            <a:pPr>
-              <a:lnSpc>
-                <a:spcPct val="100000"/>
-              </a:lnSpc>
+            <a:pPr marL="84600">
+              <a:buClr>
+                <a:srgbClr val="FFFFFF"/>
+              </a:buClr>
+              <a:buSzPct val="75000"/>
             </a:pPr>
-            <a:endParaRPr lang="pt-BR" sz="1800" b="0" strike="noStrike" spc="-1" dirty="0">
+            <a:endParaRPr lang="pt-BR" b="0" strike="noStrike" spc="-1" dirty="0">
               <a:solidFill>
                 <a:srgbClr val="000000"/>
               </a:solidFill>
@@ -9637,19 +9988,37 @@
         <p:nvGraphicFramePr>
           <p:cNvPr id="135" name="Table 2"/>
           <p:cNvGraphicFramePr/>
-          <p:nvPr/>
+          <p:nvPr>
+            <p:extLst>
+              <p:ext uri="{D42A27DB-BD31-4B8C-83A1-F6EECF244321}">
+                <p14:modId xmlns:p14="http://schemas.microsoft.com/office/powerpoint/2010/main" val="448232057"/>
+              </p:ext>
+            </p:extLst>
+          </p:nvPr>
         </p:nvGraphicFramePr>
         <p:xfrm>
           <a:off x="457200" y="1420920"/>
-          <a:ext cx="8229240" cy="4354560"/>
+          <a:ext cx="8220075" cy="4354560"/>
         </p:xfrm>
         <a:graphic>
           <a:graphicData uri="http://schemas.openxmlformats.org/drawingml/2006/table">
             <a:tbl>
               <a:tblPr/>
               <a:tblGrid>
-                <a:gridCol w="3147840"/>
-                <a:gridCol w="5081400"/>
+                <a:gridCol w="5048250">
+                  <a:extLst>
+                    <a:ext uri="{9D8B030D-6E8A-4147-A177-3AD203B41FA5}">
+                      <a16:colId xmlns:a16="http://schemas.microsoft.com/office/drawing/2014/main" val="20000"/>
+                    </a:ext>
+                  </a:extLst>
+                </a:gridCol>
+                <a:gridCol w="3171825">
+                  <a:extLst>
+                    <a:ext uri="{9D8B030D-6E8A-4147-A177-3AD203B41FA5}">
+                      <a16:colId xmlns:a16="http://schemas.microsoft.com/office/drawing/2014/main" val="20001"/>
+                    </a:ext>
+                  </a:extLst>
+                </a:gridCol>
               </a:tblGrid>
               <a:tr h="725760">
                 <a:tc>
@@ -9663,7 +10032,7 @@
                         </a:lnSpc>
                       </a:pPr>
                       <a:r>
-                        <a:rPr lang="pt-BR" sz="2400" b="0" strike="noStrike" spc="-1">
+                        <a:rPr lang="pt-BR" sz="2400" b="0" strike="noStrike" spc="-1" dirty="0">
                           <a:solidFill>
                             <a:srgbClr val="FFFFFF"/>
                           </a:solidFill>
@@ -9685,7 +10054,6 @@
                             <a:srgbClr val="FFFFFF"/>
                           </a:solidFill>
                         </a:uFill>
-                        <a:latin typeface="Arial"/>
                       </a:endParaRPr>
                     </a:p>
                   </a:txBody>
@@ -9726,7 +10094,7 @@
                         </a:lnSpc>
                       </a:pPr>
                       <a:r>
-                        <a:rPr lang="pt-BR" sz="2400" b="0" strike="noStrike" spc="-1">
+                        <a:rPr lang="pt-BR" sz="2400" b="0" strike="noStrike" spc="-1" dirty="0">
                           <a:solidFill>
                             <a:srgbClr val="FFFFFF"/>
                           </a:solidFill>
@@ -9748,7 +10116,6 @@
                             <a:srgbClr val="FFFFFF"/>
                           </a:solidFill>
                         </a:uFill>
-                        <a:latin typeface="Arial"/>
                       </a:endParaRPr>
                     </a:p>
                   </a:txBody>
@@ -9778,6 +10145,11 @@
                     </a:solidFill>
                   </a:tcPr>
                 </a:tc>
+                <a:extLst>
+                  <a:ext uri="{0D108BD9-81ED-4DB2-BD59-A6C34878D82A}">
+                    <a16:rowId xmlns:a16="http://schemas.microsoft.com/office/drawing/2014/main" val="10000"/>
+                  </a:ext>
+                </a:extLst>
               </a:tr>
               <a:tr h="725760">
                 <a:tc>
@@ -9791,7 +10163,198 @@
                         </a:lnSpc>
                       </a:pPr>
                       <a:r>
-                        <a:rPr lang="pt-BR" sz="1800" b="0" strike="noStrike" spc="-1">
+                        <a:rPr lang="pt-BR" sz="1800" b="0" strike="noStrike" spc="-1" dirty="0">
+                          <a:solidFill>
+                            <a:srgbClr val="000000"/>
+                          </a:solidFill>
+                          <a:uFill>
+                            <a:solidFill>
+                              <a:srgbClr val="FFFFFF"/>
+                            </a:solidFill>
+                          </a:uFill>
+                          <a:latin typeface="Calibri"/>
+                        </a:rPr>
+                        <a:t>Atraso em Finalização de Iteração</a:t>
+                      </a:r>
+                      <a:endParaRPr lang="pt-BR" sz="1800" b="0" strike="noStrike" spc="-1">
+                        <a:solidFill>
+                          <a:srgbClr val="000000"/>
+                        </a:solidFill>
+                        <a:uFill>
+                          <a:solidFill>
+                            <a:srgbClr val="FFFFFF"/>
+                          </a:solidFill>
+                        </a:uFill>
+                      </a:endParaRPr>
+                    </a:p>
+                  </a:txBody>
+                  <a:tcPr>
+                    <a:lnL w="12240">
+                      <a:solidFill>
+                        <a:srgbClr val="FFFFFF"/>
+                      </a:solidFill>
+                    </a:lnL>
+                    <a:lnR w="12240">
+                      <a:solidFill>
+                        <a:srgbClr val="FFFFFF"/>
+                      </a:solidFill>
+                    </a:lnR>
+                    <a:lnT w="38160" cap="flat" cmpd="sng" algn="ctr">
+                      <a:solidFill>
+                        <a:srgbClr val="FFFFFF"/>
+                      </a:solidFill>
+                      <a:prstDash val="solid"/>
+                      <a:round/>
+                      <a:headEnd type="none" w="med" len="med"/>
+                      <a:tailEnd type="none" w="med" len="med"/>
+                    </a:lnT>
+                    <a:lnB w="12240">
+                      <a:solidFill>
+                        <a:srgbClr val="FFFFFF"/>
+                      </a:solidFill>
+                    </a:lnB>
+                    <a:solidFill>
+                      <a:srgbClr val="CCCCCC"/>
+                    </a:solidFill>
+                  </a:tcPr>
+                </a:tc>
+                <a:tc>
+                  <a:txBody>
+                    <a:bodyPr/>
+                    <a:lstStyle/>
+                    <a:p>
+                      <a:pPr>
+                        <a:lnSpc>
+                          <a:spcPct val="100000"/>
+                        </a:lnSpc>
+                      </a:pPr>
+                      <a:r>
+                        <a:rPr lang="pt-BR" sz="1800" b="0" strike="noStrike" spc="-1" dirty="0">
+                          <a:solidFill>
+                            <a:srgbClr val="000000"/>
+                          </a:solidFill>
+                          <a:uFill>
+                            <a:solidFill>
+                              <a:srgbClr val="FFFFFF"/>
+                            </a:solidFill>
+                          </a:uFill>
+                          <a:latin typeface="Calibri"/>
+                        </a:rPr>
+                        <a:t>Negativo</a:t>
+                      </a:r>
+                    </a:p>
+                  </a:txBody>
+                  <a:tcPr>
+                    <a:lnL w="12240">
+                      <a:solidFill>
+                        <a:srgbClr val="FFFFFF"/>
+                      </a:solidFill>
+                    </a:lnL>
+                    <a:lnR w="12240">
+                      <a:solidFill>
+                        <a:srgbClr val="FFFFFF"/>
+                      </a:solidFill>
+                    </a:lnR>
+                    <a:lnT w="38160" cap="flat" cmpd="sng" algn="ctr">
+                      <a:solidFill>
+                        <a:srgbClr val="FFFFFF"/>
+                      </a:solidFill>
+                      <a:prstDash val="solid"/>
+                      <a:round/>
+                      <a:headEnd type="none" w="med" len="med"/>
+                      <a:tailEnd type="none" w="med" len="med"/>
+                    </a:lnT>
+                    <a:lnB w="12240">
+                      <a:solidFill>
+                        <a:srgbClr val="FFFFFF"/>
+                      </a:solidFill>
+                    </a:lnB>
+                    <a:solidFill>
+                      <a:srgbClr val="CCCCCC"/>
+                    </a:solidFill>
+                  </a:tcPr>
+                </a:tc>
+                <a:extLst>
+                  <a:ext uri="{0D108BD9-81ED-4DB2-BD59-A6C34878D82A}">
+                    <a16:rowId xmlns:a16="http://schemas.microsoft.com/office/drawing/2014/main" val="10001"/>
+                  </a:ext>
+                </a:extLst>
+              </a:tr>
+              <a:tr h="725760">
+                <a:tc>
+                  <a:txBody>
+                    <a:bodyPr/>
+                    <a:lstStyle/>
+                    <a:p>
+                      <a:pPr>
+                        <a:lnSpc>
+                          <a:spcPct val="100000"/>
+                        </a:lnSpc>
+                      </a:pPr>
+                      <a:r>
+                        <a:rPr lang="pt-BR" sz="1800" b="0" strike="noStrike" spc="-1" dirty="0">
+                          <a:solidFill>
+                            <a:srgbClr val="000000"/>
+                          </a:solidFill>
+                          <a:uFill>
+                            <a:solidFill>
+                              <a:srgbClr val="FFFFFF"/>
+                            </a:solidFill>
+                          </a:uFill>
+                          <a:latin typeface="Calibri"/>
+                        </a:rPr>
+                        <a:t>Falha do Planejamento Inicial do Projeto</a:t>
+                      </a:r>
+                      <a:endParaRPr lang="pt-BR" sz="1800" b="0" strike="noStrike" spc="-1">
+                        <a:solidFill>
+                          <a:srgbClr val="000000"/>
+                        </a:solidFill>
+                        <a:uFill>
+                          <a:solidFill>
+                            <a:srgbClr val="FFFFFF"/>
+                          </a:solidFill>
+                        </a:uFill>
+                      </a:endParaRPr>
+                    </a:p>
+                  </a:txBody>
+                  <a:tcPr>
+                    <a:lnL w="12240">
+                      <a:solidFill>
+                        <a:srgbClr val="FFFFFF"/>
+                      </a:solidFill>
+                    </a:lnL>
+                    <a:lnR w="12240">
+                      <a:solidFill>
+                        <a:srgbClr val="FFFFFF"/>
+                      </a:solidFill>
+                    </a:lnR>
+                    <a:lnT w="12240">
+                      <a:solidFill>
+                        <a:srgbClr val="FFFFFF"/>
+                      </a:solidFill>
+                    </a:lnT>
+                    <a:lnB w="12240">
+                      <a:solidFill>
+                        <a:srgbClr val="FFFFFF"/>
+                      </a:solidFill>
+                    </a:lnB>
+                    <a:solidFill>
+                      <a:srgbClr val="E7E7E7"/>
+                    </a:solidFill>
+                  </a:tcPr>
+                </a:tc>
+                <a:tc>
+                  <a:txBody>
+                    <a:bodyPr/>
+                    <a:lstStyle/>
+                    <a:p>
+                      <a:pPr>
+                        <a:lnSpc>
+                          <a:spcPct val="100000"/>
+                        </a:lnSpc>
+                      </a:pPr>
+                      <a:r>
+                        <a:rPr lang="pt-BR" sz="1800" b="0" strike="noStrike" spc="-1" dirty="0">
                           <a:solidFill>
                             <a:srgbClr val="000000"/>
                           </a:solidFill>
@@ -9813,7 +10376,6 @@
                             <a:srgbClr val="FFFFFF"/>
                           </a:solidFill>
                         </a:uFill>
-                        <a:latin typeface="Arial"/>
                       </a:endParaRPr>
                     </a:p>
                   </a:txBody>
@@ -9828,14 +10390,79 @@
                         <a:srgbClr val="FFFFFF"/>
                       </a:solidFill>
                     </a:lnR>
-                    <a:lnT w="38160" cap="flat" cmpd="sng" algn="ctr">
-                      <a:solidFill>
-                        <a:srgbClr val="FFFFFF"/>
-                      </a:solidFill>
-                      <a:prstDash val="solid"/>
-                      <a:round/>
-                      <a:headEnd type="none" w="med" len="med"/>
-                      <a:tailEnd type="none" w="med" len="med"/>
+                    <a:lnT w="12240">
+                      <a:solidFill>
+                        <a:srgbClr val="FFFFFF"/>
+                      </a:solidFill>
+                    </a:lnT>
+                    <a:lnB w="12240">
+                      <a:solidFill>
+                        <a:srgbClr val="FFFFFF"/>
+                      </a:solidFill>
+                    </a:lnB>
+                    <a:solidFill>
+                      <a:srgbClr val="E7E7E7"/>
+                    </a:solidFill>
+                  </a:tcPr>
+                </a:tc>
+                <a:extLst>
+                  <a:ext uri="{0D108BD9-81ED-4DB2-BD59-A6C34878D82A}">
+                    <a16:rowId xmlns:a16="http://schemas.microsoft.com/office/drawing/2014/main" val="10002"/>
+                  </a:ext>
+                </a:extLst>
+              </a:tr>
+              <a:tr h="725760">
+                <a:tc>
+                  <a:txBody>
+                    <a:bodyPr/>
+                    <a:lstStyle/>
+                    <a:p>
+                      <a:pPr>
+                        <a:lnSpc>
+                          <a:spcPct val="100000"/>
+                        </a:lnSpc>
+                      </a:pPr>
+                      <a:r>
+                        <a:rPr lang="pt-BR" sz="1800" b="0" strike="noStrike" spc="-1" dirty="0">
+                          <a:solidFill>
+                            <a:srgbClr val="000000"/>
+                          </a:solidFill>
+                          <a:uFill>
+                            <a:solidFill>
+                              <a:srgbClr val="FFFFFF"/>
+                            </a:solidFill>
+                          </a:uFill>
+                          <a:latin typeface="Calibri"/>
+                        </a:rPr>
+                        <a:t>Má Distribuição de Tempo nas Atividades da Iteração</a:t>
+                      </a:r>
+                      <a:endParaRPr lang="pt-BR" sz="1800" b="0" strike="noStrike" spc="-1">
+                        <a:solidFill>
+                          <a:srgbClr val="000000"/>
+                        </a:solidFill>
+                        <a:uFill>
+                          <a:solidFill>
+                            <a:srgbClr val="FFFFFF"/>
+                          </a:solidFill>
+                        </a:uFill>
+                      </a:endParaRPr>
+                    </a:p>
+                  </a:txBody>
+                  <a:tcPr>
+                    <a:lnL w="12240">
+                      <a:solidFill>
+                        <a:srgbClr val="FFFFFF"/>
+                      </a:solidFill>
+                    </a:lnL>
+                    <a:lnR w="12240">
+                      <a:solidFill>
+                        <a:srgbClr val="FFFFFF"/>
+                      </a:solidFill>
+                    </a:lnR>
+                    <a:lnT w="12240">
+                      <a:solidFill>
+                        <a:srgbClr val="FFFFFF"/>
+                      </a:solidFill>
                     </a:lnT>
                     <a:lnB w="12240">
                       <a:solidFill>
@@ -9858,7 +10485,7 @@
                         </a:lnSpc>
                       </a:pPr>
                       <a:r>
-                        <a:rPr lang="pt-BR" sz="1800" b="0" strike="noStrike" spc="-1">
+                        <a:rPr lang="pt-BR" sz="1800" b="0" strike="noStrike" spc="-1" dirty="0">
                           <a:solidFill>
                             <a:srgbClr val="000000"/>
                           </a:solidFill>
@@ -9869,19 +10496,8 @@
                           </a:uFill>
                           <a:latin typeface="Calibri"/>
                         </a:rPr>
-                        <a:t>Atraso em Finalização de Iteração</a:t>
+                        <a:t>Negativo</a:t>
                       </a:r>
-                      <a:endParaRPr lang="pt-BR" sz="1800" b="0" strike="noStrike" spc="-1">
-                        <a:solidFill>
-                          <a:srgbClr val="000000"/>
-                        </a:solidFill>
-                        <a:uFill>
-                          <a:solidFill>
-                            <a:srgbClr val="FFFFFF"/>
-                          </a:solidFill>
-                        </a:uFill>
-                        <a:latin typeface="Arial"/>
-                      </a:endParaRPr>
                     </a:p>
                   </a:txBody>
                   <a:tcPr>
@@ -9895,14 +10511,10 @@
                         <a:srgbClr val="FFFFFF"/>
                       </a:solidFill>
                     </a:lnR>
-                    <a:lnT w="38160" cap="flat" cmpd="sng" algn="ctr">
-                      <a:solidFill>
-                        <a:srgbClr val="FFFFFF"/>
-                      </a:solidFill>
-                      <a:prstDash val="solid"/>
-                      <a:round/>
-                      <a:headEnd type="none" w="med" len="med"/>
-                      <a:tailEnd type="none" w="med" len="med"/>
+                    <a:lnT w="12240">
+                      <a:solidFill>
+                        <a:srgbClr val="FFFFFF"/>
+                      </a:solidFill>
                     </a:lnT>
                     <a:lnB w="12240">
                       <a:solidFill>
@@ -9914,6 +10526,11 @@
                     </a:solidFill>
                   </a:tcPr>
                 </a:tc>
+                <a:extLst>
+                  <a:ext uri="{0D108BD9-81ED-4DB2-BD59-A6C34878D82A}">
+                    <a16:rowId xmlns:a16="http://schemas.microsoft.com/office/drawing/2014/main" val="10003"/>
+                  </a:ext>
+                </a:extLst>
               </a:tr>
               <a:tr h="725760">
                 <a:tc>
@@ -9927,7 +10544,170 @@
                         </a:lnSpc>
                       </a:pPr>
                       <a:r>
-                        <a:rPr lang="pt-BR" sz="1800" b="0" strike="noStrike" spc="-1">
+                        <a:rPr lang="pt-BR" sz="1800" b="0" strike="noStrike" spc="-1" dirty="0">
+                          <a:solidFill>
+                            <a:srgbClr val="000000"/>
+                          </a:solidFill>
+                          <a:uFill>
+                            <a:solidFill>
+                              <a:srgbClr val="FFFFFF"/>
+                            </a:solidFill>
+                          </a:uFill>
+                          <a:latin typeface="Calibri"/>
+                        </a:rPr>
+                        <a:t>Análise de Riscos Incompleta</a:t>
+                      </a:r>
+                    </a:p>
+                  </a:txBody>
+                  <a:tcPr>
+                    <a:lnL w="12240">
+                      <a:solidFill>
+                        <a:srgbClr val="FFFFFF"/>
+                      </a:solidFill>
+                    </a:lnL>
+                    <a:lnR w="12240">
+                      <a:solidFill>
+                        <a:srgbClr val="FFFFFF"/>
+                      </a:solidFill>
+                    </a:lnR>
+                    <a:lnT w="12240">
+                      <a:solidFill>
+                        <a:srgbClr val="FFFFFF"/>
+                      </a:solidFill>
+                    </a:lnT>
+                    <a:lnB w="12240">
+                      <a:solidFill>
+                        <a:srgbClr val="FFFFFF"/>
+                      </a:solidFill>
+                    </a:lnB>
+                    <a:solidFill>
+                      <a:srgbClr val="E7E7E7"/>
+                    </a:solidFill>
+                  </a:tcPr>
+                </a:tc>
+                <a:tc>
+                  <a:txBody>
+                    <a:bodyPr/>
+                    <a:lstStyle/>
+                    <a:p>
+                      <a:pPr>
+                        <a:lnSpc>
+                          <a:spcPct val="100000"/>
+                        </a:lnSpc>
+                      </a:pPr>
+                      <a:r>
+                        <a:rPr lang="pt-BR" sz="1800" b="0" strike="noStrike" spc="-1" dirty="0">
+                          <a:solidFill>
+                            <a:srgbClr val="000000"/>
+                          </a:solidFill>
+                          <a:uFill>
+                            <a:solidFill>
+                              <a:srgbClr val="FFFFFF"/>
+                            </a:solidFill>
+                          </a:uFill>
+                          <a:latin typeface="Calibri"/>
+                        </a:rPr>
+                        <a:t>Negativo</a:t>
+                      </a:r>
+                    </a:p>
+                  </a:txBody>
+                  <a:tcPr>
+                    <a:lnL w="12240">
+                      <a:solidFill>
+                        <a:srgbClr val="FFFFFF"/>
+                      </a:solidFill>
+                    </a:lnL>
+                    <a:lnR w="12240">
+                      <a:solidFill>
+                        <a:srgbClr val="FFFFFF"/>
+                      </a:solidFill>
+                    </a:lnR>
+                    <a:lnT w="12240">
+                      <a:solidFill>
+                        <a:srgbClr val="FFFFFF"/>
+                      </a:solidFill>
+                    </a:lnT>
+                    <a:lnB w="12240">
+                      <a:solidFill>
+                        <a:srgbClr val="FFFFFF"/>
+                      </a:solidFill>
+                    </a:lnB>
+                    <a:solidFill>
+                      <a:srgbClr val="E7E7E7"/>
+                    </a:solidFill>
+                  </a:tcPr>
+                </a:tc>
+                <a:extLst>
+                  <a:ext uri="{0D108BD9-81ED-4DB2-BD59-A6C34878D82A}">
+                    <a16:rowId xmlns:a16="http://schemas.microsoft.com/office/drawing/2014/main" val="10004"/>
+                  </a:ext>
+                </a:extLst>
+              </a:tr>
+              <a:tr h="725760">
+                <a:tc>
+                  <a:txBody>
+                    <a:bodyPr/>
+                    <a:lstStyle/>
+                    <a:p>
+                      <a:pPr>
+                        <a:lnSpc>
+                          <a:spcPct val="100000"/>
+                        </a:lnSpc>
+                      </a:pPr>
+                      <a:r>
+                        <a:rPr lang="pt-BR" sz="1800" b="0" strike="noStrike" spc="-1" dirty="0">
+                          <a:solidFill>
+                            <a:srgbClr val="000000"/>
+                          </a:solidFill>
+                          <a:uFill>
+                            <a:solidFill>
+                              <a:srgbClr val="FFFFFF"/>
+                            </a:solidFill>
+                          </a:uFill>
+                          <a:latin typeface="Calibri"/>
+                        </a:rPr>
+                        <a:t>Surgimento de Bugs em Release Disponibilizada ao Cliente</a:t>
+                      </a:r>
+                    </a:p>
+                  </a:txBody>
+                  <a:tcPr>
+                    <a:lnL w="12240">
+                      <a:solidFill>
+                        <a:srgbClr val="FFFFFF"/>
+                      </a:solidFill>
+                    </a:lnL>
+                    <a:lnR w="12240">
+                      <a:solidFill>
+                        <a:srgbClr val="FFFFFF"/>
+                      </a:solidFill>
+                    </a:lnR>
+                    <a:lnT w="12240">
+                      <a:solidFill>
+                        <a:srgbClr val="FFFFFF"/>
+                      </a:solidFill>
+                    </a:lnT>
+                    <a:lnB w="12240">
+                      <a:solidFill>
+                        <a:srgbClr val="FFFFFF"/>
+                      </a:solidFill>
+                    </a:lnB>
+                    <a:solidFill>
+                      <a:srgbClr val="E7E7E7"/>
+                    </a:solidFill>
+                  </a:tcPr>
+                </a:tc>
+                <a:tc>
+                  <a:txBody>
+                    <a:bodyPr/>
+                    <a:lstStyle/>
+                    <a:p>
+                      <a:pPr>
+                        <a:lnSpc>
+                          <a:spcPct val="100000"/>
+                        </a:lnSpc>
+                      </a:pPr>
+                      <a:r>
+                        <a:rPr lang="pt-BR" sz="1800" b="0" strike="noStrike" spc="-1" dirty="0">
                           <a:solidFill>
                             <a:srgbClr val="000000"/>
                           </a:solidFill>
@@ -9949,7 +10729,6 @@
                             <a:srgbClr val="FFFFFF"/>
                           </a:solidFill>
                         </a:uFill>
-                        <a:latin typeface="Arial"/>
                       </a:endParaRPr>
                     </a:p>
                   </a:txBody>
@@ -9979,453 +10758,11 @@
                     </a:solidFill>
                   </a:tcPr>
                 </a:tc>
-                <a:tc>
-                  <a:txBody>
-                    <a:bodyPr/>
-                    <a:lstStyle/>
-                    <a:p>
-                      <a:pPr>
-                        <a:lnSpc>
-                          <a:spcPct val="100000"/>
-                        </a:lnSpc>
-                      </a:pPr>
-                      <a:r>
-                        <a:rPr lang="pt-BR" sz="1800" b="0" strike="noStrike" spc="-1">
-                          <a:solidFill>
-                            <a:srgbClr val="000000"/>
-                          </a:solidFill>
-                          <a:uFill>
-                            <a:solidFill>
-                              <a:srgbClr val="FFFFFF"/>
-                            </a:solidFill>
-                          </a:uFill>
-                          <a:latin typeface="Calibri"/>
-                        </a:rPr>
-                        <a:t>Falha do Planejamento Inicial do Projeto</a:t>
-                      </a:r>
-                      <a:endParaRPr lang="pt-BR" sz="1800" b="0" strike="noStrike" spc="-1">
-                        <a:solidFill>
-                          <a:srgbClr val="000000"/>
-                        </a:solidFill>
-                        <a:uFill>
-                          <a:solidFill>
-                            <a:srgbClr val="FFFFFF"/>
-                          </a:solidFill>
-                        </a:uFill>
-                        <a:latin typeface="Arial"/>
-                      </a:endParaRPr>
-                    </a:p>
-                  </a:txBody>
-                  <a:tcPr>
-                    <a:lnL w="12240">
-                      <a:solidFill>
-                        <a:srgbClr val="FFFFFF"/>
-                      </a:solidFill>
-                    </a:lnL>
-                    <a:lnR w="12240">
-                      <a:solidFill>
-                        <a:srgbClr val="FFFFFF"/>
-                      </a:solidFill>
-                    </a:lnR>
-                    <a:lnT w="12240">
-                      <a:solidFill>
-                        <a:srgbClr val="FFFFFF"/>
-                      </a:solidFill>
-                    </a:lnT>
-                    <a:lnB w="12240">
-                      <a:solidFill>
-                        <a:srgbClr val="FFFFFF"/>
-                      </a:solidFill>
-                    </a:lnB>
-                    <a:solidFill>
-                      <a:srgbClr val="E7E7E7"/>
-                    </a:solidFill>
-                  </a:tcPr>
-                </a:tc>
-              </a:tr>
-              <a:tr h="725760">
-                <a:tc>
-                  <a:txBody>
-                    <a:bodyPr/>
-                    <a:lstStyle/>
-                    <a:p>
-                      <a:pPr>
-                        <a:lnSpc>
-                          <a:spcPct val="100000"/>
-                        </a:lnSpc>
-                      </a:pPr>
-                      <a:r>
-                        <a:rPr lang="pt-BR" sz="1800" b="0" strike="noStrike" spc="-1">
-                          <a:solidFill>
-                            <a:srgbClr val="000000"/>
-                          </a:solidFill>
-                          <a:uFill>
-                            <a:solidFill>
-                              <a:srgbClr val="FFFFFF"/>
-                            </a:solidFill>
-                          </a:uFill>
-                          <a:latin typeface="Calibri"/>
-                        </a:rPr>
-                        <a:t>Negativo</a:t>
-                      </a:r>
-                      <a:endParaRPr lang="pt-BR" sz="1800" b="0" strike="noStrike" spc="-1">
-                        <a:solidFill>
-                          <a:srgbClr val="000000"/>
-                        </a:solidFill>
-                        <a:uFill>
-                          <a:solidFill>
-                            <a:srgbClr val="FFFFFF"/>
-                          </a:solidFill>
-                        </a:uFill>
-                        <a:latin typeface="Arial"/>
-                      </a:endParaRPr>
-                    </a:p>
-                  </a:txBody>
-                  <a:tcPr>
-                    <a:lnL w="12240">
-                      <a:solidFill>
-                        <a:srgbClr val="FFFFFF"/>
-                      </a:solidFill>
-                    </a:lnL>
-                    <a:lnR w="12240">
-                      <a:solidFill>
-                        <a:srgbClr val="FFFFFF"/>
-                      </a:solidFill>
-                    </a:lnR>
-                    <a:lnT w="12240">
-                      <a:solidFill>
-                        <a:srgbClr val="FFFFFF"/>
-                      </a:solidFill>
-                    </a:lnT>
-                    <a:lnB w="12240">
-                      <a:solidFill>
-                        <a:srgbClr val="FFFFFF"/>
-                      </a:solidFill>
-                    </a:lnB>
-                    <a:solidFill>
-                      <a:srgbClr val="CCCCCC"/>
-                    </a:solidFill>
-                  </a:tcPr>
-                </a:tc>
-                <a:tc>
-                  <a:txBody>
-                    <a:bodyPr/>
-                    <a:lstStyle/>
-                    <a:p>
-                      <a:pPr>
-                        <a:lnSpc>
-                          <a:spcPct val="100000"/>
-                        </a:lnSpc>
-                      </a:pPr>
-                      <a:r>
-                        <a:rPr lang="pt-BR" sz="1800" b="0" strike="noStrike" spc="-1">
-                          <a:solidFill>
-                            <a:srgbClr val="000000"/>
-                          </a:solidFill>
-                          <a:uFill>
-                            <a:solidFill>
-                              <a:srgbClr val="FFFFFF"/>
-                            </a:solidFill>
-                          </a:uFill>
-                          <a:latin typeface="Calibri"/>
-                        </a:rPr>
-                        <a:t>Má Distribuição de Tempo nas Atividades da Iteração</a:t>
-                      </a:r>
-                      <a:endParaRPr lang="pt-BR" sz="1800" b="0" strike="noStrike" spc="-1">
-                        <a:solidFill>
-                          <a:srgbClr val="000000"/>
-                        </a:solidFill>
-                        <a:uFill>
-                          <a:solidFill>
-                            <a:srgbClr val="FFFFFF"/>
-                          </a:solidFill>
-                        </a:uFill>
-                        <a:latin typeface="Arial"/>
-                      </a:endParaRPr>
-                    </a:p>
-                  </a:txBody>
-                  <a:tcPr>
-                    <a:lnL w="12240">
-                      <a:solidFill>
-                        <a:srgbClr val="FFFFFF"/>
-                      </a:solidFill>
-                    </a:lnL>
-                    <a:lnR w="12240">
-                      <a:solidFill>
-                        <a:srgbClr val="FFFFFF"/>
-                      </a:solidFill>
-                    </a:lnR>
-                    <a:lnT w="12240">
-                      <a:solidFill>
-                        <a:srgbClr val="FFFFFF"/>
-                      </a:solidFill>
-                    </a:lnT>
-                    <a:lnB w="12240">
-                      <a:solidFill>
-                        <a:srgbClr val="FFFFFF"/>
-                      </a:solidFill>
-                    </a:lnB>
-                    <a:solidFill>
-                      <a:srgbClr val="CCCCCC"/>
-                    </a:solidFill>
-                  </a:tcPr>
-                </a:tc>
-              </a:tr>
-              <a:tr h="725760">
-                <a:tc>
-                  <a:txBody>
-                    <a:bodyPr/>
-                    <a:lstStyle/>
-                    <a:p>
-                      <a:pPr>
-                        <a:lnSpc>
-                          <a:spcPct val="100000"/>
-                        </a:lnSpc>
-                      </a:pPr>
-                      <a:r>
-                        <a:rPr lang="pt-BR" sz="1800" b="0" strike="noStrike" spc="-1">
-                          <a:solidFill>
-                            <a:srgbClr val="000000"/>
-                          </a:solidFill>
-                          <a:uFill>
-                            <a:solidFill>
-                              <a:srgbClr val="FFFFFF"/>
-                            </a:solidFill>
-                          </a:uFill>
-                          <a:latin typeface="Calibri"/>
-                        </a:rPr>
-                        <a:t>Negativo</a:t>
-                      </a:r>
-                      <a:endParaRPr lang="pt-BR" sz="1800" b="0" strike="noStrike" spc="-1">
-                        <a:solidFill>
-                          <a:srgbClr val="000000"/>
-                        </a:solidFill>
-                        <a:uFill>
-                          <a:solidFill>
-                            <a:srgbClr val="FFFFFF"/>
-                          </a:solidFill>
-                        </a:uFill>
-                        <a:latin typeface="Arial"/>
-                      </a:endParaRPr>
-                    </a:p>
-                  </a:txBody>
-                  <a:tcPr>
-                    <a:lnL w="12240">
-                      <a:solidFill>
-                        <a:srgbClr val="FFFFFF"/>
-                      </a:solidFill>
-                    </a:lnL>
-                    <a:lnR w="12240">
-                      <a:solidFill>
-                        <a:srgbClr val="FFFFFF"/>
-                      </a:solidFill>
-                    </a:lnR>
-                    <a:lnT w="12240">
-                      <a:solidFill>
-                        <a:srgbClr val="FFFFFF"/>
-                      </a:solidFill>
-                    </a:lnT>
-                    <a:lnB w="12240">
-                      <a:solidFill>
-                        <a:srgbClr val="FFFFFF"/>
-                      </a:solidFill>
-                    </a:lnB>
-                    <a:solidFill>
-                      <a:srgbClr val="E7E7E7"/>
-                    </a:solidFill>
-                  </a:tcPr>
-                </a:tc>
-                <a:tc>
-                  <a:txBody>
-                    <a:bodyPr/>
-                    <a:lstStyle/>
-                    <a:p>
-                      <a:pPr>
-                        <a:lnSpc>
-                          <a:spcPct val="100000"/>
-                        </a:lnSpc>
-                      </a:pPr>
-                      <a:r>
-                        <a:rPr lang="pt-BR" sz="1800" b="0" strike="noStrike" spc="-1">
-                          <a:solidFill>
-                            <a:srgbClr val="000000"/>
-                          </a:solidFill>
-                          <a:uFill>
-                            <a:solidFill>
-                              <a:srgbClr val="FFFFFF"/>
-                            </a:solidFill>
-                          </a:uFill>
-                          <a:latin typeface="Calibri"/>
-                        </a:rPr>
-                        <a:t>Análise de Riscos Incompleta</a:t>
-                      </a:r>
-                      <a:endParaRPr lang="pt-BR" sz="1800" b="0" strike="noStrike" spc="-1">
-                        <a:solidFill>
-                          <a:srgbClr val="000000"/>
-                        </a:solidFill>
-                        <a:uFill>
-                          <a:solidFill>
-                            <a:srgbClr val="FFFFFF"/>
-                          </a:solidFill>
-                        </a:uFill>
-                        <a:latin typeface="Arial"/>
-                      </a:endParaRPr>
-                    </a:p>
-                  </a:txBody>
-                  <a:tcPr>
-                    <a:lnL w="12240">
-                      <a:solidFill>
-                        <a:srgbClr val="FFFFFF"/>
-                      </a:solidFill>
-                    </a:lnL>
-                    <a:lnR w="12240">
-                      <a:solidFill>
-                        <a:srgbClr val="FFFFFF"/>
-                      </a:solidFill>
-                    </a:lnR>
-                    <a:lnT w="12240">
-                      <a:solidFill>
-                        <a:srgbClr val="FFFFFF"/>
-                      </a:solidFill>
-                    </a:lnT>
-                    <a:lnB w="12240">
-                      <a:solidFill>
-                        <a:srgbClr val="FFFFFF"/>
-                      </a:solidFill>
-                    </a:lnB>
-                    <a:solidFill>
-                      <a:srgbClr val="E7E7E7"/>
-                    </a:solidFill>
-                  </a:tcPr>
-                </a:tc>
-              </a:tr>
-              <a:tr h="725760">
-                <a:tc>
-                  <a:txBody>
-                    <a:bodyPr/>
-                    <a:lstStyle/>
-                    <a:p>
-                      <a:pPr>
-                        <a:lnSpc>
-                          <a:spcPct val="100000"/>
-                        </a:lnSpc>
-                      </a:pPr>
-                      <a:r>
-                        <a:rPr lang="pt-BR" sz="1800" b="0" strike="noStrike" spc="-1">
-                          <a:solidFill>
-                            <a:srgbClr val="000000"/>
-                          </a:solidFill>
-                          <a:uFill>
-                            <a:solidFill>
-                              <a:srgbClr val="FFFFFF"/>
-                            </a:solidFill>
-                          </a:uFill>
-                          <a:latin typeface="Calibri"/>
-                        </a:rPr>
-                        <a:t>Negativo</a:t>
-                      </a:r>
-                      <a:endParaRPr lang="pt-BR" sz="1800" b="0" strike="noStrike" spc="-1">
-                        <a:solidFill>
-                          <a:srgbClr val="000000"/>
-                        </a:solidFill>
-                        <a:uFill>
-                          <a:solidFill>
-                            <a:srgbClr val="FFFFFF"/>
-                          </a:solidFill>
-                        </a:uFill>
-                        <a:latin typeface="Arial"/>
-                      </a:endParaRPr>
-                    </a:p>
-                  </a:txBody>
-                  <a:tcPr>
-                    <a:lnL w="12240">
-                      <a:solidFill>
-                        <a:srgbClr val="FFFFFF"/>
-                      </a:solidFill>
-                    </a:lnL>
-                    <a:lnR w="12240">
-                      <a:solidFill>
-                        <a:srgbClr val="FFFFFF"/>
-                      </a:solidFill>
-                    </a:lnR>
-                    <a:lnT w="12240">
-                      <a:solidFill>
-                        <a:srgbClr val="FFFFFF"/>
-                      </a:solidFill>
-                    </a:lnT>
-                    <a:lnB w="12240">
-                      <a:solidFill>
-                        <a:srgbClr val="FFFFFF"/>
-                      </a:solidFill>
-                    </a:lnB>
-                    <a:solidFill>
-                      <a:srgbClr val="E7E7E7"/>
-                    </a:solidFill>
-                  </a:tcPr>
-                </a:tc>
-                <a:tc>
-                  <a:txBody>
-                    <a:bodyPr/>
-                    <a:lstStyle/>
-                    <a:p>
-                      <a:pPr>
-                        <a:lnSpc>
-                          <a:spcPct val="100000"/>
-                        </a:lnSpc>
-                      </a:pPr>
-                      <a:r>
-                        <a:rPr lang="pt-BR" sz="1800" b="0" strike="noStrike" spc="-1">
-                          <a:solidFill>
-                            <a:srgbClr val="000000"/>
-                          </a:solidFill>
-                          <a:uFill>
-                            <a:solidFill>
-                              <a:srgbClr val="FFFFFF"/>
-                            </a:solidFill>
-                          </a:uFill>
-                          <a:latin typeface="Calibri"/>
-                        </a:rPr>
-                        <a:t>Surgimento de Bugs em Release Disponibilizada ao Cliente</a:t>
-                      </a:r>
-                      <a:endParaRPr lang="pt-BR" sz="1800" b="0" strike="noStrike" spc="-1">
-                        <a:solidFill>
-                          <a:srgbClr val="000000"/>
-                        </a:solidFill>
-                        <a:uFill>
-                          <a:solidFill>
-                            <a:srgbClr val="FFFFFF"/>
-                          </a:solidFill>
-                        </a:uFill>
-                        <a:latin typeface="Arial"/>
-                      </a:endParaRPr>
-                    </a:p>
-                  </a:txBody>
-                  <a:tcPr>
-                    <a:lnL w="12240">
-                      <a:solidFill>
-                        <a:srgbClr val="FFFFFF"/>
-                      </a:solidFill>
-                    </a:lnL>
-                    <a:lnR w="12240">
-                      <a:solidFill>
-                        <a:srgbClr val="FFFFFF"/>
-                      </a:solidFill>
-                    </a:lnR>
-                    <a:lnT w="12240">
-                      <a:solidFill>
-                        <a:srgbClr val="FFFFFF"/>
-                      </a:solidFill>
-                    </a:lnT>
-                    <a:lnB w="12240">
-                      <a:solidFill>
-                        <a:srgbClr val="FFFFFF"/>
-                      </a:solidFill>
-                    </a:lnB>
-                    <a:solidFill>
-                      <a:srgbClr val="E7E7E7"/>
-                    </a:solidFill>
-                  </a:tcPr>
-                </a:tc>
+                <a:extLst>
+                  <a:ext uri="{0D108BD9-81ED-4DB2-BD59-A6C34878D82A}">
+                    <a16:rowId xmlns:a16="http://schemas.microsoft.com/office/drawing/2014/main" val="10005"/>
+                  </a:ext>
+                </a:extLst>
               </a:tr>
             </a:tbl>
           </a:graphicData>
@@ -10556,19 +10893,37 @@
         <p:nvGraphicFramePr>
           <p:cNvPr id="137" name="Table 2"/>
           <p:cNvGraphicFramePr/>
-          <p:nvPr/>
+          <p:nvPr>
+            <p:extLst>
+              <p:ext uri="{D42A27DB-BD31-4B8C-83A1-F6EECF244321}">
+                <p14:modId xmlns:p14="http://schemas.microsoft.com/office/powerpoint/2010/main" val="2385534116"/>
+              </p:ext>
+            </p:extLst>
+          </p:nvPr>
         </p:nvGraphicFramePr>
         <p:xfrm>
           <a:off x="457200" y="1420920"/>
-          <a:ext cx="8229240" cy="5080320"/>
+          <a:ext cx="8220074" cy="5080320"/>
         </p:xfrm>
         <a:graphic>
           <a:graphicData uri="http://schemas.openxmlformats.org/drawingml/2006/table">
             <a:tbl>
               <a:tblPr/>
               <a:tblGrid>
-                <a:gridCol w="3191760"/>
-                <a:gridCol w="5037480"/>
+                <a:gridCol w="5029200">
+                  <a:extLst>
+                    <a:ext uri="{9D8B030D-6E8A-4147-A177-3AD203B41FA5}">
+                      <a16:colId xmlns:a16="http://schemas.microsoft.com/office/drawing/2014/main" val="20000"/>
+                    </a:ext>
+                  </a:extLst>
+                </a:gridCol>
+                <a:gridCol w="3190874">
+                  <a:extLst>
+                    <a:ext uri="{9D8B030D-6E8A-4147-A177-3AD203B41FA5}">
+                      <a16:colId xmlns:a16="http://schemas.microsoft.com/office/drawing/2014/main" val="20001"/>
+                    </a:ext>
+                  </a:extLst>
+                </a:gridCol>
               </a:tblGrid>
               <a:tr h="725760">
                 <a:tc>
@@ -10582,7 +10937,7 @@
                         </a:lnSpc>
                       </a:pPr>
                       <a:r>
-                        <a:rPr lang="pt-BR" sz="2400" b="0" strike="noStrike" spc="-1">
+                        <a:rPr lang="pt-BR" sz="2400" b="0" strike="noStrike" spc="-1" dirty="0">
                           <a:solidFill>
                             <a:srgbClr val="FFFFFF"/>
                           </a:solidFill>
@@ -10604,7 +10959,6 @@
                             <a:srgbClr val="FFFFFF"/>
                           </a:solidFill>
                         </a:uFill>
-                        <a:latin typeface="Arial"/>
                       </a:endParaRPr>
                     </a:p>
                   </a:txBody>
@@ -10645,7 +10999,7 @@
                         </a:lnSpc>
                       </a:pPr>
                       <a:r>
-                        <a:rPr lang="pt-BR" sz="2400" b="0" strike="noStrike" spc="-1">
+                        <a:rPr lang="pt-BR" sz="2400" b="0" strike="noStrike" spc="-1" dirty="0">
                           <a:solidFill>
                             <a:srgbClr val="FFFFFF"/>
                           </a:solidFill>
@@ -10667,7 +11021,6 @@
                             <a:srgbClr val="FFFFFF"/>
                           </a:solidFill>
                         </a:uFill>
-                        <a:latin typeface="Arial"/>
                       </a:endParaRPr>
                     </a:p>
                   </a:txBody>
@@ -10697,6 +11050,11 @@
                     </a:solidFill>
                   </a:tcPr>
                 </a:tc>
+                <a:extLst>
+                  <a:ext uri="{0D108BD9-81ED-4DB2-BD59-A6C34878D82A}">
+                    <a16:rowId xmlns:a16="http://schemas.microsoft.com/office/drawing/2014/main" val="10000"/>
+                  </a:ext>
+                </a:extLst>
               </a:tr>
               <a:tr h="725760">
                 <a:tc>
@@ -10710,7 +11068,440 @@
                         </a:lnSpc>
                       </a:pPr>
                       <a:r>
-                        <a:rPr lang="pt-BR" sz="1800" b="0" strike="noStrike" spc="-1">
+                        <a:rPr lang="pt-BR" sz="1800" b="0" strike="noStrike" spc="-1" dirty="0">
+                          <a:solidFill>
+                            <a:srgbClr val="000000"/>
+                          </a:solidFill>
+                          <a:uFill>
+                            <a:solidFill>
+                              <a:srgbClr val="FFFFFF"/>
+                            </a:solidFill>
+                          </a:uFill>
+                          <a:latin typeface="Calibri"/>
+                        </a:rPr>
+                        <a:t>Indisponibilidade do Cliente</a:t>
+                      </a:r>
+                      <a:endParaRPr lang="pt-BR" sz="1800" b="0" strike="noStrike" spc="-1">
+                        <a:solidFill>
+                          <a:srgbClr val="000000"/>
+                        </a:solidFill>
+                        <a:uFill>
+                          <a:solidFill>
+                            <a:srgbClr val="FFFFFF"/>
+                          </a:solidFill>
+                        </a:uFill>
+                      </a:endParaRPr>
+                    </a:p>
+                  </a:txBody>
+                  <a:tcPr>
+                    <a:lnL w="12240">
+                      <a:solidFill>
+                        <a:srgbClr val="FFFFFF"/>
+                      </a:solidFill>
+                    </a:lnL>
+                    <a:lnR w="12240">
+                      <a:solidFill>
+                        <a:srgbClr val="FFFFFF"/>
+                      </a:solidFill>
+                    </a:lnR>
+                    <a:lnT w="38160" cap="flat" cmpd="sng" algn="ctr">
+                      <a:solidFill>
+                        <a:srgbClr val="FFFFFF"/>
+                      </a:solidFill>
+                      <a:prstDash val="solid"/>
+                      <a:round/>
+                      <a:headEnd type="none" w="med" len="med"/>
+                      <a:tailEnd type="none" w="med" len="med"/>
+                    </a:lnT>
+                    <a:lnB w="12240">
+                      <a:solidFill>
+                        <a:srgbClr val="FFFFFF"/>
+                      </a:solidFill>
+                    </a:lnB>
+                    <a:solidFill>
+                      <a:srgbClr val="E7E7E7"/>
+                    </a:solidFill>
+                  </a:tcPr>
+                </a:tc>
+                <a:tc>
+                  <a:txBody>
+                    <a:bodyPr/>
+                    <a:lstStyle/>
+                    <a:p>
+                      <a:pPr>
+                        <a:lnSpc>
+                          <a:spcPct val="100000"/>
+                        </a:lnSpc>
+                      </a:pPr>
+                      <a:r>
+                        <a:rPr lang="pt-BR" sz="1800" b="0" strike="noStrike" spc="-1" dirty="0">
+                          <a:solidFill>
+                            <a:srgbClr val="000000"/>
+                          </a:solidFill>
+                          <a:uFill>
+                            <a:solidFill>
+                              <a:srgbClr val="FFFFFF"/>
+                            </a:solidFill>
+                          </a:uFill>
+                          <a:latin typeface="Calibri"/>
+                        </a:rPr>
+                        <a:t>Negativo</a:t>
+                      </a:r>
+                    </a:p>
+                  </a:txBody>
+                  <a:tcPr>
+                    <a:lnL w="12240">
+                      <a:solidFill>
+                        <a:srgbClr val="FFFFFF"/>
+                      </a:solidFill>
+                    </a:lnL>
+                    <a:lnR w="12240">
+                      <a:solidFill>
+                        <a:srgbClr val="FFFFFF"/>
+                      </a:solidFill>
+                    </a:lnR>
+                    <a:lnT w="38160" cap="flat" cmpd="sng" algn="ctr">
+                      <a:solidFill>
+                        <a:srgbClr val="FFFFFF"/>
+                      </a:solidFill>
+                      <a:prstDash val="solid"/>
+                      <a:round/>
+                      <a:headEnd type="none" w="med" len="med"/>
+                      <a:tailEnd type="none" w="med" len="med"/>
+                    </a:lnT>
+                    <a:lnB w="12240">
+                      <a:solidFill>
+                        <a:srgbClr val="FFFFFF"/>
+                      </a:solidFill>
+                    </a:lnB>
+                    <a:solidFill>
+                      <a:srgbClr val="E7E7E7"/>
+                    </a:solidFill>
+                  </a:tcPr>
+                </a:tc>
+                <a:extLst>
+                  <a:ext uri="{0D108BD9-81ED-4DB2-BD59-A6C34878D82A}">
+                    <a16:rowId xmlns:a16="http://schemas.microsoft.com/office/drawing/2014/main" val="10001"/>
+                  </a:ext>
+                </a:extLst>
+              </a:tr>
+              <a:tr h="725760">
+                <a:tc>
+                  <a:txBody>
+                    <a:bodyPr/>
+                    <a:lstStyle/>
+                    <a:p>
+                      <a:pPr>
+                        <a:lnSpc>
+                          <a:spcPct val="100000"/>
+                        </a:lnSpc>
+                      </a:pPr>
+                      <a:r>
+                        <a:rPr lang="pt-BR" sz="1800" b="0" strike="noStrike" spc="-1" dirty="0">
+                          <a:solidFill>
+                            <a:srgbClr val="000000"/>
+                          </a:solidFill>
+                          <a:uFill>
+                            <a:solidFill>
+                              <a:srgbClr val="FFFFFF"/>
+                            </a:solidFill>
+                          </a:uFill>
+                          <a:latin typeface="Calibri"/>
+                        </a:rPr>
+                        <a:t>Mudança de Requisitos</a:t>
+                      </a:r>
+                      <a:endParaRPr lang="pt-BR" sz="1800" b="0" strike="noStrike" spc="-1">
+                        <a:solidFill>
+                          <a:srgbClr val="000000"/>
+                        </a:solidFill>
+                        <a:uFill>
+                          <a:solidFill>
+                            <a:srgbClr val="FFFFFF"/>
+                          </a:solidFill>
+                        </a:uFill>
+                      </a:endParaRPr>
+                    </a:p>
+                  </a:txBody>
+                  <a:tcPr>
+                    <a:lnL w="12240">
+                      <a:solidFill>
+                        <a:srgbClr val="FFFFFF"/>
+                      </a:solidFill>
+                    </a:lnL>
+                    <a:lnR w="12240">
+                      <a:solidFill>
+                        <a:srgbClr val="FFFFFF"/>
+                      </a:solidFill>
+                    </a:lnR>
+                    <a:lnT w="12240">
+                      <a:solidFill>
+                        <a:srgbClr val="FFFFFF"/>
+                      </a:solidFill>
+                    </a:lnT>
+                    <a:lnB w="12240">
+                      <a:solidFill>
+                        <a:srgbClr val="FFFFFF"/>
+                      </a:solidFill>
+                    </a:lnB>
+                    <a:solidFill>
+                      <a:srgbClr val="E7E7E7"/>
+                    </a:solidFill>
+                  </a:tcPr>
+                </a:tc>
+                <a:tc>
+                  <a:txBody>
+                    <a:bodyPr/>
+                    <a:lstStyle/>
+                    <a:p>
+                      <a:pPr>
+                        <a:lnSpc>
+                          <a:spcPct val="100000"/>
+                        </a:lnSpc>
+                      </a:pPr>
+                      <a:r>
+                        <a:rPr lang="pt-BR" sz="1800" b="0" strike="noStrike" spc="-1" dirty="0">
+                          <a:solidFill>
+                            <a:srgbClr val="000000"/>
+                          </a:solidFill>
+                          <a:uFill>
+                            <a:solidFill>
+                              <a:srgbClr val="FFFFFF"/>
+                            </a:solidFill>
+                          </a:uFill>
+                          <a:latin typeface="Calibri"/>
+                        </a:rPr>
+                        <a:t>Negativo</a:t>
+                      </a:r>
+                    </a:p>
+                  </a:txBody>
+                  <a:tcPr>
+                    <a:lnL w="12240">
+                      <a:solidFill>
+                        <a:srgbClr val="FFFFFF"/>
+                      </a:solidFill>
+                    </a:lnL>
+                    <a:lnR w="12240">
+                      <a:solidFill>
+                        <a:srgbClr val="FFFFFF"/>
+                      </a:solidFill>
+                    </a:lnR>
+                    <a:lnT w="12240">
+                      <a:solidFill>
+                        <a:srgbClr val="FFFFFF"/>
+                      </a:solidFill>
+                    </a:lnT>
+                    <a:lnB w="12240">
+                      <a:solidFill>
+                        <a:srgbClr val="FFFFFF"/>
+                      </a:solidFill>
+                    </a:lnB>
+                    <a:solidFill>
+                      <a:srgbClr val="E7E7E7"/>
+                    </a:solidFill>
+                  </a:tcPr>
+                </a:tc>
+                <a:extLst>
+                  <a:ext uri="{0D108BD9-81ED-4DB2-BD59-A6C34878D82A}">
+                    <a16:rowId xmlns:a16="http://schemas.microsoft.com/office/drawing/2014/main" val="10002"/>
+                  </a:ext>
+                </a:extLst>
+              </a:tr>
+              <a:tr h="725760">
+                <a:tc>
+                  <a:txBody>
+                    <a:bodyPr/>
+                    <a:lstStyle/>
+                    <a:p>
+                      <a:pPr>
+                        <a:lnSpc>
+                          <a:spcPct val="100000"/>
+                        </a:lnSpc>
+                      </a:pPr>
+                      <a:r>
+                        <a:rPr lang="pt-BR" sz="1800" b="0" strike="noStrike" spc="-1" dirty="0">
+                          <a:solidFill>
+                            <a:srgbClr val="000000"/>
+                          </a:solidFill>
+                          <a:uFill>
+                            <a:solidFill>
+                              <a:srgbClr val="FFFFFF"/>
+                            </a:solidFill>
+                          </a:uFill>
+                          <a:latin typeface="Calibri"/>
+                        </a:rPr>
+                        <a:t>Capacidade técnica da equipe insuficiente para conclusão do projeto</a:t>
+                      </a:r>
+                      <a:endParaRPr lang="pt-BR" sz="1800" b="0" strike="noStrike" spc="-1">
+                        <a:solidFill>
+                          <a:srgbClr val="000000"/>
+                        </a:solidFill>
+                        <a:uFill>
+                          <a:solidFill>
+                            <a:srgbClr val="FFFFFF"/>
+                          </a:solidFill>
+                        </a:uFill>
+                      </a:endParaRPr>
+                    </a:p>
+                  </a:txBody>
+                  <a:tcPr>
+                    <a:lnL w="12240">
+                      <a:solidFill>
+                        <a:srgbClr val="FFFFFF"/>
+                      </a:solidFill>
+                    </a:lnL>
+                    <a:lnR w="12240">
+                      <a:solidFill>
+                        <a:srgbClr val="FFFFFF"/>
+                      </a:solidFill>
+                    </a:lnR>
+                    <a:lnT w="12240">
+                      <a:solidFill>
+                        <a:srgbClr val="FFFFFF"/>
+                      </a:solidFill>
+                    </a:lnT>
+                    <a:lnB w="12240">
+                      <a:solidFill>
+                        <a:srgbClr val="FFFFFF"/>
+                      </a:solidFill>
+                    </a:lnB>
+                    <a:solidFill>
+                      <a:srgbClr val="E7E7E7"/>
+                    </a:solidFill>
+                  </a:tcPr>
+                </a:tc>
+                <a:tc>
+                  <a:txBody>
+                    <a:bodyPr/>
+                    <a:lstStyle/>
+                    <a:p>
+                      <a:pPr>
+                        <a:lnSpc>
+                          <a:spcPct val="100000"/>
+                        </a:lnSpc>
+                      </a:pPr>
+                      <a:r>
+                        <a:rPr lang="pt-BR" sz="1800" b="0" strike="noStrike" spc="-1" dirty="0">
+                          <a:solidFill>
+                            <a:srgbClr val="000000"/>
+                          </a:solidFill>
+                          <a:uFill>
+                            <a:solidFill>
+                              <a:srgbClr val="FFFFFF"/>
+                            </a:solidFill>
+                          </a:uFill>
+                          <a:latin typeface="Calibri"/>
+                        </a:rPr>
+                        <a:t>Negativo</a:t>
+                      </a:r>
+                    </a:p>
+                  </a:txBody>
+                  <a:tcPr>
+                    <a:lnL w="12240">
+                      <a:solidFill>
+                        <a:srgbClr val="FFFFFF"/>
+                      </a:solidFill>
+                    </a:lnL>
+                    <a:lnR w="12240">
+                      <a:solidFill>
+                        <a:srgbClr val="FFFFFF"/>
+                      </a:solidFill>
+                    </a:lnR>
+                    <a:lnT w="12240">
+                      <a:solidFill>
+                        <a:srgbClr val="FFFFFF"/>
+                      </a:solidFill>
+                    </a:lnT>
+                    <a:lnB w="12240">
+                      <a:solidFill>
+                        <a:srgbClr val="FFFFFF"/>
+                      </a:solidFill>
+                    </a:lnB>
+                    <a:solidFill>
+                      <a:srgbClr val="E7E7E7"/>
+                    </a:solidFill>
+                  </a:tcPr>
+                </a:tc>
+                <a:extLst>
+                  <a:ext uri="{0D108BD9-81ED-4DB2-BD59-A6C34878D82A}">
+                    <a16:rowId xmlns:a16="http://schemas.microsoft.com/office/drawing/2014/main" val="10003"/>
+                  </a:ext>
+                </a:extLst>
+              </a:tr>
+              <a:tr h="725760">
+                <a:tc>
+                  <a:txBody>
+                    <a:bodyPr/>
+                    <a:lstStyle/>
+                    <a:p>
+                      <a:pPr>
+                        <a:lnSpc>
+                          <a:spcPct val="100000"/>
+                        </a:lnSpc>
+                      </a:pPr>
+                      <a:r>
+                        <a:rPr lang="pt-BR" sz="1800" b="0" strike="noStrike" spc="-1" dirty="0">
+                          <a:solidFill>
+                            <a:srgbClr val="000000"/>
+                          </a:solidFill>
+                          <a:uFill>
+                            <a:solidFill>
+                              <a:srgbClr val="FFFFFF"/>
+                            </a:solidFill>
+                          </a:uFill>
+                          <a:latin typeface="Calibri"/>
+                        </a:rPr>
+                        <a:t>Afastamento de Membro de Equipe</a:t>
+                      </a:r>
+                      <a:endParaRPr lang="pt-BR" sz="1800" b="0" strike="noStrike" spc="-1">
+                        <a:solidFill>
+                          <a:srgbClr val="000000"/>
+                        </a:solidFill>
+                        <a:uFill>
+                          <a:solidFill>
+                            <a:srgbClr val="FFFFFF"/>
+                          </a:solidFill>
+                        </a:uFill>
+                      </a:endParaRPr>
+                    </a:p>
+                  </a:txBody>
+                  <a:tcPr>
+                    <a:lnL w="12240">
+                      <a:solidFill>
+                        <a:srgbClr val="FFFFFF"/>
+                      </a:solidFill>
+                    </a:lnL>
+                    <a:lnR w="12240">
+                      <a:solidFill>
+                        <a:srgbClr val="FFFFFF"/>
+                      </a:solidFill>
+                    </a:lnR>
+                    <a:lnT w="12240">
+                      <a:solidFill>
+                        <a:srgbClr val="FFFFFF"/>
+                      </a:solidFill>
+                    </a:lnT>
+                    <a:lnB w="12240">
+                      <a:solidFill>
+                        <a:srgbClr val="FFFFFF"/>
+                      </a:solidFill>
+                    </a:lnB>
+                    <a:solidFill>
+                      <a:srgbClr val="E7E7E7"/>
+                    </a:solidFill>
+                  </a:tcPr>
+                </a:tc>
+                <a:tc>
+                  <a:txBody>
+                    <a:bodyPr/>
+                    <a:lstStyle/>
+                    <a:p>
+                      <a:pPr>
+                        <a:lnSpc>
+                          <a:spcPct val="100000"/>
+                        </a:lnSpc>
+                      </a:pPr>
+                      <a:r>
+                        <a:rPr lang="pt-BR" sz="1800" b="0" strike="noStrike" spc="-1" dirty="0">
                           <a:solidFill>
                             <a:srgbClr val="000000"/>
                           </a:solidFill>
@@ -10732,7 +11523,6 @@
                             <a:srgbClr val="FFFFFF"/>
                           </a:solidFill>
                         </a:uFill>
-                        <a:latin typeface="Arial"/>
                       </a:endParaRPr>
                     </a:p>
                   </a:txBody>
@@ -10747,14 +11537,79 @@
                         <a:srgbClr val="FFFFFF"/>
                       </a:solidFill>
                     </a:lnR>
-                    <a:lnT w="38160" cap="flat" cmpd="sng" algn="ctr">
-                      <a:solidFill>
-                        <a:srgbClr val="FFFFFF"/>
-                      </a:solidFill>
-                      <a:prstDash val="solid"/>
-                      <a:round/>
-                      <a:headEnd type="none" w="med" len="med"/>
-                      <a:tailEnd type="none" w="med" len="med"/>
+                    <a:lnT w="12240">
+                      <a:solidFill>
+                        <a:srgbClr val="FFFFFF"/>
+                      </a:solidFill>
+                    </a:lnT>
+                    <a:lnB w="12240">
+                      <a:solidFill>
+                        <a:srgbClr val="FFFFFF"/>
+                      </a:solidFill>
+                    </a:lnB>
+                    <a:solidFill>
+                      <a:srgbClr val="E7E7E7"/>
+                    </a:solidFill>
+                  </a:tcPr>
+                </a:tc>
+                <a:extLst>
+                  <a:ext uri="{0D108BD9-81ED-4DB2-BD59-A6C34878D82A}">
+                    <a16:rowId xmlns:a16="http://schemas.microsoft.com/office/drawing/2014/main" val="10004"/>
+                  </a:ext>
+                </a:extLst>
+              </a:tr>
+              <a:tr h="725760">
+                <a:tc>
+                  <a:txBody>
+                    <a:bodyPr/>
+                    <a:lstStyle/>
+                    <a:p>
+                      <a:pPr>
+                        <a:lnSpc>
+                          <a:spcPct val="100000"/>
+                        </a:lnSpc>
+                      </a:pPr>
+                      <a:r>
+                        <a:rPr lang="pt-BR" sz="1800" b="0" strike="noStrike" spc="-1" dirty="0">
+                          <a:solidFill>
+                            <a:srgbClr val="000000"/>
+                          </a:solidFill>
+                          <a:uFill>
+                            <a:solidFill>
+                              <a:srgbClr val="FFFFFF"/>
+                            </a:solidFill>
+                          </a:uFill>
+                          <a:latin typeface="Calibri"/>
+                        </a:rPr>
+                        <a:t>Dificuldade de Comunicação entre Membros de Equipe</a:t>
+                      </a:r>
+                      <a:endParaRPr lang="pt-BR" sz="1800" b="0" strike="noStrike" spc="-1">
+                        <a:solidFill>
+                          <a:srgbClr val="000000"/>
+                        </a:solidFill>
+                        <a:uFill>
+                          <a:solidFill>
+                            <a:srgbClr val="FFFFFF"/>
+                          </a:solidFill>
+                        </a:uFill>
+                      </a:endParaRPr>
+                    </a:p>
+                  </a:txBody>
+                  <a:tcPr>
+                    <a:lnL w="12240">
+                      <a:solidFill>
+                        <a:srgbClr val="FFFFFF"/>
+                      </a:solidFill>
+                    </a:lnL>
+                    <a:lnR w="12240">
+                      <a:solidFill>
+                        <a:srgbClr val="FFFFFF"/>
+                      </a:solidFill>
+                    </a:lnR>
+                    <a:lnT w="12240">
+                      <a:solidFill>
+                        <a:srgbClr val="FFFFFF"/>
+                      </a:solidFill>
                     </a:lnT>
                     <a:lnB w="12240">
                       <a:solidFill>
@@ -10777,7 +11632,7 @@
                         </a:lnSpc>
                       </a:pPr>
                       <a:r>
-                        <a:rPr lang="pt-BR" sz="1800" b="0" strike="noStrike" spc="-1">
+                        <a:rPr lang="pt-BR" sz="1800" b="0" strike="noStrike" spc="-1" dirty="0">
                           <a:solidFill>
                             <a:srgbClr val="000000"/>
                           </a:solidFill>
@@ -10788,19 +11643,8 @@
                           </a:uFill>
                           <a:latin typeface="Calibri"/>
                         </a:rPr>
-                        <a:t>Indisponibilidade do Cliente</a:t>
+                        <a:t>Negativo</a:t>
                       </a:r>
-                      <a:endParaRPr lang="pt-BR" sz="1800" b="0" strike="noStrike" spc="-1">
-                        <a:solidFill>
-                          <a:srgbClr val="000000"/>
-                        </a:solidFill>
-                        <a:uFill>
-                          <a:solidFill>
-                            <a:srgbClr val="FFFFFF"/>
-                          </a:solidFill>
-                        </a:uFill>
-                        <a:latin typeface="Arial"/>
-                      </a:endParaRPr>
                     </a:p>
                   </a:txBody>
                   <a:tcPr>
@@ -10814,14 +11658,10 @@
                         <a:srgbClr val="FFFFFF"/>
                       </a:solidFill>
                     </a:lnR>
-                    <a:lnT w="38160" cap="flat" cmpd="sng" algn="ctr">
-                      <a:solidFill>
-                        <a:srgbClr val="FFFFFF"/>
-                      </a:solidFill>
-                      <a:prstDash val="solid"/>
-                      <a:round/>
-                      <a:headEnd type="none" w="med" len="med"/>
-                      <a:tailEnd type="none" w="med" len="med"/>
+                    <a:lnT w="12240">
+                      <a:solidFill>
+                        <a:srgbClr val="FFFFFF"/>
+                      </a:solidFill>
                     </a:lnT>
                     <a:lnB w="12240">
                       <a:solidFill>
@@ -10833,6 +11673,11 @@
                     </a:solidFill>
                   </a:tcPr>
                 </a:tc>
+                <a:extLst>
+                  <a:ext uri="{0D108BD9-81ED-4DB2-BD59-A6C34878D82A}">
+                    <a16:rowId xmlns:a16="http://schemas.microsoft.com/office/drawing/2014/main" val="10005"/>
+                  </a:ext>
+                </a:extLst>
               </a:tr>
               <a:tr h="725760">
                 <a:tc>
@@ -10846,7 +11691,69 @@
                         </a:lnSpc>
                       </a:pPr>
                       <a:r>
-                        <a:rPr lang="pt-BR" sz="1800" b="0" strike="noStrike" spc="-1">
+                        <a:rPr lang="pt-BR" sz="1800" b="0" strike="noStrike" spc="-1" dirty="0">
+                          <a:solidFill>
+                            <a:srgbClr val="000000"/>
+                          </a:solidFill>
+                          <a:uFill>
+                            <a:solidFill>
+                              <a:srgbClr val="FFFFFF"/>
+                            </a:solidFill>
+                          </a:uFill>
+                          <a:latin typeface="Calibri"/>
+                        </a:rPr>
+                        <a:t>Dificuldade no acesso a ferramentas utilizadas</a:t>
+                      </a:r>
+                      <a:endParaRPr lang="pt-BR" sz="1800" b="0" strike="noStrike" spc="-1">
+                        <a:solidFill>
+                          <a:srgbClr val="000000"/>
+                        </a:solidFill>
+                        <a:uFill>
+                          <a:solidFill>
+                            <a:srgbClr val="FFFFFF"/>
+                          </a:solidFill>
+                        </a:uFill>
+                      </a:endParaRPr>
+                    </a:p>
+                  </a:txBody>
+                  <a:tcPr>
+                    <a:lnL w="12240">
+                      <a:solidFill>
+                        <a:srgbClr val="FFFFFF"/>
+                      </a:solidFill>
+                    </a:lnL>
+                    <a:lnR w="12240">
+                      <a:solidFill>
+                        <a:srgbClr val="FFFFFF"/>
+                      </a:solidFill>
+                    </a:lnR>
+                    <a:lnT w="12240">
+                      <a:solidFill>
+                        <a:srgbClr val="FFFFFF"/>
+                      </a:solidFill>
+                    </a:lnT>
+                    <a:lnB w="12240">
+                      <a:solidFill>
+                        <a:srgbClr val="FFFFFF"/>
+                      </a:solidFill>
+                    </a:lnB>
+                    <a:solidFill>
+                      <a:srgbClr val="E7E7E7"/>
+                    </a:solidFill>
+                  </a:tcPr>
+                </a:tc>
+                <a:tc>
+                  <a:txBody>
+                    <a:bodyPr/>
+                    <a:lstStyle/>
+                    <a:p>
+                      <a:pPr>
+                        <a:lnSpc>
+                          <a:spcPct val="100000"/>
+                        </a:lnSpc>
+                      </a:pPr>
+                      <a:r>
+                        <a:rPr lang="pt-BR" sz="1800" b="0" strike="noStrike" spc="-1" dirty="0">
                           <a:solidFill>
                             <a:srgbClr val="000000"/>
                           </a:solidFill>
@@ -10868,7 +11775,6 @@
                             <a:srgbClr val="FFFFFF"/>
                           </a:solidFill>
                         </a:uFill>
-                        <a:latin typeface="Arial"/>
                       </a:endParaRPr>
                     </a:p>
                   </a:txBody>
@@ -10898,581 +11804,11 @@
                     </a:solidFill>
                   </a:tcPr>
                 </a:tc>
-                <a:tc>
-                  <a:txBody>
-                    <a:bodyPr/>
-                    <a:lstStyle/>
-                    <a:p>
-                      <a:pPr>
-                        <a:lnSpc>
-                          <a:spcPct val="100000"/>
-                        </a:lnSpc>
-                      </a:pPr>
-                      <a:r>
-                        <a:rPr lang="pt-BR" sz="1800" b="0" strike="noStrike" spc="-1">
-                          <a:solidFill>
-                            <a:srgbClr val="000000"/>
-                          </a:solidFill>
-                          <a:uFill>
-                            <a:solidFill>
-                              <a:srgbClr val="FFFFFF"/>
-                            </a:solidFill>
-                          </a:uFill>
-                          <a:latin typeface="Calibri"/>
-                        </a:rPr>
-                        <a:t>Mudança de Requisitos</a:t>
-                      </a:r>
-                      <a:endParaRPr lang="pt-BR" sz="1800" b="0" strike="noStrike" spc="-1">
-                        <a:solidFill>
-                          <a:srgbClr val="000000"/>
-                        </a:solidFill>
-                        <a:uFill>
-                          <a:solidFill>
-                            <a:srgbClr val="FFFFFF"/>
-                          </a:solidFill>
-                        </a:uFill>
-                        <a:latin typeface="Arial"/>
-                      </a:endParaRPr>
-                    </a:p>
-                  </a:txBody>
-                  <a:tcPr>
-                    <a:lnL w="12240">
-                      <a:solidFill>
-                        <a:srgbClr val="FFFFFF"/>
-                      </a:solidFill>
-                    </a:lnL>
-                    <a:lnR w="12240">
-                      <a:solidFill>
-                        <a:srgbClr val="FFFFFF"/>
-                      </a:solidFill>
-                    </a:lnR>
-                    <a:lnT w="12240">
-                      <a:solidFill>
-                        <a:srgbClr val="FFFFFF"/>
-                      </a:solidFill>
-                    </a:lnT>
-                    <a:lnB w="12240">
-                      <a:solidFill>
-                        <a:srgbClr val="FFFFFF"/>
-                      </a:solidFill>
-                    </a:lnB>
-                    <a:solidFill>
-                      <a:srgbClr val="E7E7E7"/>
-                    </a:solidFill>
-                  </a:tcPr>
-                </a:tc>
-              </a:tr>
-              <a:tr h="725760">
-                <a:tc>
-                  <a:txBody>
-                    <a:bodyPr/>
-                    <a:lstStyle/>
-                    <a:p>
-                      <a:pPr>
-                        <a:lnSpc>
-                          <a:spcPct val="100000"/>
-                        </a:lnSpc>
-                      </a:pPr>
-                      <a:r>
-                        <a:rPr lang="pt-BR" sz="1800" b="0" strike="noStrike" spc="-1">
-                          <a:solidFill>
-                            <a:srgbClr val="000000"/>
-                          </a:solidFill>
-                          <a:uFill>
-                            <a:solidFill>
-                              <a:srgbClr val="FFFFFF"/>
-                            </a:solidFill>
-                          </a:uFill>
-                          <a:latin typeface="Calibri"/>
-                        </a:rPr>
-                        <a:t>Negativo</a:t>
-                      </a:r>
-                      <a:endParaRPr lang="pt-BR" sz="1800" b="0" strike="noStrike" spc="-1">
-                        <a:solidFill>
-                          <a:srgbClr val="000000"/>
-                        </a:solidFill>
-                        <a:uFill>
-                          <a:solidFill>
-                            <a:srgbClr val="FFFFFF"/>
-                          </a:solidFill>
-                        </a:uFill>
-                        <a:latin typeface="Arial"/>
-                      </a:endParaRPr>
-                    </a:p>
-                  </a:txBody>
-                  <a:tcPr>
-                    <a:lnL w="12240">
-                      <a:solidFill>
-                        <a:srgbClr val="FFFFFF"/>
-                      </a:solidFill>
-                    </a:lnL>
-                    <a:lnR w="12240">
-                      <a:solidFill>
-                        <a:srgbClr val="FFFFFF"/>
-                      </a:solidFill>
-                    </a:lnR>
-                    <a:lnT w="12240">
-                      <a:solidFill>
-                        <a:srgbClr val="FFFFFF"/>
-                      </a:solidFill>
-                    </a:lnT>
-                    <a:lnB w="12240">
-                      <a:solidFill>
-                        <a:srgbClr val="FFFFFF"/>
-                      </a:solidFill>
-                    </a:lnB>
-                    <a:solidFill>
-                      <a:srgbClr val="E7E7E7"/>
-                    </a:solidFill>
-                  </a:tcPr>
-                </a:tc>
-                <a:tc>
-                  <a:txBody>
-                    <a:bodyPr/>
-                    <a:lstStyle/>
-                    <a:p>
-                      <a:pPr>
-                        <a:lnSpc>
-                          <a:spcPct val="100000"/>
-                        </a:lnSpc>
-                      </a:pPr>
-                      <a:r>
-                        <a:rPr lang="pt-BR" sz="1800" b="0" strike="noStrike" spc="-1">
-                          <a:solidFill>
-                            <a:srgbClr val="000000"/>
-                          </a:solidFill>
-                          <a:uFill>
-                            <a:solidFill>
-                              <a:srgbClr val="FFFFFF"/>
-                            </a:solidFill>
-                          </a:uFill>
-                          <a:latin typeface="Calibri"/>
-                        </a:rPr>
-                        <a:t>Capacidade técnica da equipe insuficiente para conclusão do projeto.</a:t>
-                      </a:r>
-                      <a:endParaRPr lang="pt-BR" sz="1800" b="0" strike="noStrike" spc="-1">
-                        <a:solidFill>
-                          <a:srgbClr val="000000"/>
-                        </a:solidFill>
-                        <a:uFill>
-                          <a:solidFill>
-                            <a:srgbClr val="FFFFFF"/>
-                          </a:solidFill>
-                        </a:uFill>
-                        <a:latin typeface="Arial"/>
-                      </a:endParaRPr>
-                    </a:p>
-                  </a:txBody>
-                  <a:tcPr>
-                    <a:lnL w="12240">
-                      <a:solidFill>
-                        <a:srgbClr val="FFFFFF"/>
-                      </a:solidFill>
-                    </a:lnL>
-                    <a:lnR w="12240">
-                      <a:solidFill>
-                        <a:srgbClr val="FFFFFF"/>
-                      </a:solidFill>
-                    </a:lnR>
-                    <a:lnT w="12240">
-                      <a:solidFill>
-                        <a:srgbClr val="FFFFFF"/>
-                      </a:solidFill>
-                    </a:lnT>
-                    <a:lnB w="12240">
-                      <a:solidFill>
-                        <a:srgbClr val="FFFFFF"/>
-                      </a:solidFill>
-                    </a:lnB>
-                    <a:solidFill>
-                      <a:srgbClr val="E7E7E7"/>
-                    </a:solidFill>
-                  </a:tcPr>
-                </a:tc>
-              </a:tr>
-              <a:tr h="725760">
-                <a:tc>
-                  <a:txBody>
-                    <a:bodyPr/>
-                    <a:lstStyle/>
-                    <a:p>
-                      <a:pPr>
-                        <a:lnSpc>
-                          <a:spcPct val="100000"/>
-                        </a:lnSpc>
-                      </a:pPr>
-                      <a:r>
-                        <a:rPr lang="pt-BR" sz="1800" b="0" strike="noStrike" spc="-1">
-                          <a:solidFill>
-                            <a:srgbClr val="000000"/>
-                          </a:solidFill>
-                          <a:uFill>
-                            <a:solidFill>
-                              <a:srgbClr val="FFFFFF"/>
-                            </a:solidFill>
-                          </a:uFill>
-                          <a:latin typeface="Calibri"/>
-                        </a:rPr>
-                        <a:t>Negativo</a:t>
-                      </a:r>
-                      <a:endParaRPr lang="pt-BR" sz="1800" b="0" strike="noStrike" spc="-1">
-                        <a:solidFill>
-                          <a:srgbClr val="000000"/>
-                        </a:solidFill>
-                        <a:uFill>
-                          <a:solidFill>
-                            <a:srgbClr val="FFFFFF"/>
-                          </a:solidFill>
-                        </a:uFill>
-                        <a:latin typeface="Arial"/>
-                      </a:endParaRPr>
-                    </a:p>
-                  </a:txBody>
-                  <a:tcPr>
-                    <a:lnL w="12240">
-                      <a:solidFill>
-                        <a:srgbClr val="FFFFFF"/>
-                      </a:solidFill>
-                    </a:lnL>
-                    <a:lnR w="12240">
-                      <a:solidFill>
-                        <a:srgbClr val="FFFFFF"/>
-                      </a:solidFill>
-                    </a:lnR>
-                    <a:lnT w="12240">
-                      <a:solidFill>
-                        <a:srgbClr val="FFFFFF"/>
-                      </a:solidFill>
-                    </a:lnT>
-                    <a:lnB w="12240">
-                      <a:solidFill>
-                        <a:srgbClr val="FFFFFF"/>
-                      </a:solidFill>
-                    </a:lnB>
-                    <a:solidFill>
-                      <a:srgbClr val="E7E7E7"/>
-                    </a:solidFill>
-                  </a:tcPr>
-                </a:tc>
-                <a:tc>
-                  <a:txBody>
-                    <a:bodyPr/>
-                    <a:lstStyle/>
-                    <a:p>
-                      <a:pPr>
-                        <a:lnSpc>
-                          <a:spcPct val="100000"/>
-                        </a:lnSpc>
-                      </a:pPr>
-                      <a:r>
-                        <a:rPr lang="pt-BR" sz="1800" b="0" strike="noStrike" spc="-1">
-                          <a:solidFill>
-                            <a:srgbClr val="000000"/>
-                          </a:solidFill>
-                          <a:uFill>
-                            <a:solidFill>
-                              <a:srgbClr val="FFFFFF"/>
-                            </a:solidFill>
-                          </a:uFill>
-                          <a:latin typeface="Calibri"/>
-                        </a:rPr>
-                        <a:t>Afastamento de Membro de Equipe.</a:t>
-                      </a:r>
-                      <a:endParaRPr lang="pt-BR" sz="1800" b="0" strike="noStrike" spc="-1">
-                        <a:solidFill>
-                          <a:srgbClr val="000000"/>
-                        </a:solidFill>
-                        <a:uFill>
-                          <a:solidFill>
-                            <a:srgbClr val="FFFFFF"/>
-                          </a:solidFill>
-                        </a:uFill>
-                        <a:latin typeface="Arial"/>
-                      </a:endParaRPr>
-                    </a:p>
-                  </a:txBody>
-                  <a:tcPr>
-                    <a:lnL w="12240">
-                      <a:solidFill>
-                        <a:srgbClr val="FFFFFF"/>
-                      </a:solidFill>
-                    </a:lnL>
-                    <a:lnR w="12240">
-                      <a:solidFill>
-                        <a:srgbClr val="FFFFFF"/>
-                      </a:solidFill>
-                    </a:lnR>
-                    <a:lnT w="12240">
-                      <a:solidFill>
-                        <a:srgbClr val="FFFFFF"/>
-                      </a:solidFill>
-                    </a:lnT>
-                    <a:lnB w="12240">
-                      <a:solidFill>
-                        <a:srgbClr val="FFFFFF"/>
-                      </a:solidFill>
-                    </a:lnB>
-                    <a:solidFill>
-                      <a:srgbClr val="E7E7E7"/>
-                    </a:solidFill>
-                  </a:tcPr>
-                </a:tc>
-              </a:tr>
-              <a:tr h="725760">
-                <a:tc>
-                  <a:txBody>
-                    <a:bodyPr/>
-                    <a:lstStyle/>
-                    <a:p>
-                      <a:pPr>
-                        <a:lnSpc>
-                          <a:spcPct val="100000"/>
-                        </a:lnSpc>
-                      </a:pPr>
-                      <a:r>
-                        <a:rPr lang="pt-BR" sz="1800" b="0" strike="noStrike" spc="-1">
-                          <a:solidFill>
-                            <a:srgbClr val="000000"/>
-                          </a:solidFill>
-                          <a:uFill>
-                            <a:solidFill>
-                              <a:srgbClr val="FFFFFF"/>
-                            </a:solidFill>
-                          </a:uFill>
-                          <a:latin typeface="Calibri"/>
-                        </a:rPr>
-                        <a:t>Negativo</a:t>
-                      </a:r>
-                      <a:endParaRPr lang="pt-BR" sz="1800" b="0" strike="noStrike" spc="-1">
-                        <a:solidFill>
-                          <a:srgbClr val="000000"/>
-                        </a:solidFill>
-                        <a:uFill>
-                          <a:solidFill>
-                            <a:srgbClr val="FFFFFF"/>
-                          </a:solidFill>
-                        </a:uFill>
-                        <a:latin typeface="Arial"/>
-                      </a:endParaRPr>
-                    </a:p>
-                  </a:txBody>
-                  <a:tcPr>
-                    <a:lnL w="12240">
-                      <a:solidFill>
-                        <a:srgbClr val="FFFFFF"/>
-                      </a:solidFill>
-                    </a:lnL>
-                    <a:lnR w="12240">
-                      <a:solidFill>
-                        <a:srgbClr val="FFFFFF"/>
-                      </a:solidFill>
-                    </a:lnR>
-                    <a:lnT w="12240">
-                      <a:solidFill>
-                        <a:srgbClr val="FFFFFF"/>
-                      </a:solidFill>
-                    </a:lnT>
-                    <a:lnB w="12240">
-                      <a:solidFill>
-                        <a:srgbClr val="FFFFFF"/>
-                      </a:solidFill>
-                    </a:lnB>
-                    <a:solidFill>
-                      <a:srgbClr val="E7E7E7"/>
-                    </a:solidFill>
-                  </a:tcPr>
-                </a:tc>
-                <a:tc>
-                  <a:txBody>
-                    <a:bodyPr/>
-                    <a:lstStyle/>
-                    <a:p>
-                      <a:pPr>
-                        <a:lnSpc>
-                          <a:spcPct val="100000"/>
-                        </a:lnSpc>
-                      </a:pPr>
-                      <a:r>
-                        <a:rPr lang="pt-BR" sz="1800" b="0" strike="noStrike" spc="-1">
-                          <a:solidFill>
-                            <a:srgbClr val="000000"/>
-                          </a:solidFill>
-                          <a:uFill>
-                            <a:solidFill>
-                              <a:srgbClr val="FFFFFF"/>
-                            </a:solidFill>
-                          </a:uFill>
-                          <a:latin typeface="Calibri"/>
-                        </a:rPr>
-                        <a:t>Dificuldade de Comunicação entre Membros de Equipe</a:t>
-                      </a:r>
-                      <a:endParaRPr lang="pt-BR" sz="1800" b="0" strike="noStrike" spc="-1">
-                        <a:solidFill>
-                          <a:srgbClr val="000000"/>
-                        </a:solidFill>
-                        <a:uFill>
-                          <a:solidFill>
-                            <a:srgbClr val="FFFFFF"/>
-                          </a:solidFill>
-                        </a:uFill>
-                        <a:latin typeface="Arial"/>
-                      </a:endParaRPr>
-                    </a:p>
-                  </a:txBody>
-                  <a:tcPr>
-                    <a:lnL w="12240">
-                      <a:solidFill>
-                        <a:srgbClr val="FFFFFF"/>
-                      </a:solidFill>
-                    </a:lnL>
-                    <a:lnR w="12240">
-                      <a:solidFill>
-                        <a:srgbClr val="FFFFFF"/>
-                      </a:solidFill>
-                    </a:lnR>
-                    <a:lnT w="12240">
-                      <a:solidFill>
-                        <a:srgbClr val="FFFFFF"/>
-                      </a:solidFill>
-                    </a:lnT>
-                    <a:lnB w="12240">
-                      <a:solidFill>
-                        <a:srgbClr val="FFFFFF"/>
-                      </a:solidFill>
-                    </a:lnB>
-                    <a:solidFill>
-                      <a:srgbClr val="E7E7E7"/>
-                    </a:solidFill>
-                  </a:tcPr>
-                </a:tc>
-              </a:tr>
-              <a:tr h="725760">
-                <a:tc>
-                  <a:txBody>
-                    <a:bodyPr/>
-                    <a:lstStyle/>
-                    <a:p>
-                      <a:pPr>
-                        <a:lnSpc>
-                          <a:spcPct val="100000"/>
-                        </a:lnSpc>
-                      </a:pPr>
-                      <a:r>
-                        <a:rPr lang="pt-BR" sz="1800" b="0" strike="noStrike" spc="-1">
-                          <a:solidFill>
-                            <a:srgbClr val="000000"/>
-                          </a:solidFill>
-                          <a:uFill>
-                            <a:solidFill>
-                              <a:srgbClr val="FFFFFF"/>
-                            </a:solidFill>
-                          </a:uFill>
-                          <a:latin typeface="Calibri"/>
-                        </a:rPr>
-                        <a:t>Negativo</a:t>
-                      </a:r>
-                      <a:endParaRPr lang="pt-BR" sz="1800" b="0" strike="noStrike" spc="-1">
-                        <a:solidFill>
-                          <a:srgbClr val="000000"/>
-                        </a:solidFill>
-                        <a:uFill>
-                          <a:solidFill>
-                            <a:srgbClr val="FFFFFF"/>
-                          </a:solidFill>
-                        </a:uFill>
-                        <a:latin typeface="Arial"/>
-                      </a:endParaRPr>
-                    </a:p>
-                  </a:txBody>
-                  <a:tcPr>
-                    <a:lnL w="12240">
-                      <a:solidFill>
-                        <a:srgbClr val="FFFFFF"/>
-                      </a:solidFill>
-                    </a:lnL>
-                    <a:lnR w="12240">
-                      <a:solidFill>
-                        <a:srgbClr val="FFFFFF"/>
-                      </a:solidFill>
-                    </a:lnR>
-                    <a:lnT w="12240">
-                      <a:solidFill>
-                        <a:srgbClr val="FFFFFF"/>
-                      </a:solidFill>
-                    </a:lnT>
-                    <a:lnB w="12240">
-                      <a:solidFill>
-                        <a:srgbClr val="FFFFFF"/>
-                      </a:solidFill>
-                    </a:lnB>
-                    <a:solidFill>
-                      <a:srgbClr val="E7E7E7"/>
-                    </a:solidFill>
-                  </a:tcPr>
-                </a:tc>
-                <a:tc>
-                  <a:txBody>
-                    <a:bodyPr/>
-                    <a:lstStyle/>
-                    <a:p>
-                      <a:pPr>
-                        <a:lnSpc>
-                          <a:spcPct val="100000"/>
-                        </a:lnSpc>
-                      </a:pPr>
-                      <a:r>
-                        <a:rPr lang="pt-BR" sz="1800" b="0" strike="noStrike" spc="-1">
-                          <a:solidFill>
-                            <a:srgbClr val="000000"/>
-                          </a:solidFill>
-                          <a:uFill>
-                            <a:solidFill>
-                              <a:srgbClr val="FFFFFF"/>
-                            </a:solidFill>
-                          </a:uFill>
-                          <a:latin typeface="Calibri"/>
-                        </a:rPr>
-                        <a:t>Dificuldade no acesso a ferramentas utilizadas</a:t>
-                      </a:r>
-                      <a:endParaRPr lang="pt-BR" sz="1800" b="0" strike="noStrike" spc="-1">
-                        <a:solidFill>
-                          <a:srgbClr val="000000"/>
-                        </a:solidFill>
-                        <a:uFill>
-                          <a:solidFill>
-                            <a:srgbClr val="FFFFFF"/>
-                          </a:solidFill>
-                        </a:uFill>
-                        <a:latin typeface="Arial"/>
-                      </a:endParaRPr>
-                    </a:p>
-                  </a:txBody>
-                  <a:tcPr>
-                    <a:lnL w="12240">
-                      <a:solidFill>
-                        <a:srgbClr val="FFFFFF"/>
-                      </a:solidFill>
-                    </a:lnL>
-                    <a:lnR w="12240">
-                      <a:solidFill>
-                        <a:srgbClr val="FFFFFF"/>
-                      </a:solidFill>
-                    </a:lnR>
-                    <a:lnT w="12240">
-                      <a:solidFill>
-                        <a:srgbClr val="FFFFFF"/>
-                      </a:solidFill>
-                    </a:lnT>
-                    <a:lnB w="12240">
-                      <a:solidFill>
-                        <a:srgbClr val="FFFFFF"/>
-                      </a:solidFill>
-                    </a:lnB>
-                    <a:solidFill>
-                      <a:srgbClr val="E7E7E7"/>
-                    </a:solidFill>
-                  </a:tcPr>
-                </a:tc>
+                <a:extLst>
+                  <a:ext uri="{0D108BD9-81ED-4DB2-BD59-A6C34878D82A}">
+                    <a16:rowId xmlns:a16="http://schemas.microsoft.com/office/drawing/2014/main" val="10006"/>
+                  </a:ext>
+                </a:extLst>
               </a:tr>
             </a:tbl>
           </a:graphicData>
@@ -13537,8 +13873,20 @@
             <a:tbl>
               <a:tblPr/>
               <a:tblGrid>
-                <a:gridCol w="4114800"/>
-                <a:gridCol w="4114800"/>
+                <a:gridCol w="4114800">
+                  <a:extLst>
+                    <a:ext uri="{9D8B030D-6E8A-4147-A177-3AD203B41FA5}">
+                      <a16:colId xmlns:a16="http://schemas.microsoft.com/office/drawing/2014/main" val="20000"/>
+                    </a:ext>
+                  </a:extLst>
+                </a:gridCol>
+                <a:gridCol w="4114800">
+                  <a:extLst>
+                    <a:ext uri="{9D8B030D-6E8A-4147-A177-3AD203B41FA5}">
+                      <a16:colId xmlns:a16="http://schemas.microsoft.com/office/drawing/2014/main" val="20001"/>
+                    </a:ext>
+                  </a:extLst>
+                </a:gridCol>
               </a:tblGrid>
               <a:tr h="725760">
                 <a:tc>
@@ -13667,6 +14015,11 @@
                     </a:solidFill>
                   </a:tcPr>
                 </a:tc>
+                <a:extLst>
+                  <a:ext uri="{0D108BD9-81ED-4DB2-BD59-A6C34878D82A}">
+                    <a16:rowId xmlns:a16="http://schemas.microsoft.com/office/drawing/2014/main" val="10000"/>
+                  </a:ext>
+                </a:extLst>
               </a:tr>
               <a:tr h="725760">
                 <a:tc>
@@ -13803,6 +14156,11 @@
                     </a:solidFill>
                   </a:tcPr>
                 </a:tc>
+                <a:extLst>
+                  <a:ext uri="{0D108BD9-81ED-4DB2-BD59-A6C34878D82A}">
+                    <a16:rowId xmlns:a16="http://schemas.microsoft.com/office/drawing/2014/main" val="10001"/>
+                  </a:ext>
+                </a:extLst>
               </a:tr>
               <a:tr h="725760">
                 <a:tc>
@@ -13931,6 +14289,11 @@
                     </a:solidFill>
                   </a:tcPr>
                 </a:tc>
+                <a:extLst>
+                  <a:ext uri="{0D108BD9-81ED-4DB2-BD59-A6C34878D82A}">
+                    <a16:rowId xmlns:a16="http://schemas.microsoft.com/office/drawing/2014/main" val="10002"/>
+                  </a:ext>
+                </a:extLst>
               </a:tr>
               <a:tr h="725760">
                 <a:tc>
@@ -14059,6 +14422,11 @@
                     </a:solidFill>
                   </a:tcPr>
                 </a:tc>
+                <a:extLst>
+                  <a:ext uri="{0D108BD9-81ED-4DB2-BD59-A6C34878D82A}">
+                    <a16:rowId xmlns:a16="http://schemas.microsoft.com/office/drawing/2014/main" val="10003"/>
+                  </a:ext>
+                </a:extLst>
               </a:tr>
               <a:tr h="725760">
                 <a:tc>
@@ -14187,6 +14555,11 @@
                     </a:solidFill>
                   </a:tcPr>
                 </a:tc>
+                <a:extLst>
+                  <a:ext uri="{0D108BD9-81ED-4DB2-BD59-A6C34878D82A}">
+                    <a16:rowId xmlns:a16="http://schemas.microsoft.com/office/drawing/2014/main" val="10004"/>
+                  </a:ext>
+                </a:extLst>
               </a:tr>
               <a:tr h="725760">
                 <a:tc>
@@ -14315,6 +14688,11 @@
                     </a:solidFill>
                   </a:tcPr>
                 </a:tc>
+                <a:extLst>
+                  <a:ext uri="{0D108BD9-81ED-4DB2-BD59-A6C34878D82A}">
+                    <a16:rowId xmlns:a16="http://schemas.microsoft.com/office/drawing/2014/main" val="10005"/>
+                  </a:ext>
+                </a:extLst>
               </a:tr>
               <a:tr h="725760">
                 <a:tc>
@@ -14433,6 +14811,11 @@
                     </a:solidFill>
                   </a:tcPr>
                 </a:tc>
+                <a:extLst>
+                  <a:ext uri="{0D108BD9-81ED-4DB2-BD59-A6C34878D82A}">
+                    <a16:rowId xmlns:a16="http://schemas.microsoft.com/office/drawing/2014/main" val="10006"/>
+                  </a:ext>
+                </a:extLst>
               </a:tr>
             </a:tbl>
           </a:graphicData>
@@ -15146,4 +15529,299 @@
   <a:objectDefaults/>
   <a:extraClrSchemeLst/>
 </a:theme>
+</file>
+
+<file path=ppt/theme/theme4.xml><?xml version="1.0" encoding="utf-8"?>
+<a:theme xmlns:a="http://schemas.openxmlformats.org/drawingml/2006/main" name="Tema do Office">
+  <a:themeElements>
+    <a:clrScheme name="Office">
+      <a:dk1>
+        <a:sysClr val="windowText" lastClr="000000"/>
+      </a:dk1>
+      <a:lt1>
+        <a:sysClr val="window" lastClr="FFFFFF"/>
+      </a:lt1>
+      <a:dk2>
+        <a:srgbClr val="44546A"/>
+      </a:dk2>
+      <a:lt2>
+        <a:srgbClr val="E7E6E6"/>
+      </a:lt2>
+      <a:accent1>
+        <a:srgbClr val="4472C4"/>
+      </a:accent1>
+      <a:accent2>
+        <a:srgbClr val="ED7D31"/>
+      </a:accent2>
+      <a:accent3>
+        <a:srgbClr val="A5A5A5"/>
+      </a:accent3>
+      <a:accent4>
+        <a:srgbClr val="FFC000"/>
+      </a:accent4>
+      <a:accent5>
+        <a:srgbClr val="5B9BD5"/>
+      </a:accent5>
+      <a:accent6>
+        <a:srgbClr val="70AD47"/>
+      </a:accent6>
+      <a:hlink>
+        <a:srgbClr val="0563C1"/>
+      </a:hlink>
+      <a:folHlink>
+        <a:srgbClr val="954F72"/>
+      </a:folHlink>
+    </a:clrScheme>
+    <a:fontScheme name="Office">
+      <a:majorFont>
+        <a:latin typeface="Calibri Light" panose="020F0302020204030204"/>
+        <a:ea typeface=""/>
+        <a:cs typeface=""/>
+        <a:font script="Jpan" typeface="游ゴシック Light"/>
+        <a:font script="Hang" typeface="맑은 고딕"/>
+        <a:font script="Hans" typeface="等线 Light"/>
+        <a:font script="Hant" typeface="新細明體"/>
+        <a:font script="Arab" typeface="Times New Roman"/>
+        <a:font script="Hebr" typeface="Times New Roman"/>
+        <a:font script="Thai" typeface="Angsana New"/>
+        <a:font script="Ethi" typeface="Nyala"/>
+        <a:font script="Beng" typeface="Vrinda"/>
+        <a:font script="Gujr" typeface="Shruti"/>
+        <a:font script="Khmr" typeface="MoolBoran"/>
+        <a:font script="Knda" typeface="Tunga"/>
+        <a:font script="Guru" typeface="Raavi"/>
+        <a:font script="Cans" typeface="Euphemia"/>
+        <a:font script="Cher" typeface="Plantagenet Cherokee"/>
+        <a:font script="Yiii" typeface="Microsoft Yi Baiti"/>
+        <a:font script="Tibt" typeface="Microsoft Himalaya"/>
+        <a:font script="Thaa" typeface="MV Boli"/>
+        <a:font script="Deva" typeface="Mangal"/>
+        <a:font script="Telu" typeface="Gautami"/>
+        <a:font script="Taml" typeface="Latha"/>
+        <a:font script="Syrc" typeface="Estrangelo Edessa"/>
+        <a:font script="Orya" typeface="Kalinga"/>
+        <a:font script="Mlym" typeface="Kartika"/>
+        <a:font script="Laoo" typeface="DokChampa"/>
+        <a:font script="Sinh" typeface="Iskoola Pota"/>
+        <a:font script="Mong" typeface="Mongolian Baiti"/>
+        <a:font script="Viet" typeface="Times New Roman"/>
+        <a:font script="Uigh" typeface="Microsoft Uighur"/>
+        <a:font script="Geor" typeface="Sylfaen"/>
+        <a:font script="Armn" typeface="Arial"/>
+        <a:font script="Bugi" typeface="Leelawadee UI"/>
+        <a:font script="Bopo" typeface="Microsoft JhengHei"/>
+        <a:font script="Java" typeface="Javanese Text"/>
+        <a:font script="Lisu" typeface="Segoe UI"/>
+        <a:font script="Mymr" typeface="Myanmar Text"/>
+        <a:font script="Nkoo" typeface="Ebrima"/>
+        <a:font script="Olck" typeface="Nirmala UI"/>
+        <a:font script="Osma" typeface="Ebrima"/>
+        <a:font script="Phag" typeface="Phagspa"/>
+        <a:font script="Syrn" typeface="Estrangelo Edessa"/>
+        <a:font script="Syrj" typeface="Estrangelo Edessa"/>
+        <a:font script="Syre" typeface="Estrangelo Edessa"/>
+        <a:font script="Sora" typeface="Nirmala UI"/>
+        <a:font script="Tale" typeface="Microsoft Tai Le"/>
+        <a:font script="Talu" typeface="Microsoft New Tai Lue"/>
+        <a:font script="Tfng" typeface="Ebrima"/>
+      </a:majorFont>
+      <a:minorFont>
+        <a:latin typeface="Calibri" panose="020F0502020204030204"/>
+        <a:ea typeface=""/>
+        <a:cs typeface=""/>
+        <a:font script="Jpan" typeface="游ゴシック"/>
+        <a:font script="Hang" typeface="맑은 고딕"/>
+        <a:font script="Hans" typeface="等线"/>
+        <a:font script="Hant" typeface="新細明體"/>
+        <a:font script="Arab" typeface="Arial"/>
+        <a:font script="Hebr" typeface="Arial"/>
+        <a:font script="Thai" typeface="Cordia New"/>
+        <a:font script="Ethi" typeface="Nyala"/>
+        <a:font script="Beng" typeface="Vrinda"/>
+        <a:font script="Gujr" typeface="Shruti"/>
+        <a:font script="Khmr" typeface="DaunPenh"/>
+        <a:font script="Knda" typeface="Tunga"/>
+        <a:font script="Guru" typeface="Raavi"/>
+        <a:font script="Cans" typeface="Euphemia"/>
+        <a:font script="Cher" typeface="Plantagenet Cherokee"/>
+        <a:font script="Yiii" typeface="Microsoft Yi Baiti"/>
+        <a:font script="Tibt" typeface="Microsoft Himalaya"/>
+        <a:font script="Thaa" typeface="MV Boli"/>
+        <a:font script="Deva" typeface="Mangal"/>
+        <a:font script="Telu" typeface="Gautami"/>
+        <a:font script="Taml" typeface="Latha"/>
+        <a:font script="Syrc" typeface="Estrangelo Edessa"/>
+        <a:font script="Orya" typeface="Kalinga"/>
+        <a:font script="Mlym" typeface="Kartika"/>
+        <a:font script="Laoo" typeface="DokChampa"/>
+        <a:font script="Sinh" typeface="Iskoola Pota"/>
+        <a:font script="Mong" typeface="Mongolian Baiti"/>
+        <a:font script="Viet" typeface="Arial"/>
+        <a:font script="Uigh" typeface="Microsoft Uighur"/>
+        <a:font script="Geor" typeface="Sylfaen"/>
+        <a:font script="Armn" typeface="Arial"/>
+        <a:font script="Bugi" typeface="Leelawadee UI"/>
+        <a:font script="Bopo" typeface="Microsoft JhengHei"/>
+        <a:font script="Java" typeface="Javanese Text"/>
+        <a:font script="Lisu" typeface="Segoe UI"/>
+        <a:font script="Mymr" typeface="Myanmar Text"/>
+        <a:font script="Nkoo" typeface="Ebrima"/>
+        <a:font script="Olck" typeface="Nirmala UI"/>
+        <a:font script="Osma" typeface="Ebrima"/>
+        <a:font script="Phag" typeface="Phagspa"/>
+        <a:font script="Syrn" typeface="Estrangelo Edessa"/>
+        <a:font script="Syrj" typeface="Estrangelo Edessa"/>
+        <a:font script="Syre" typeface="Estrangelo Edessa"/>
+        <a:font script="Sora" typeface="Nirmala UI"/>
+        <a:font script="Tale" typeface="Microsoft Tai Le"/>
+        <a:font script="Talu" typeface="Microsoft New Tai Lue"/>
+        <a:font script="Tfng" typeface="Ebrima"/>
+      </a:minorFont>
+    </a:fontScheme>
+    <a:fmtScheme name="Office">
+      <a:fillStyleLst>
+        <a:solidFill>
+          <a:schemeClr val="phClr"/>
+        </a:solidFill>
+        <a:gradFill rotWithShape="1">
+          <a:gsLst>
+            <a:gs pos="0">
+              <a:schemeClr val="phClr">
+                <a:lumMod val="110000"/>
+                <a:satMod val="105000"/>
+                <a:tint val="67000"/>
+              </a:schemeClr>
+            </a:gs>
+            <a:gs pos="50000">
+              <a:schemeClr val="phClr">
+                <a:lumMod val="105000"/>
+                <a:satMod val="103000"/>
+                <a:tint val="73000"/>
+              </a:schemeClr>
+            </a:gs>
+            <a:gs pos="100000">
+              <a:schemeClr val="phClr">
+                <a:lumMod val="105000"/>
+                <a:satMod val="109000"/>
+                <a:tint val="81000"/>
+              </a:schemeClr>
+            </a:gs>
+          </a:gsLst>
+          <a:lin ang="5400000" scaled="0"/>
+        </a:gradFill>
+        <a:gradFill rotWithShape="1">
+          <a:gsLst>
+            <a:gs pos="0">
+              <a:schemeClr val="phClr">
+                <a:satMod val="103000"/>
+                <a:lumMod val="102000"/>
+                <a:tint val="94000"/>
+              </a:schemeClr>
+            </a:gs>
+            <a:gs pos="50000">
+              <a:schemeClr val="phClr">
+                <a:satMod val="110000"/>
+                <a:lumMod val="100000"/>
+                <a:shade val="100000"/>
+              </a:schemeClr>
+            </a:gs>
+            <a:gs pos="100000">
+              <a:schemeClr val="phClr">
+                <a:lumMod val="99000"/>
+                <a:satMod val="120000"/>
+                <a:shade val="78000"/>
+              </a:schemeClr>
+            </a:gs>
+          </a:gsLst>
+          <a:lin ang="5400000" scaled="0"/>
+        </a:gradFill>
+      </a:fillStyleLst>
+      <a:lnStyleLst>
+        <a:ln w="6350" cap="flat" cmpd="sng" algn="ctr">
+          <a:solidFill>
+            <a:schemeClr val="phClr"/>
+          </a:solidFill>
+          <a:prstDash val="solid"/>
+          <a:miter lim="800000"/>
+        </a:ln>
+        <a:ln w="12700" cap="flat" cmpd="sng" algn="ctr">
+          <a:solidFill>
+            <a:schemeClr val="phClr"/>
+          </a:solidFill>
+          <a:prstDash val="solid"/>
+          <a:miter lim="800000"/>
+        </a:ln>
+        <a:ln w="19050" cap="flat" cmpd="sng" algn="ctr">
+          <a:solidFill>
+            <a:schemeClr val="phClr"/>
+          </a:solidFill>
+          <a:prstDash val="solid"/>
+          <a:miter lim="800000"/>
+        </a:ln>
+      </a:lnStyleLst>
+      <a:effectStyleLst>
+        <a:effectStyle>
+          <a:effectLst/>
+        </a:effectStyle>
+        <a:effectStyle>
+          <a:effectLst/>
+        </a:effectStyle>
+        <a:effectStyle>
+          <a:effectLst>
+            <a:outerShdw blurRad="57150" dist="19050" dir="5400000" algn="ctr" rotWithShape="0">
+              <a:srgbClr val="000000">
+                <a:alpha val="63000"/>
+              </a:srgbClr>
+            </a:outerShdw>
+          </a:effectLst>
+        </a:effectStyle>
+      </a:effectStyleLst>
+      <a:bgFillStyleLst>
+        <a:solidFill>
+          <a:schemeClr val="phClr"/>
+        </a:solidFill>
+        <a:solidFill>
+          <a:schemeClr val="phClr">
+            <a:tint val="95000"/>
+            <a:satMod val="170000"/>
+          </a:schemeClr>
+        </a:solidFill>
+        <a:gradFill rotWithShape="1">
+          <a:gsLst>
+            <a:gs pos="0">
+              <a:schemeClr val="phClr">
+                <a:tint val="93000"/>
+                <a:satMod val="150000"/>
+                <a:shade val="98000"/>
+                <a:lumMod val="102000"/>
+              </a:schemeClr>
+            </a:gs>
+            <a:gs pos="50000">
+              <a:schemeClr val="phClr">
+                <a:tint val="98000"/>
+                <a:satMod val="130000"/>
+                <a:shade val="90000"/>
+                <a:lumMod val="103000"/>
+              </a:schemeClr>
+            </a:gs>
+            <a:gs pos="100000">
+              <a:schemeClr val="phClr">
+                <a:shade val="63000"/>
+                <a:satMod val="120000"/>
+              </a:schemeClr>
+            </a:gs>
+          </a:gsLst>
+          <a:lin ang="5400000" scaled="0"/>
+        </a:gradFill>
+      </a:bgFillStyleLst>
+    </a:fmtScheme>
+  </a:themeElements>
+  <a:objectDefaults/>
+  <a:extraClrSchemeLst/>
+  <a:extLst>
+    <a:ext uri="{05A4C25C-085E-4340-85A3-A5531E510DB2}">
+      <thm15:themeFamily xmlns:thm15="http://schemas.microsoft.com/office/thememl/2012/main" name="Office Theme" id="{62F939B6-93AF-4DB8-9C6B-D6C7DFDC589F}" vid="{4A3C46E8-61CC-4603-A589-7422A47A8E4A}"/>
+    </a:ext>
+  </a:extLst>
+</a:theme>
 </file>
</xml_diff>

<commit_message>
atualização documentos para apresentação dos resultados
</commit_message>
<xml_diff>
--- a/Projeto-AjudeMais/000-Gerência de Projeto/PPJ-Plano de Projeto.pptx
+++ b/Projeto-AjudeMais/000-Gerência de Projeto/PPJ-Plano de Projeto.pptx
@@ -61,8 +61,8 @@
         </p:nvSpPr>
         <p:spPr>
           <a:xfrm>
-            <a:off x="756000" y="5078520"/>
-            <a:ext cx="6047640" cy="4811040"/>
+            <a:off x="777240" y="4777560"/>
+            <a:ext cx="6217560" cy="4525920"/>
           </a:xfrm>
           <a:prstGeom prst="rect">
             <a:avLst/>
@@ -83,7 +83,7 @@
                 </a:uFill>
                 <a:latin typeface="Arial"/>
               </a:rPr>
-              <a:t>Click to edit the notes format</a:t>
+              <a:t>Clique para editar o formato de notas</a:t>
             </a:r>
             <a:endParaRPr b="0" lang="pt-BR" sz="2000" spc="-1" strike="noStrike">
               <a:solidFill>
@@ -112,7 +112,7 @@
         <p:spPr>
           <a:xfrm>
             <a:off x="0" y="0"/>
-            <a:ext cx="3280680" cy="534240"/>
+            <a:ext cx="3372840" cy="502560"/>
           </a:xfrm>
           <a:prstGeom prst="rect">
             <a:avLst/>
@@ -133,7 +133,7 @@
                 </a:uFill>
                 <a:latin typeface="Times New Roman"/>
               </a:rPr>
-              <a:t>&lt;header&gt;</a:t>
+              <a:t>&lt;cabeçalho&gt;</a:t>
             </a:r>
             <a:endParaRPr b="0" lang="pt-BR" sz="1400" spc="-1" strike="noStrike">
               <a:solidFill>
@@ -161,8 +161,8 @@
         </p:nvSpPr>
         <p:spPr>
           <a:xfrm>
-            <a:off x="4278960" y="0"/>
-            <a:ext cx="3280680" cy="534240"/>
+            <a:off x="4399200" y="0"/>
+            <a:ext cx="3372840" cy="502560"/>
           </a:xfrm>
           <a:prstGeom prst="rect">
             <a:avLst/>
@@ -184,7 +184,7 @@
                 </a:uFill>
                 <a:latin typeface="Times New Roman"/>
               </a:rPr>
-              <a:t>&lt;date/time&gt;</a:t>
+              <a:t>&lt;data/hora&gt;</a:t>
             </a:r>
             <a:endParaRPr b="0" lang="pt-BR" sz="1400" spc="-1" strike="noStrike">
               <a:solidFill>
@@ -212,8 +212,8 @@
         </p:nvSpPr>
         <p:spPr>
           <a:xfrm>
-            <a:off x="0" y="10157400"/>
-            <a:ext cx="3280680" cy="534240"/>
+            <a:off x="0" y="9555480"/>
+            <a:ext cx="3372840" cy="502560"/>
           </a:xfrm>
           <a:prstGeom prst="rect">
             <a:avLst/>
@@ -234,7 +234,7 @@
                 </a:uFill>
                 <a:latin typeface="Times New Roman"/>
               </a:rPr>
-              <a:t>&lt;footer&gt;</a:t>
+              <a:t>&lt;rodapé&gt;</a:t>
             </a:r>
             <a:endParaRPr b="0" lang="pt-BR" sz="1400" spc="-1" strike="noStrike">
               <a:solidFill>
@@ -262,8 +262,8 @@
         </p:nvSpPr>
         <p:spPr>
           <a:xfrm>
-            <a:off x="4278960" y="10157400"/>
-            <a:ext cx="3280680" cy="534240"/>
+            <a:off x="4399200" y="9555480"/>
+            <a:ext cx="3372840" cy="502560"/>
           </a:xfrm>
           <a:prstGeom prst="rect">
             <a:avLst/>
@@ -273,7 +273,7 @@
           <a:bodyPr lIns="0" rIns="0" tIns="0" bIns="0" anchor="b"/>
           <a:p>
             <a:pPr algn="r"/>
-            <a:fld id="{24F0D567-9AE7-44D4-84AC-C7242E921AA6}" type="slidenum">
+            <a:fld id="{0FB7BA86-006B-44BB-B075-3BCD1E4268D8}" type="slidenum">
               <a:rPr b="0" lang="pt-BR" sz="1400" spc="-1" strike="noStrike">
                 <a:solidFill>
                   <a:srgbClr val="000000"/>
@@ -285,7 +285,7 @@
                 </a:uFill>
                 <a:latin typeface="Times New Roman"/>
               </a:rPr>
-              <a:t>&lt;number&gt;</a:t>
+              <a:t>&lt;número&gt;</a:t>
             </a:fld>
             <a:endParaRPr b="0" lang="pt-BR" sz="1400" spc="-1" strike="noStrike">
               <a:solidFill>
@@ -337,7 +337,7 @@
         <p:spPr>
           <a:xfrm>
             <a:off x="777960" y="4840200"/>
-            <a:ext cx="6214680" cy="3958920"/>
+            <a:ext cx="6214320" cy="3958560"/>
           </a:xfrm>
           <a:prstGeom prst="rect">
             <a:avLst/>
@@ -369,7 +369,7 @@
         <p:spPr>
           <a:xfrm>
             <a:off x="4402080" y="9553680"/>
-            <a:ext cx="3366720" cy="502920"/>
+            <a:ext cx="3366360" cy="502560"/>
           </a:xfrm>
           <a:prstGeom prst="rect">
             <a:avLst/>
@@ -393,7 +393,7 @@
                 <a:spcPct val="100000"/>
               </a:lnSpc>
             </a:pPr>
-            <a:fld id="{509E7988-BDEE-49BD-BB2E-E59972F6CCC0}" type="slidenum">
+            <a:fld id="{623F507F-57DE-45B0-B42C-A9EDC5729FAC}" type="slidenum">
               <a:rPr b="0" lang="pt-BR" sz="1200" spc="-1" strike="noStrike">
                 <a:solidFill>
                   <a:srgbClr val="000000"/>
@@ -406,7 +406,7 @@
                 <a:latin typeface="+mn-lt"/>
                 <a:ea typeface="+mn-ea"/>
               </a:rPr>
-              <a:t>&lt;number&gt;</a:t>
+              <a:t>&lt;número&gt;</a:t>
             </a:fld>
             <a:endParaRPr b="0" lang="pt-BR" sz="1800" spc="-1" strike="noStrike">
               <a:solidFill>
@@ -488,7 +488,8 @@
         <p:txBody>
           <a:bodyPr lIns="0" rIns="0" tIns="0" bIns="0" anchor="ctr"/>
           <a:p>
-            <a:endParaRPr b="0" lang="pt-BR" sz="1800" spc="-1" strike="noStrike">
+            <a:pPr algn="ctr"/>
+            <a:endParaRPr b="0" lang="pt-BR" sz="4400" spc="-1" strike="noStrike">
               <a:solidFill>
                 <a:srgbClr val="000000"/>
               </a:solidFill>
@@ -524,7 +525,7 @@
         <p:txBody>
           <a:bodyPr lIns="0" rIns="0" tIns="0" bIns="0"/>
           <a:p>
-            <a:endParaRPr b="0" lang="pt-BR" sz="2800" spc="-1" strike="noStrike">
+            <a:endParaRPr b="0" lang="pt-BR" sz="3200" spc="-1" strike="noStrike">
               <a:solidFill>
                 <a:srgbClr val="000000"/>
               </a:solidFill>
@@ -560,7 +561,7 @@
         <p:txBody>
           <a:bodyPr lIns="0" rIns="0" tIns="0" bIns="0"/>
           <a:p>
-            <a:endParaRPr b="0" lang="pt-BR" sz="2800" spc="-1" strike="noStrike">
+            <a:endParaRPr b="0" lang="pt-BR" sz="3200" spc="-1" strike="noStrike">
               <a:solidFill>
                 <a:srgbClr val="000000"/>
               </a:solidFill>
@@ -618,7 +619,8 @@
         <p:txBody>
           <a:bodyPr lIns="0" rIns="0" tIns="0" bIns="0" anchor="ctr"/>
           <a:p>
-            <a:endParaRPr b="0" lang="pt-BR" sz="1800" spc="-1" strike="noStrike">
+            <a:pPr algn="ctr"/>
+            <a:endParaRPr b="0" lang="pt-BR" sz="4400" spc="-1" strike="noStrike">
               <a:solidFill>
                 <a:srgbClr val="000000"/>
               </a:solidFill>
@@ -654,7 +656,7 @@
         <p:txBody>
           <a:bodyPr lIns="0" rIns="0" tIns="0" bIns="0"/>
           <a:p>
-            <a:endParaRPr b="0" lang="pt-BR" sz="2800" spc="-1" strike="noStrike">
+            <a:endParaRPr b="0" lang="pt-BR" sz="3200" spc="-1" strike="noStrike">
               <a:solidFill>
                 <a:srgbClr val="000000"/>
               </a:solidFill>
@@ -690,7 +692,7 @@
         <p:txBody>
           <a:bodyPr lIns="0" rIns="0" tIns="0" bIns="0"/>
           <a:p>
-            <a:endParaRPr b="0" lang="pt-BR" sz="2800" spc="-1" strike="noStrike">
+            <a:endParaRPr b="0" lang="pt-BR" sz="3200" spc="-1" strike="noStrike">
               <a:solidFill>
                 <a:srgbClr val="000000"/>
               </a:solidFill>
@@ -726,7 +728,7 @@
         <p:txBody>
           <a:bodyPr lIns="0" rIns="0" tIns="0" bIns="0"/>
           <a:p>
-            <a:endParaRPr b="0" lang="pt-BR" sz="2800" spc="-1" strike="noStrike">
+            <a:endParaRPr b="0" lang="pt-BR" sz="3200" spc="-1" strike="noStrike">
               <a:solidFill>
                 <a:srgbClr val="000000"/>
               </a:solidFill>
@@ -762,7 +764,7 @@
         <p:txBody>
           <a:bodyPr lIns="0" rIns="0" tIns="0" bIns="0"/>
           <a:p>
-            <a:endParaRPr b="0" lang="pt-BR" sz="2800" spc="-1" strike="noStrike">
+            <a:endParaRPr b="0" lang="pt-BR" sz="3200" spc="-1" strike="noStrike">
               <a:solidFill>
                 <a:srgbClr val="000000"/>
               </a:solidFill>
@@ -820,7 +822,8 @@
         <p:txBody>
           <a:bodyPr lIns="0" rIns="0" tIns="0" bIns="0" anchor="ctr"/>
           <a:p>
-            <a:endParaRPr b="0" lang="pt-BR" sz="1800" spc="-1" strike="noStrike">
+            <a:pPr algn="ctr"/>
+            <a:endParaRPr b="0" lang="pt-BR" sz="4400" spc="-1" strike="noStrike">
               <a:solidFill>
                 <a:srgbClr val="000000"/>
               </a:solidFill>
@@ -856,7 +859,7 @@
         <p:txBody>
           <a:bodyPr lIns="0" rIns="0" tIns="0" bIns="0"/>
           <a:p>
-            <a:endParaRPr b="0" lang="pt-BR" sz="2800" spc="-1" strike="noStrike">
+            <a:endParaRPr b="0" lang="pt-BR" sz="3200" spc="-1" strike="noStrike">
               <a:solidFill>
                 <a:srgbClr val="000000"/>
               </a:solidFill>
@@ -892,7 +895,7 @@
         <p:txBody>
           <a:bodyPr lIns="0" rIns="0" tIns="0" bIns="0"/>
           <a:p>
-            <a:endParaRPr b="0" lang="pt-BR" sz="2800" spc="-1" strike="noStrike">
+            <a:endParaRPr b="0" lang="pt-BR" sz="3200" spc="-1" strike="noStrike">
               <a:solidFill>
                 <a:srgbClr val="000000"/>
               </a:solidFill>
@@ -1018,7 +1021,8 @@
         <p:txBody>
           <a:bodyPr lIns="0" rIns="0" tIns="0" bIns="0" anchor="ctr"/>
           <a:p>
-            <a:endParaRPr b="0" lang="pt-BR" sz="1800" spc="-1" strike="noStrike">
+            <a:pPr algn="ctr"/>
+            <a:endParaRPr b="0" lang="pt-BR" sz="4400" spc="-1" strike="noStrike">
               <a:solidFill>
                 <a:srgbClr val="000000"/>
               </a:solidFill>
@@ -1113,7 +1117,8 @@
         <p:txBody>
           <a:bodyPr lIns="0" rIns="0" tIns="0" bIns="0" anchor="ctr"/>
           <a:p>
-            <a:endParaRPr b="0" lang="pt-BR" sz="1800" spc="-1" strike="noStrike">
+            <a:pPr algn="ctr"/>
+            <a:endParaRPr b="0" lang="pt-BR" sz="4400" spc="-1" strike="noStrike">
               <a:solidFill>
                 <a:srgbClr val="000000"/>
               </a:solidFill>
@@ -1149,7 +1154,7 @@
         <p:txBody>
           <a:bodyPr lIns="0" rIns="0" tIns="0" bIns="0"/>
           <a:p>
-            <a:endParaRPr b="0" lang="pt-BR" sz="2800" spc="-1" strike="noStrike">
+            <a:endParaRPr b="0" lang="pt-BR" sz="3200" spc="-1" strike="noStrike">
               <a:solidFill>
                 <a:srgbClr val="000000"/>
               </a:solidFill>
@@ -1207,7 +1212,8 @@
         <p:txBody>
           <a:bodyPr lIns="0" rIns="0" tIns="0" bIns="0" anchor="ctr"/>
           <a:p>
-            <a:endParaRPr b="0" lang="pt-BR" sz="1800" spc="-1" strike="noStrike">
+            <a:pPr algn="ctr"/>
+            <a:endParaRPr b="0" lang="pt-BR" sz="4400" spc="-1" strike="noStrike">
               <a:solidFill>
                 <a:srgbClr val="000000"/>
               </a:solidFill>
@@ -1243,7 +1249,7 @@
         <p:txBody>
           <a:bodyPr lIns="0" rIns="0" tIns="0" bIns="0"/>
           <a:p>
-            <a:endParaRPr b="0" lang="pt-BR" sz="2800" spc="-1" strike="noStrike">
+            <a:endParaRPr b="0" lang="pt-BR" sz="3200" spc="-1" strike="noStrike">
               <a:solidFill>
                 <a:srgbClr val="000000"/>
               </a:solidFill>
@@ -1279,7 +1285,7 @@
         <p:txBody>
           <a:bodyPr lIns="0" rIns="0" tIns="0" bIns="0"/>
           <a:p>
-            <a:endParaRPr b="0" lang="pt-BR" sz="2800" spc="-1" strike="noStrike">
+            <a:endParaRPr b="0" lang="pt-BR" sz="3200" spc="-1" strike="noStrike">
               <a:solidFill>
                 <a:srgbClr val="000000"/>
               </a:solidFill>
@@ -1337,7 +1343,8 @@
         <p:txBody>
           <a:bodyPr lIns="0" rIns="0" tIns="0" bIns="0" anchor="ctr"/>
           <a:p>
-            <a:endParaRPr b="0" lang="pt-BR" sz="1800" spc="-1" strike="noStrike">
+            <a:pPr algn="ctr"/>
+            <a:endParaRPr b="0" lang="pt-BR" sz="4400" spc="-1" strike="noStrike">
               <a:solidFill>
                 <a:srgbClr val="000000"/>
               </a:solidFill>
@@ -1454,7 +1461,8 @@
         <p:txBody>
           <a:bodyPr lIns="0" rIns="0" tIns="0" bIns="0" anchor="ctr"/>
           <a:p>
-            <a:endParaRPr b="0" lang="pt-BR" sz="1800" spc="-1" strike="noStrike">
+            <a:pPr algn="ctr"/>
+            <a:endParaRPr b="0" lang="pt-BR" sz="4400" spc="-1" strike="noStrike">
               <a:solidFill>
                 <a:srgbClr val="000000"/>
               </a:solidFill>
@@ -1490,7 +1498,7 @@
         <p:txBody>
           <a:bodyPr lIns="0" rIns="0" tIns="0" bIns="0"/>
           <a:p>
-            <a:endParaRPr b="0" lang="pt-BR" sz="2800" spc="-1" strike="noStrike">
+            <a:endParaRPr b="0" lang="pt-BR" sz="3200" spc="-1" strike="noStrike">
               <a:solidFill>
                 <a:srgbClr val="000000"/>
               </a:solidFill>
@@ -1526,7 +1534,7 @@
         <p:txBody>
           <a:bodyPr lIns="0" rIns="0" tIns="0" bIns="0"/>
           <a:p>
-            <a:endParaRPr b="0" lang="pt-BR" sz="2800" spc="-1" strike="noStrike">
+            <a:endParaRPr b="0" lang="pt-BR" sz="3200" spc="-1" strike="noStrike">
               <a:solidFill>
                 <a:srgbClr val="000000"/>
               </a:solidFill>
@@ -1562,7 +1570,7 @@
         <p:txBody>
           <a:bodyPr lIns="0" rIns="0" tIns="0" bIns="0"/>
           <a:p>
-            <a:endParaRPr b="0" lang="pt-BR" sz="2800" spc="-1" strike="noStrike">
+            <a:endParaRPr b="0" lang="pt-BR" sz="3200" spc="-1" strike="noStrike">
               <a:solidFill>
                 <a:srgbClr val="000000"/>
               </a:solidFill>
@@ -1620,7 +1628,8 @@
         <p:txBody>
           <a:bodyPr lIns="0" rIns="0" tIns="0" bIns="0" anchor="ctr"/>
           <a:p>
-            <a:endParaRPr b="0" lang="pt-BR" sz="1800" spc="-1" strike="noStrike">
+            <a:pPr algn="ctr"/>
+            <a:endParaRPr b="0" lang="pt-BR" sz="4400" spc="-1" strike="noStrike">
               <a:solidFill>
                 <a:srgbClr val="000000"/>
               </a:solidFill>
@@ -1715,7 +1724,8 @@
         <p:txBody>
           <a:bodyPr lIns="0" rIns="0" tIns="0" bIns="0" anchor="ctr"/>
           <a:p>
-            <a:endParaRPr b="0" lang="pt-BR" sz="1800" spc="-1" strike="noStrike">
+            <a:pPr algn="ctr"/>
+            <a:endParaRPr b="0" lang="pt-BR" sz="4400" spc="-1" strike="noStrike">
               <a:solidFill>
                 <a:srgbClr val="000000"/>
               </a:solidFill>
@@ -1751,7 +1761,7 @@
         <p:txBody>
           <a:bodyPr lIns="0" rIns="0" tIns="0" bIns="0"/>
           <a:p>
-            <a:endParaRPr b="0" lang="pt-BR" sz="2800" spc="-1" strike="noStrike">
+            <a:endParaRPr b="0" lang="pt-BR" sz="3200" spc="-1" strike="noStrike">
               <a:solidFill>
                 <a:srgbClr val="000000"/>
               </a:solidFill>
@@ -1787,7 +1797,7 @@
         <p:txBody>
           <a:bodyPr lIns="0" rIns="0" tIns="0" bIns="0"/>
           <a:p>
-            <a:endParaRPr b="0" lang="pt-BR" sz="2800" spc="-1" strike="noStrike">
+            <a:endParaRPr b="0" lang="pt-BR" sz="3200" spc="-1" strike="noStrike">
               <a:solidFill>
                 <a:srgbClr val="000000"/>
               </a:solidFill>
@@ -1823,7 +1833,7 @@
         <p:txBody>
           <a:bodyPr lIns="0" rIns="0" tIns="0" bIns="0"/>
           <a:p>
-            <a:endParaRPr b="0" lang="pt-BR" sz="2800" spc="-1" strike="noStrike">
+            <a:endParaRPr b="0" lang="pt-BR" sz="3200" spc="-1" strike="noStrike">
               <a:solidFill>
                 <a:srgbClr val="000000"/>
               </a:solidFill>
@@ -1881,7 +1891,8 @@
         <p:txBody>
           <a:bodyPr lIns="0" rIns="0" tIns="0" bIns="0" anchor="ctr"/>
           <a:p>
-            <a:endParaRPr b="0" lang="pt-BR" sz="1800" spc="-1" strike="noStrike">
+            <a:pPr algn="ctr"/>
+            <a:endParaRPr b="0" lang="pt-BR" sz="4400" spc="-1" strike="noStrike">
               <a:solidFill>
                 <a:srgbClr val="000000"/>
               </a:solidFill>
@@ -1917,7 +1928,7 @@
         <p:txBody>
           <a:bodyPr lIns="0" rIns="0" tIns="0" bIns="0"/>
           <a:p>
-            <a:endParaRPr b="0" lang="pt-BR" sz="2800" spc="-1" strike="noStrike">
+            <a:endParaRPr b="0" lang="pt-BR" sz="3200" spc="-1" strike="noStrike">
               <a:solidFill>
                 <a:srgbClr val="000000"/>
               </a:solidFill>
@@ -1953,7 +1964,7 @@
         <p:txBody>
           <a:bodyPr lIns="0" rIns="0" tIns="0" bIns="0"/>
           <a:p>
-            <a:endParaRPr b="0" lang="pt-BR" sz="2800" spc="-1" strike="noStrike">
+            <a:endParaRPr b="0" lang="pt-BR" sz="3200" spc="-1" strike="noStrike">
               <a:solidFill>
                 <a:srgbClr val="000000"/>
               </a:solidFill>
@@ -1989,7 +2000,7 @@
         <p:txBody>
           <a:bodyPr lIns="0" rIns="0" tIns="0" bIns="0"/>
           <a:p>
-            <a:endParaRPr b="0" lang="pt-BR" sz="2800" spc="-1" strike="noStrike">
+            <a:endParaRPr b="0" lang="pt-BR" sz="3200" spc="-1" strike="noStrike">
               <a:solidFill>
                 <a:srgbClr val="000000"/>
               </a:solidFill>
@@ -2047,7 +2058,8 @@
         <p:txBody>
           <a:bodyPr lIns="0" rIns="0" tIns="0" bIns="0" anchor="ctr"/>
           <a:p>
-            <a:endParaRPr b="0" lang="pt-BR" sz="1800" spc="-1" strike="noStrike">
+            <a:pPr algn="ctr"/>
+            <a:endParaRPr b="0" lang="pt-BR" sz="4400" spc="-1" strike="noStrike">
               <a:solidFill>
                 <a:srgbClr val="000000"/>
               </a:solidFill>
@@ -2083,7 +2095,7 @@
         <p:txBody>
           <a:bodyPr lIns="0" rIns="0" tIns="0" bIns="0"/>
           <a:p>
-            <a:endParaRPr b="0" lang="pt-BR" sz="2800" spc="-1" strike="noStrike">
+            <a:endParaRPr b="0" lang="pt-BR" sz="3200" spc="-1" strike="noStrike">
               <a:solidFill>
                 <a:srgbClr val="000000"/>
               </a:solidFill>
@@ -2119,7 +2131,7 @@
         <p:txBody>
           <a:bodyPr lIns="0" rIns="0" tIns="0" bIns="0"/>
           <a:p>
-            <a:endParaRPr b="0" lang="pt-BR" sz="2800" spc="-1" strike="noStrike">
+            <a:endParaRPr b="0" lang="pt-BR" sz="3200" spc="-1" strike="noStrike">
               <a:solidFill>
                 <a:srgbClr val="000000"/>
               </a:solidFill>
@@ -2177,7 +2189,8 @@
         <p:txBody>
           <a:bodyPr lIns="0" rIns="0" tIns="0" bIns="0" anchor="ctr"/>
           <a:p>
-            <a:endParaRPr b="0" lang="pt-BR" sz="1800" spc="-1" strike="noStrike">
+            <a:pPr algn="ctr"/>
+            <a:endParaRPr b="0" lang="pt-BR" sz="4400" spc="-1" strike="noStrike">
               <a:solidFill>
                 <a:srgbClr val="000000"/>
               </a:solidFill>
@@ -2213,7 +2226,7 @@
         <p:txBody>
           <a:bodyPr lIns="0" rIns="0" tIns="0" bIns="0"/>
           <a:p>
-            <a:endParaRPr b="0" lang="pt-BR" sz="2800" spc="-1" strike="noStrike">
+            <a:endParaRPr b="0" lang="pt-BR" sz="3200" spc="-1" strike="noStrike">
               <a:solidFill>
                 <a:srgbClr val="000000"/>
               </a:solidFill>
@@ -2249,7 +2262,7 @@
         <p:txBody>
           <a:bodyPr lIns="0" rIns="0" tIns="0" bIns="0"/>
           <a:p>
-            <a:endParaRPr b="0" lang="pt-BR" sz="2800" spc="-1" strike="noStrike">
+            <a:endParaRPr b="0" lang="pt-BR" sz="3200" spc="-1" strike="noStrike">
               <a:solidFill>
                 <a:srgbClr val="000000"/>
               </a:solidFill>
@@ -2285,7 +2298,7 @@
         <p:txBody>
           <a:bodyPr lIns="0" rIns="0" tIns="0" bIns="0"/>
           <a:p>
-            <a:endParaRPr b="0" lang="pt-BR" sz="2800" spc="-1" strike="noStrike">
+            <a:endParaRPr b="0" lang="pt-BR" sz="3200" spc="-1" strike="noStrike">
               <a:solidFill>
                 <a:srgbClr val="000000"/>
               </a:solidFill>
@@ -2321,7 +2334,7 @@
         <p:txBody>
           <a:bodyPr lIns="0" rIns="0" tIns="0" bIns="0"/>
           <a:p>
-            <a:endParaRPr b="0" lang="pt-BR" sz="2800" spc="-1" strike="noStrike">
+            <a:endParaRPr b="0" lang="pt-BR" sz="3200" spc="-1" strike="noStrike">
               <a:solidFill>
                 <a:srgbClr val="000000"/>
               </a:solidFill>
@@ -2379,7 +2392,8 @@
         <p:txBody>
           <a:bodyPr lIns="0" rIns="0" tIns="0" bIns="0" anchor="ctr"/>
           <a:p>
-            <a:endParaRPr b="0" lang="pt-BR" sz="1800" spc="-1" strike="noStrike">
+            <a:pPr algn="ctr"/>
+            <a:endParaRPr b="0" lang="pt-BR" sz="4400" spc="-1" strike="noStrike">
               <a:solidFill>
                 <a:srgbClr val="000000"/>
               </a:solidFill>
@@ -2415,7 +2429,7 @@
         <p:txBody>
           <a:bodyPr lIns="0" rIns="0" tIns="0" bIns="0"/>
           <a:p>
-            <a:endParaRPr b="0" lang="pt-BR" sz="2800" spc="-1" strike="noStrike">
+            <a:endParaRPr b="0" lang="pt-BR" sz="3200" spc="-1" strike="noStrike">
               <a:solidFill>
                 <a:srgbClr val="000000"/>
               </a:solidFill>
@@ -2451,7 +2465,7 @@
         <p:txBody>
           <a:bodyPr lIns="0" rIns="0" tIns="0" bIns="0"/>
           <a:p>
-            <a:endParaRPr b="0" lang="pt-BR" sz="2800" spc="-1" strike="noStrike">
+            <a:endParaRPr b="0" lang="pt-BR" sz="3200" spc="-1" strike="noStrike">
               <a:solidFill>
                 <a:srgbClr val="000000"/>
               </a:solidFill>
@@ -2577,7 +2591,8 @@
         <p:txBody>
           <a:bodyPr lIns="0" rIns="0" tIns="0" bIns="0" anchor="ctr"/>
           <a:p>
-            <a:endParaRPr b="0" lang="pt-BR" sz="1800" spc="-1" strike="noStrike">
+            <a:pPr algn="ctr"/>
+            <a:endParaRPr b="0" lang="pt-BR" sz="4400" spc="-1" strike="noStrike">
               <a:solidFill>
                 <a:srgbClr val="000000"/>
               </a:solidFill>
@@ -2672,7 +2687,8 @@
         <p:txBody>
           <a:bodyPr lIns="0" rIns="0" tIns="0" bIns="0" anchor="ctr"/>
           <a:p>
-            <a:endParaRPr b="0" lang="pt-BR" sz="1800" spc="-1" strike="noStrike">
+            <a:pPr algn="ctr"/>
+            <a:endParaRPr b="0" lang="pt-BR" sz="4400" spc="-1" strike="noStrike">
               <a:solidFill>
                 <a:srgbClr val="000000"/>
               </a:solidFill>
@@ -2708,7 +2724,7 @@
         <p:txBody>
           <a:bodyPr lIns="0" rIns="0" tIns="0" bIns="0"/>
           <a:p>
-            <a:endParaRPr b="0" lang="pt-BR" sz="2800" spc="-1" strike="noStrike">
+            <a:endParaRPr b="0" lang="pt-BR" sz="3200" spc="-1" strike="noStrike">
               <a:solidFill>
                 <a:srgbClr val="000000"/>
               </a:solidFill>
@@ -2766,7 +2782,8 @@
         <p:txBody>
           <a:bodyPr lIns="0" rIns="0" tIns="0" bIns="0" anchor="ctr"/>
           <a:p>
-            <a:endParaRPr b="0" lang="pt-BR" sz="1800" spc="-1" strike="noStrike">
+            <a:pPr algn="ctr"/>
+            <a:endParaRPr b="0" lang="pt-BR" sz="4400" spc="-1" strike="noStrike">
               <a:solidFill>
                 <a:srgbClr val="000000"/>
               </a:solidFill>
@@ -2802,7 +2819,7 @@
         <p:txBody>
           <a:bodyPr lIns="0" rIns="0" tIns="0" bIns="0"/>
           <a:p>
-            <a:endParaRPr b="0" lang="pt-BR" sz="2800" spc="-1" strike="noStrike">
+            <a:endParaRPr b="0" lang="pt-BR" sz="3200" spc="-1" strike="noStrike">
               <a:solidFill>
                 <a:srgbClr val="000000"/>
               </a:solidFill>
@@ -2838,7 +2855,7 @@
         <p:txBody>
           <a:bodyPr lIns="0" rIns="0" tIns="0" bIns="0"/>
           <a:p>
-            <a:endParaRPr b="0" lang="pt-BR" sz="2800" spc="-1" strike="noStrike">
+            <a:endParaRPr b="0" lang="pt-BR" sz="3200" spc="-1" strike="noStrike">
               <a:solidFill>
                 <a:srgbClr val="000000"/>
               </a:solidFill>
@@ -2896,7 +2913,8 @@
         <p:txBody>
           <a:bodyPr lIns="0" rIns="0" tIns="0" bIns="0" anchor="ctr"/>
           <a:p>
-            <a:endParaRPr b="0" lang="pt-BR" sz="1800" spc="-1" strike="noStrike">
+            <a:pPr algn="ctr"/>
+            <a:endParaRPr b="0" lang="pt-BR" sz="4400" spc="-1" strike="noStrike">
               <a:solidFill>
                 <a:srgbClr val="000000"/>
               </a:solidFill>
@@ -2954,7 +2972,8 @@
         <p:txBody>
           <a:bodyPr lIns="0" rIns="0" tIns="0" bIns="0" anchor="ctr"/>
           <a:p>
-            <a:endParaRPr b="0" lang="pt-BR" sz="1800" spc="-1" strike="noStrike">
+            <a:pPr algn="ctr"/>
+            <a:endParaRPr b="0" lang="pt-BR" sz="4400" spc="-1" strike="noStrike">
               <a:solidFill>
                 <a:srgbClr val="000000"/>
               </a:solidFill>
@@ -2990,7 +3009,7 @@
         <p:txBody>
           <a:bodyPr lIns="0" rIns="0" tIns="0" bIns="0"/>
           <a:p>
-            <a:endParaRPr b="0" lang="pt-BR" sz="2800" spc="-1" strike="noStrike">
+            <a:endParaRPr b="0" lang="pt-BR" sz="3200" spc="-1" strike="noStrike">
               <a:solidFill>
                 <a:srgbClr val="000000"/>
               </a:solidFill>
@@ -3107,7 +3126,8 @@
         <p:txBody>
           <a:bodyPr lIns="0" rIns="0" tIns="0" bIns="0" anchor="ctr"/>
           <a:p>
-            <a:endParaRPr b="0" lang="pt-BR" sz="1800" spc="-1" strike="noStrike">
+            <a:pPr algn="ctr"/>
+            <a:endParaRPr b="0" lang="pt-BR" sz="4400" spc="-1" strike="noStrike">
               <a:solidFill>
                 <a:srgbClr val="000000"/>
               </a:solidFill>
@@ -3143,7 +3163,7 @@
         <p:txBody>
           <a:bodyPr lIns="0" rIns="0" tIns="0" bIns="0"/>
           <a:p>
-            <a:endParaRPr b="0" lang="pt-BR" sz="2800" spc="-1" strike="noStrike">
+            <a:endParaRPr b="0" lang="pt-BR" sz="3200" spc="-1" strike="noStrike">
               <a:solidFill>
                 <a:srgbClr val="000000"/>
               </a:solidFill>
@@ -3179,7 +3199,7 @@
         <p:txBody>
           <a:bodyPr lIns="0" rIns="0" tIns="0" bIns="0"/>
           <a:p>
-            <a:endParaRPr b="0" lang="pt-BR" sz="2800" spc="-1" strike="noStrike">
+            <a:endParaRPr b="0" lang="pt-BR" sz="3200" spc="-1" strike="noStrike">
               <a:solidFill>
                 <a:srgbClr val="000000"/>
               </a:solidFill>
@@ -3215,7 +3235,7 @@
         <p:txBody>
           <a:bodyPr lIns="0" rIns="0" tIns="0" bIns="0"/>
           <a:p>
-            <a:endParaRPr b="0" lang="pt-BR" sz="2800" spc="-1" strike="noStrike">
+            <a:endParaRPr b="0" lang="pt-BR" sz="3200" spc="-1" strike="noStrike">
               <a:solidFill>
                 <a:srgbClr val="000000"/>
               </a:solidFill>
@@ -3273,7 +3293,8 @@
         <p:txBody>
           <a:bodyPr lIns="0" rIns="0" tIns="0" bIns="0" anchor="ctr"/>
           <a:p>
-            <a:endParaRPr b="0" lang="pt-BR" sz="1800" spc="-1" strike="noStrike">
+            <a:pPr algn="ctr"/>
+            <a:endParaRPr b="0" lang="pt-BR" sz="4400" spc="-1" strike="noStrike">
               <a:solidFill>
                 <a:srgbClr val="000000"/>
               </a:solidFill>
@@ -3309,7 +3330,7 @@
         <p:txBody>
           <a:bodyPr lIns="0" rIns="0" tIns="0" bIns="0"/>
           <a:p>
-            <a:endParaRPr b="0" lang="pt-BR" sz="2800" spc="-1" strike="noStrike">
+            <a:endParaRPr b="0" lang="pt-BR" sz="3200" spc="-1" strike="noStrike">
               <a:solidFill>
                 <a:srgbClr val="000000"/>
               </a:solidFill>
@@ -3345,7 +3366,7 @@
         <p:txBody>
           <a:bodyPr lIns="0" rIns="0" tIns="0" bIns="0"/>
           <a:p>
-            <a:endParaRPr b="0" lang="pt-BR" sz="2800" spc="-1" strike="noStrike">
+            <a:endParaRPr b="0" lang="pt-BR" sz="3200" spc="-1" strike="noStrike">
               <a:solidFill>
                 <a:srgbClr val="000000"/>
               </a:solidFill>
@@ -3381,7 +3402,7 @@
         <p:txBody>
           <a:bodyPr lIns="0" rIns="0" tIns="0" bIns="0"/>
           <a:p>
-            <a:endParaRPr b="0" lang="pt-BR" sz="2800" spc="-1" strike="noStrike">
+            <a:endParaRPr b="0" lang="pt-BR" sz="3200" spc="-1" strike="noStrike">
               <a:solidFill>
                 <a:srgbClr val="000000"/>
               </a:solidFill>
@@ -3439,7 +3460,8 @@
         <p:txBody>
           <a:bodyPr lIns="0" rIns="0" tIns="0" bIns="0" anchor="ctr"/>
           <a:p>
-            <a:endParaRPr b="0" lang="pt-BR" sz="1800" spc="-1" strike="noStrike">
+            <a:pPr algn="ctr"/>
+            <a:endParaRPr b="0" lang="pt-BR" sz="4400" spc="-1" strike="noStrike">
               <a:solidFill>
                 <a:srgbClr val="000000"/>
               </a:solidFill>
@@ -3475,7 +3497,7 @@
         <p:txBody>
           <a:bodyPr lIns="0" rIns="0" tIns="0" bIns="0"/>
           <a:p>
-            <a:endParaRPr b="0" lang="pt-BR" sz="2800" spc="-1" strike="noStrike">
+            <a:endParaRPr b="0" lang="pt-BR" sz="3200" spc="-1" strike="noStrike">
               <a:solidFill>
                 <a:srgbClr val="000000"/>
               </a:solidFill>
@@ -3511,7 +3533,7 @@
         <p:txBody>
           <a:bodyPr lIns="0" rIns="0" tIns="0" bIns="0"/>
           <a:p>
-            <a:endParaRPr b="0" lang="pt-BR" sz="2800" spc="-1" strike="noStrike">
+            <a:endParaRPr b="0" lang="pt-BR" sz="3200" spc="-1" strike="noStrike">
               <a:solidFill>
                 <a:srgbClr val="000000"/>
               </a:solidFill>
@@ -3547,7 +3569,7 @@
         <p:txBody>
           <a:bodyPr lIns="0" rIns="0" tIns="0" bIns="0"/>
           <a:p>
-            <a:endParaRPr b="0" lang="pt-BR" sz="2800" spc="-1" strike="noStrike">
+            <a:endParaRPr b="0" lang="pt-BR" sz="3200" spc="-1" strike="noStrike">
               <a:solidFill>
                 <a:srgbClr val="000000"/>
               </a:solidFill>
@@ -3605,7 +3627,8 @@
         <p:txBody>
           <a:bodyPr lIns="0" rIns="0" tIns="0" bIns="0" anchor="ctr"/>
           <a:p>
-            <a:endParaRPr b="0" lang="pt-BR" sz="1800" spc="-1" strike="noStrike">
+            <a:pPr algn="ctr"/>
+            <a:endParaRPr b="0" lang="pt-BR" sz="4400" spc="-1" strike="noStrike">
               <a:solidFill>
                 <a:srgbClr val="000000"/>
               </a:solidFill>
@@ -3641,7 +3664,7 @@
         <p:txBody>
           <a:bodyPr lIns="0" rIns="0" tIns="0" bIns="0"/>
           <a:p>
-            <a:endParaRPr b="0" lang="pt-BR" sz="2800" spc="-1" strike="noStrike">
+            <a:endParaRPr b="0" lang="pt-BR" sz="3200" spc="-1" strike="noStrike">
               <a:solidFill>
                 <a:srgbClr val="000000"/>
               </a:solidFill>
@@ -3677,7 +3700,7 @@
         <p:txBody>
           <a:bodyPr lIns="0" rIns="0" tIns="0" bIns="0"/>
           <a:p>
-            <a:endParaRPr b="0" lang="pt-BR" sz="2800" spc="-1" strike="noStrike">
+            <a:endParaRPr b="0" lang="pt-BR" sz="3200" spc="-1" strike="noStrike">
               <a:solidFill>
                 <a:srgbClr val="000000"/>
               </a:solidFill>
@@ -3735,7 +3758,8 @@
         <p:txBody>
           <a:bodyPr lIns="0" rIns="0" tIns="0" bIns="0" anchor="ctr"/>
           <a:p>
-            <a:endParaRPr b="0" lang="pt-BR" sz="1800" spc="-1" strike="noStrike">
+            <a:pPr algn="ctr"/>
+            <a:endParaRPr b="0" lang="pt-BR" sz="4400" spc="-1" strike="noStrike">
               <a:solidFill>
                 <a:srgbClr val="000000"/>
               </a:solidFill>
@@ -3771,7 +3795,7 @@
         <p:txBody>
           <a:bodyPr lIns="0" rIns="0" tIns="0" bIns="0"/>
           <a:p>
-            <a:endParaRPr b="0" lang="pt-BR" sz="2800" spc="-1" strike="noStrike">
+            <a:endParaRPr b="0" lang="pt-BR" sz="3200" spc="-1" strike="noStrike">
               <a:solidFill>
                 <a:srgbClr val="000000"/>
               </a:solidFill>
@@ -3807,7 +3831,7 @@
         <p:txBody>
           <a:bodyPr lIns="0" rIns="0" tIns="0" bIns="0"/>
           <a:p>
-            <a:endParaRPr b="0" lang="pt-BR" sz="2800" spc="-1" strike="noStrike">
+            <a:endParaRPr b="0" lang="pt-BR" sz="3200" spc="-1" strike="noStrike">
               <a:solidFill>
                 <a:srgbClr val="000000"/>
               </a:solidFill>
@@ -3843,7 +3867,7 @@
         <p:txBody>
           <a:bodyPr lIns="0" rIns="0" tIns="0" bIns="0"/>
           <a:p>
-            <a:endParaRPr b="0" lang="pt-BR" sz="2800" spc="-1" strike="noStrike">
+            <a:endParaRPr b="0" lang="pt-BR" sz="3200" spc="-1" strike="noStrike">
               <a:solidFill>
                 <a:srgbClr val="000000"/>
               </a:solidFill>
@@ -3879,7 +3903,7 @@
         <p:txBody>
           <a:bodyPr lIns="0" rIns="0" tIns="0" bIns="0"/>
           <a:p>
-            <a:endParaRPr b="0" lang="pt-BR" sz="2800" spc="-1" strike="noStrike">
+            <a:endParaRPr b="0" lang="pt-BR" sz="3200" spc="-1" strike="noStrike">
               <a:solidFill>
                 <a:srgbClr val="000000"/>
               </a:solidFill>
@@ -3937,7 +3961,8 @@
         <p:txBody>
           <a:bodyPr lIns="0" rIns="0" tIns="0" bIns="0" anchor="ctr"/>
           <a:p>
-            <a:endParaRPr b="0" lang="pt-BR" sz="1800" spc="-1" strike="noStrike">
+            <a:pPr algn="ctr"/>
+            <a:endParaRPr b="0" lang="pt-BR" sz="4400" spc="-1" strike="noStrike">
               <a:solidFill>
                 <a:srgbClr val="000000"/>
               </a:solidFill>
@@ -3973,7 +3998,7 @@
         <p:txBody>
           <a:bodyPr lIns="0" rIns="0" tIns="0" bIns="0"/>
           <a:p>
-            <a:endParaRPr b="0" lang="pt-BR" sz="2800" spc="-1" strike="noStrike">
+            <a:endParaRPr b="0" lang="pt-BR" sz="3200" spc="-1" strike="noStrike">
               <a:solidFill>
                 <a:srgbClr val="000000"/>
               </a:solidFill>
@@ -4009,7 +4034,7 @@
         <p:txBody>
           <a:bodyPr lIns="0" rIns="0" tIns="0" bIns="0"/>
           <a:p>
-            <a:endParaRPr b="0" lang="pt-BR" sz="2800" spc="-1" strike="noStrike">
+            <a:endParaRPr b="0" lang="pt-BR" sz="3200" spc="-1" strike="noStrike">
               <a:solidFill>
                 <a:srgbClr val="000000"/>
               </a:solidFill>
@@ -4113,7 +4138,8 @@
         <p:txBody>
           <a:bodyPr lIns="0" rIns="0" tIns="0" bIns="0" anchor="ctr"/>
           <a:p>
-            <a:endParaRPr b="0" lang="pt-BR" sz="1800" spc="-1" strike="noStrike">
+            <a:pPr algn="ctr"/>
+            <a:endParaRPr b="0" lang="pt-BR" sz="4400" spc="-1" strike="noStrike">
               <a:solidFill>
                 <a:srgbClr val="000000"/>
               </a:solidFill>
@@ -4149,7 +4175,7 @@
         <p:txBody>
           <a:bodyPr lIns="0" rIns="0" tIns="0" bIns="0"/>
           <a:p>
-            <a:endParaRPr b="0" lang="pt-BR" sz="2800" spc="-1" strike="noStrike">
+            <a:endParaRPr b="0" lang="pt-BR" sz="3200" spc="-1" strike="noStrike">
               <a:solidFill>
                 <a:srgbClr val="000000"/>
               </a:solidFill>
@@ -4185,7 +4211,7 @@
         <p:txBody>
           <a:bodyPr lIns="0" rIns="0" tIns="0" bIns="0"/>
           <a:p>
-            <a:endParaRPr b="0" lang="pt-BR" sz="2800" spc="-1" strike="noStrike">
+            <a:endParaRPr b="0" lang="pt-BR" sz="3200" spc="-1" strike="noStrike">
               <a:solidFill>
                 <a:srgbClr val="000000"/>
               </a:solidFill>
@@ -4243,7 +4269,8 @@
         <p:txBody>
           <a:bodyPr lIns="0" rIns="0" tIns="0" bIns="0" anchor="ctr"/>
           <a:p>
-            <a:endParaRPr b="0" lang="pt-BR" sz="1800" spc="-1" strike="noStrike">
+            <a:pPr algn="ctr"/>
+            <a:endParaRPr b="0" lang="pt-BR" sz="4400" spc="-1" strike="noStrike">
               <a:solidFill>
                 <a:srgbClr val="000000"/>
               </a:solidFill>
@@ -4360,7 +4387,8 @@
         <p:txBody>
           <a:bodyPr lIns="0" rIns="0" tIns="0" bIns="0" anchor="ctr"/>
           <a:p>
-            <a:endParaRPr b="0" lang="pt-BR" sz="1800" spc="-1" strike="noStrike">
+            <a:pPr algn="ctr"/>
+            <a:endParaRPr b="0" lang="pt-BR" sz="4400" spc="-1" strike="noStrike">
               <a:solidFill>
                 <a:srgbClr val="000000"/>
               </a:solidFill>
@@ -4396,7 +4424,7 @@
         <p:txBody>
           <a:bodyPr lIns="0" rIns="0" tIns="0" bIns="0"/>
           <a:p>
-            <a:endParaRPr b="0" lang="pt-BR" sz="2800" spc="-1" strike="noStrike">
+            <a:endParaRPr b="0" lang="pt-BR" sz="3200" spc="-1" strike="noStrike">
               <a:solidFill>
                 <a:srgbClr val="000000"/>
               </a:solidFill>
@@ -4432,7 +4460,7 @@
         <p:txBody>
           <a:bodyPr lIns="0" rIns="0" tIns="0" bIns="0"/>
           <a:p>
-            <a:endParaRPr b="0" lang="pt-BR" sz="2800" spc="-1" strike="noStrike">
+            <a:endParaRPr b="0" lang="pt-BR" sz="3200" spc="-1" strike="noStrike">
               <a:solidFill>
                 <a:srgbClr val="000000"/>
               </a:solidFill>
@@ -4468,7 +4496,7 @@
         <p:txBody>
           <a:bodyPr lIns="0" rIns="0" tIns="0" bIns="0"/>
           <a:p>
-            <a:endParaRPr b="0" lang="pt-BR" sz="2800" spc="-1" strike="noStrike">
+            <a:endParaRPr b="0" lang="pt-BR" sz="3200" spc="-1" strike="noStrike">
               <a:solidFill>
                 <a:srgbClr val="000000"/>
               </a:solidFill>
@@ -4526,7 +4554,8 @@
         <p:txBody>
           <a:bodyPr lIns="0" rIns="0" tIns="0" bIns="0" anchor="ctr"/>
           <a:p>
-            <a:endParaRPr b="0" lang="pt-BR" sz="1800" spc="-1" strike="noStrike">
+            <a:pPr algn="ctr"/>
+            <a:endParaRPr b="0" lang="pt-BR" sz="4400" spc="-1" strike="noStrike">
               <a:solidFill>
                 <a:srgbClr val="000000"/>
               </a:solidFill>
@@ -4562,7 +4591,7 @@
         <p:txBody>
           <a:bodyPr lIns="0" rIns="0" tIns="0" bIns="0"/>
           <a:p>
-            <a:endParaRPr b="0" lang="pt-BR" sz="2800" spc="-1" strike="noStrike">
+            <a:endParaRPr b="0" lang="pt-BR" sz="3200" spc="-1" strike="noStrike">
               <a:solidFill>
                 <a:srgbClr val="000000"/>
               </a:solidFill>
@@ -4598,7 +4627,7 @@
         <p:txBody>
           <a:bodyPr lIns="0" rIns="0" tIns="0" bIns="0"/>
           <a:p>
-            <a:endParaRPr b="0" lang="pt-BR" sz="2800" spc="-1" strike="noStrike">
+            <a:endParaRPr b="0" lang="pt-BR" sz="3200" spc="-1" strike="noStrike">
               <a:solidFill>
                 <a:srgbClr val="000000"/>
               </a:solidFill>
@@ -4634,7 +4663,7 @@
         <p:txBody>
           <a:bodyPr lIns="0" rIns="0" tIns="0" bIns="0"/>
           <a:p>
-            <a:endParaRPr b="0" lang="pt-BR" sz="2800" spc="-1" strike="noStrike">
+            <a:endParaRPr b="0" lang="pt-BR" sz="3200" spc="-1" strike="noStrike">
               <a:solidFill>
                 <a:srgbClr val="000000"/>
               </a:solidFill>
@@ -4692,7 +4721,8 @@
         <p:txBody>
           <a:bodyPr lIns="0" rIns="0" tIns="0" bIns="0" anchor="ctr"/>
           <a:p>
-            <a:endParaRPr b="0" lang="pt-BR" sz="1800" spc="-1" strike="noStrike">
+            <a:pPr algn="ctr"/>
+            <a:endParaRPr b="0" lang="pt-BR" sz="4400" spc="-1" strike="noStrike">
               <a:solidFill>
                 <a:srgbClr val="000000"/>
               </a:solidFill>
@@ -4728,7 +4758,7 @@
         <p:txBody>
           <a:bodyPr lIns="0" rIns="0" tIns="0" bIns="0"/>
           <a:p>
-            <a:endParaRPr b="0" lang="pt-BR" sz="2800" spc="-1" strike="noStrike">
+            <a:endParaRPr b="0" lang="pt-BR" sz="3200" spc="-1" strike="noStrike">
               <a:solidFill>
                 <a:srgbClr val="000000"/>
               </a:solidFill>
@@ -4764,7 +4794,7 @@
         <p:txBody>
           <a:bodyPr lIns="0" rIns="0" tIns="0" bIns="0"/>
           <a:p>
-            <a:endParaRPr b="0" lang="pt-BR" sz="2800" spc="-1" strike="noStrike">
+            <a:endParaRPr b="0" lang="pt-BR" sz="3200" spc="-1" strike="noStrike">
               <a:solidFill>
                 <a:srgbClr val="000000"/>
               </a:solidFill>
@@ -4800,7 +4830,7 @@
         <p:txBody>
           <a:bodyPr lIns="0" rIns="0" tIns="0" bIns="0"/>
           <a:p>
-            <a:endParaRPr b="0" lang="pt-BR" sz="2800" spc="-1" strike="noStrike">
+            <a:endParaRPr b="0" lang="pt-BR" sz="3200" spc="-1" strike="noStrike">
               <a:solidFill>
                 <a:srgbClr val="000000"/>
               </a:solidFill>
@@ -4865,8 +4895,9 @@
         <p:txBody>
           <a:bodyPr lIns="0" rIns="0" tIns="0" bIns="0" anchor="ctr"/>
           <a:p>
+            <a:pPr algn="ctr"/>
             <a:r>
-              <a:rPr b="0" lang="pt-BR" sz="1800" spc="-1" strike="noStrike">
+              <a:rPr b="0" lang="pt-BR" sz="4400" spc="-1" strike="noStrike">
                 <a:solidFill>
                   <a:srgbClr val="000000"/>
                 </a:solidFill>
@@ -4877,9 +4908,9 @@
                 </a:uFill>
                 <a:latin typeface="Arial"/>
               </a:rPr>
-              <a:t>Click to edit the title text format</a:t>
+              <a:t>Clique para editar o formato do texto do título</a:t>
             </a:r>
-            <a:endParaRPr b="0" lang="pt-BR" sz="1800" spc="-1" strike="noStrike">
+            <a:endParaRPr b="0" lang="pt-BR" sz="4400" spc="-1" strike="noStrike">
               <a:solidFill>
                 <a:srgbClr val="000000"/>
               </a:solidFill>
@@ -4924,7 +4955,7 @@
               <a:buChar char=""/>
             </a:pPr>
             <a:r>
-              <a:rPr b="0" lang="pt-BR" sz="2800" spc="-1" strike="noStrike">
+              <a:rPr b="0" lang="pt-BR" sz="3200" spc="-1" strike="noStrike">
                 <a:solidFill>
                   <a:srgbClr val="000000"/>
                 </a:solidFill>
@@ -4935,7 +4966,42 @@
                 </a:uFill>
                 <a:latin typeface="Arial"/>
               </a:rPr>
-              <a:t>Click to edit the outline text format</a:t>
+              <a:t>Clique para editar o formato do texto da estrutura de tópicos</a:t>
+            </a:r>
+            <a:endParaRPr b="0" lang="pt-BR" sz="3200" spc="-1" strike="noStrike">
+              <a:solidFill>
+                <a:srgbClr val="000000"/>
+              </a:solidFill>
+              <a:uFill>
+                <a:solidFill>
+                  <a:srgbClr val="ffffff"/>
+                </a:solidFill>
+              </a:uFill>
+              <a:latin typeface="Arial"/>
+            </a:endParaRPr>
+          </a:p>
+          <a:p>
+            <a:pPr lvl="1" marL="864000" indent="-324000">
+              <a:buClr>
+                <a:srgbClr val="000000"/>
+              </a:buClr>
+              <a:buSzPct val="75000"/>
+              <a:buFont typeface="Symbol" charset="2"/>
+              <a:buChar char=""/>
+            </a:pPr>
+            <a:r>
+              <a:rPr b="0" lang="pt-BR" sz="2800" spc="-1" strike="noStrike">
+                <a:solidFill>
+                  <a:srgbClr val="000000"/>
+                </a:solidFill>
+                <a:uFill>
+                  <a:solidFill>
+                    <a:srgbClr val="ffffff"/>
+                  </a:solidFill>
+                </a:uFill>
+                <a:latin typeface="Arial"/>
+              </a:rPr>
+              <a:t>2.º nível da estrutura de tópicos</a:t>
             </a:r>
             <a:endParaRPr b="0" lang="pt-BR" sz="2800" spc="-1" strike="noStrike">
               <a:solidFill>
@@ -4950,7 +5016,42 @@
             </a:endParaRPr>
           </a:p>
           <a:p>
-            <a:pPr lvl="1" marL="864000" indent="-324000">
+            <a:pPr lvl="2" marL="1296000" indent="-288000">
+              <a:buClr>
+                <a:srgbClr val="000000"/>
+              </a:buClr>
+              <a:buSzPct val="45000"/>
+              <a:buFont typeface="Wingdings" charset="2"/>
+              <a:buChar char=""/>
+            </a:pPr>
+            <a:r>
+              <a:rPr b="0" lang="pt-BR" sz="2400" spc="-1" strike="noStrike">
+                <a:solidFill>
+                  <a:srgbClr val="000000"/>
+                </a:solidFill>
+                <a:uFill>
+                  <a:solidFill>
+                    <a:srgbClr val="ffffff"/>
+                  </a:solidFill>
+                </a:uFill>
+                <a:latin typeface="Arial"/>
+              </a:rPr>
+              <a:t>3.º nível da estrutura de tópicos</a:t>
+            </a:r>
+            <a:endParaRPr b="0" lang="pt-BR" sz="2400" spc="-1" strike="noStrike">
+              <a:solidFill>
+                <a:srgbClr val="000000"/>
+              </a:solidFill>
+              <a:uFill>
+                <a:solidFill>
+                  <a:srgbClr val="ffffff"/>
+                </a:solidFill>
+              </a:uFill>
+              <a:latin typeface="Arial"/>
+            </a:endParaRPr>
+          </a:p>
+          <a:p>
+            <a:pPr lvl="3" marL="1728000" indent="-216000">
               <a:buClr>
                 <a:srgbClr val="000000"/>
               </a:buClr>
@@ -4970,7 +5071,7 @@
                 </a:uFill>
                 <a:latin typeface="Arial"/>
               </a:rPr>
-              <a:t>Second Outline Level</a:t>
+              <a:t>4.º nível da estrutura de tópicos</a:t>
             </a:r>
             <a:endParaRPr b="0" lang="pt-BR" sz="2000" spc="-1" strike="noStrike">
               <a:solidFill>
@@ -4985,7 +5086,7 @@
             </a:endParaRPr>
           </a:p>
           <a:p>
-            <a:pPr lvl="2" marL="1296000" indent="-288000">
+            <a:pPr lvl="4" marL="2160000" indent="-216000">
               <a:buClr>
                 <a:srgbClr val="000000"/>
               </a:buClr>
@@ -4994,7 +5095,7 @@
               <a:buChar char=""/>
             </a:pPr>
             <a:r>
-              <a:rPr b="0" lang="pt-BR" sz="1800" spc="-1" strike="noStrike">
+              <a:rPr b="0" lang="pt-BR" sz="2000" spc="-1" strike="noStrike">
                 <a:solidFill>
                   <a:srgbClr val="000000"/>
                 </a:solidFill>
@@ -5005,31 +5106,31 @@
                 </a:uFill>
                 <a:latin typeface="Arial"/>
               </a:rPr>
-              <a:t>Third Outline Level</a:t>
+              <a:t>5.º nível da estrutura de tópicos</a:t>
             </a:r>
-            <a:endParaRPr b="0" lang="pt-BR" sz="1800" spc="-1" strike="noStrike">
-              <a:solidFill>
-                <a:srgbClr val="000000"/>
-              </a:solidFill>
-              <a:uFill>
-                <a:solidFill>
-                  <a:srgbClr val="ffffff"/>
-                </a:solidFill>
-              </a:uFill>
-              <a:latin typeface="Arial"/>
-            </a:endParaRPr>
-          </a:p>
-          <a:p>
-            <a:pPr lvl="3" marL="1728000" indent="-216000">
+            <a:endParaRPr b="0" lang="pt-BR" sz="2000" spc="-1" strike="noStrike">
+              <a:solidFill>
+                <a:srgbClr val="000000"/>
+              </a:solidFill>
+              <a:uFill>
+                <a:solidFill>
+                  <a:srgbClr val="ffffff"/>
+                </a:solidFill>
+              </a:uFill>
+              <a:latin typeface="Arial"/>
+            </a:endParaRPr>
+          </a:p>
+          <a:p>
+            <a:pPr lvl="5" marL="2592000" indent="-216000">
               <a:buClr>
                 <a:srgbClr val="000000"/>
               </a:buClr>
-              <a:buSzPct val="75000"/>
-              <a:buFont typeface="Symbol" charset="2"/>
-              <a:buChar char=""/>
+              <a:buSzPct val="45000"/>
+              <a:buFont typeface="Wingdings" charset="2"/>
+              <a:buChar char=""/>
             </a:pPr>
             <a:r>
-              <a:rPr b="0" lang="pt-BR" sz="1800" spc="-1" strike="noStrike">
+              <a:rPr b="0" lang="pt-BR" sz="2000" spc="-1" strike="noStrike">
                 <a:solidFill>
                   <a:srgbClr val="000000"/>
                 </a:solidFill>
@@ -5040,22 +5141,22 @@
                 </a:uFill>
                 <a:latin typeface="Arial"/>
               </a:rPr>
-              <a:t>Fourth Outline Level</a:t>
+              <a:t>6.º nível da estrutura de tópicos</a:t>
             </a:r>
-            <a:endParaRPr b="0" lang="pt-BR" sz="1800" spc="-1" strike="noStrike">
-              <a:solidFill>
-                <a:srgbClr val="000000"/>
-              </a:solidFill>
-              <a:uFill>
-                <a:solidFill>
-                  <a:srgbClr val="ffffff"/>
-                </a:solidFill>
-              </a:uFill>
-              <a:latin typeface="Arial"/>
-            </a:endParaRPr>
-          </a:p>
-          <a:p>
-            <a:pPr lvl="4" marL="2160000" indent="-216000">
+            <a:endParaRPr b="0" lang="pt-BR" sz="2000" spc="-1" strike="noStrike">
+              <a:solidFill>
+                <a:srgbClr val="000000"/>
+              </a:solidFill>
+              <a:uFill>
+                <a:solidFill>
+                  <a:srgbClr val="ffffff"/>
+                </a:solidFill>
+              </a:uFill>
+              <a:latin typeface="Arial"/>
+            </a:endParaRPr>
+          </a:p>
+          <a:p>
+            <a:pPr lvl="6" marL="3024000" indent="-216000">
               <a:buClr>
                 <a:srgbClr val="000000"/>
               </a:buClr>
@@ -5075,77 +5176,7 @@
                 </a:uFill>
                 <a:latin typeface="Arial"/>
               </a:rPr>
-              <a:t>Fifth Outline Level</a:t>
-            </a:r>
-            <a:endParaRPr b="0" lang="pt-BR" sz="2000" spc="-1" strike="noStrike">
-              <a:solidFill>
-                <a:srgbClr val="000000"/>
-              </a:solidFill>
-              <a:uFill>
-                <a:solidFill>
-                  <a:srgbClr val="ffffff"/>
-                </a:solidFill>
-              </a:uFill>
-              <a:latin typeface="Arial"/>
-            </a:endParaRPr>
-          </a:p>
-          <a:p>
-            <a:pPr lvl="5" marL="2592000" indent="-216000">
-              <a:buClr>
-                <a:srgbClr val="000000"/>
-              </a:buClr>
-              <a:buSzPct val="45000"/>
-              <a:buFont typeface="Wingdings" charset="2"/>
-              <a:buChar char=""/>
-            </a:pPr>
-            <a:r>
-              <a:rPr b="0" lang="pt-BR" sz="2000" spc="-1" strike="noStrike">
-                <a:solidFill>
-                  <a:srgbClr val="000000"/>
-                </a:solidFill>
-                <a:uFill>
-                  <a:solidFill>
-                    <a:srgbClr val="ffffff"/>
-                  </a:solidFill>
-                </a:uFill>
-                <a:latin typeface="Arial"/>
-              </a:rPr>
-              <a:t>Sixth Outline Level</a:t>
-            </a:r>
-            <a:endParaRPr b="0" lang="pt-BR" sz="2000" spc="-1" strike="noStrike">
-              <a:solidFill>
-                <a:srgbClr val="000000"/>
-              </a:solidFill>
-              <a:uFill>
-                <a:solidFill>
-                  <a:srgbClr val="ffffff"/>
-                </a:solidFill>
-              </a:uFill>
-              <a:latin typeface="Arial"/>
-            </a:endParaRPr>
-          </a:p>
-          <a:p>
-            <a:pPr lvl="6" marL="3024000" indent="-216000">
-              <a:buClr>
-                <a:srgbClr val="000000"/>
-              </a:buClr>
-              <a:buSzPct val="45000"/>
-              <a:buFont typeface="Wingdings" charset="2"/>
-              <a:buChar char=""/>
-            </a:pPr>
-            <a:r>
-              <a:rPr b="0" lang="pt-BR" sz="2000" spc="-1" strike="noStrike">
-                <a:solidFill>
-                  <a:srgbClr val="000000"/>
-                </a:solidFill>
-                <a:uFill>
-                  <a:solidFill>
-                    <a:srgbClr val="ffffff"/>
-                  </a:solidFill>
-                </a:uFill>
-                <a:latin typeface="Arial"/>
-              </a:rPr>
-              <a:t>Seventh Outline Level</a:t>
+              <a:t>7.º nível da estrutura de tópicos</a:t>
             </a:r>
             <a:endParaRPr b="0" lang="pt-BR" sz="2000" spc="-1" strike="noStrike">
               <a:solidFill>
@@ -5227,8 +5258,9 @@
         <p:txBody>
           <a:bodyPr lIns="0" rIns="0" tIns="0" bIns="0" anchor="ctr"/>
           <a:p>
+            <a:pPr algn="ctr"/>
             <a:r>
-              <a:rPr b="0" lang="pt-BR" sz="1800" spc="-1" strike="noStrike">
+              <a:rPr b="0" lang="pt-BR" sz="4400" spc="-1" strike="noStrike">
                 <a:solidFill>
                   <a:srgbClr val="000000"/>
                 </a:solidFill>
@@ -5239,9 +5271,9 @@
                 </a:uFill>
                 <a:latin typeface="Arial"/>
               </a:rPr>
-              <a:t>Click to edit the title text format</a:t>
+              <a:t>Clique para editar o formato do texto do título</a:t>
             </a:r>
-            <a:endParaRPr b="0" lang="pt-BR" sz="1800" spc="-1" strike="noStrike">
+            <a:endParaRPr b="0" lang="pt-BR" sz="4400" spc="-1" strike="noStrike">
               <a:solidFill>
                 <a:srgbClr val="000000"/>
               </a:solidFill>
@@ -5286,7 +5318,7 @@
               <a:buChar char=""/>
             </a:pPr>
             <a:r>
-              <a:rPr b="0" lang="pt-BR" sz="2800" spc="-1" strike="noStrike">
+              <a:rPr b="0" lang="pt-BR" sz="3200" spc="-1" strike="noStrike">
                 <a:solidFill>
                   <a:srgbClr val="000000"/>
                 </a:solidFill>
@@ -5297,7 +5329,42 @@
                 </a:uFill>
                 <a:latin typeface="Arial"/>
               </a:rPr>
-              <a:t>Click to edit the outline text format</a:t>
+              <a:t>Clique para editar o formato do texto da estrutura de tópicos</a:t>
+            </a:r>
+            <a:endParaRPr b="0" lang="pt-BR" sz="3200" spc="-1" strike="noStrike">
+              <a:solidFill>
+                <a:srgbClr val="000000"/>
+              </a:solidFill>
+              <a:uFill>
+                <a:solidFill>
+                  <a:srgbClr val="ffffff"/>
+                </a:solidFill>
+              </a:uFill>
+              <a:latin typeface="Arial"/>
+            </a:endParaRPr>
+          </a:p>
+          <a:p>
+            <a:pPr lvl="1" marL="864000" indent="-324000">
+              <a:buClr>
+                <a:srgbClr val="000000"/>
+              </a:buClr>
+              <a:buSzPct val="75000"/>
+              <a:buFont typeface="Symbol" charset="2"/>
+              <a:buChar char=""/>
+            </a:pPr>
+            <a:r>
+              <a:rPr b="0" lang="pt-BR" sz="2800" spc="-1" strike="noStrike">
+                <a:solidFill>
+                  <a:srgbClr val="000000"/>
+                </a:solidFill>
+                <a:uFill>
+                  <a:solidFill>
+                    <a:srgbClr val="ffffff"/>
+                  </a:solidFill>
+                </a:uFill>
+                <a:latin typeface="Arial"/>
+              </a:rPr>
+              <a:t>2.º nível da estrutura de tópicos</a:t>
             </a:r>
             <a:endParaRPr b="0" lang="pt-BR" sz="2800" spc="-1" strike="noStrike">
               <a:solidFill>
@@ -5312,7 +5379,42 @@
             </a:endParaRPr>
           </a:p>
           <a:p>
-            <a:pPr lvl="1" marL="864000" indent="-324000">
+            <a:pPr lvl="2" marL="1296000" indent="-288000">
+              <a:buClr>
+                <a:srgbClr val="000000"/>
+              </a:buClr>
+              <a:buSzPct val="45000"/>
+              <a:buFont typeface="Wingdings" charset="2"/>
+              <a:buChar char=""/>
+            </a:pPr>
+            <a:r>
+              <a:rPr b="0" lang="pt-BR" sz="2400" spc="-1" strike="noStrike">
+                <a:solidFill>
+                  <a:srgbClr val="000000"/>
+                </a:solidFill>
+                <a:uFill>
+                  <a:solidFill>
+                    <a:srgbClr val="ffffff"/>
+                  </a:solidFill>
+                </a:uFill>
+                <a:latin typeface="Arial"/>
+              </a:rPr>
+              <a:t>3.º nível da estrutura de tópicos</a:t>
+            </a:r>
+            <a:endParaRPr b="0" lang="pt-BR" sz="2400" spc="-1" strike="noStrike">
+              <a:solidFill>
+                <a:srgbClr val="000000"/>
+              </a:solidFill>
+              <a:uFill>
+                <a:solidFill>
+                  <a:srgbClr val="ffffff"/>
+                </a:solidFill>
+              </a:uFill>
+              <a:latin typeface="Arial"/>
+            </a:endParaRPr>
+          </a:p>
+          <a:p>
+            <a:pPr lvl="3" marL="1728000" indent="-216000">
               <a:buClr>
                 <a:srgbClr val="000000"/>
               </a:buClr>
@@ -5332,7 +5434,7 @@
                 </a:uFill>
                 <a:latin typeface="Arial"/>
               </a:rPr>
-              <a:t>Second Outline Level</a:t>
+              <a:t>4.º nível da estrutura de tópicos</a:t>
             </a:r>
             <a:endParaRPr b="0" lang="pt-BR" sz="2000" spc="-1" strike="noStrike">
               <a:solidFill>
@@ -5347,7 +5449,7 @@
             </a:endParaRPr>
           </a:p>
           <a:p>
-            <a:pPr lvl="2" marL="1296000" indent="-288000">
+            <a:pPr lvl="4" marL="2160000" indent="-216000">
               <a:buClr>
                 <a:srgbClr val="000000"/>
               </a:buClr>
@@ -5356,7 +5458,7 @@
               <a:buChar char=""/>
             </a:pPr>
             <a:r>
-              <a:rPr b="0" lang="pt-BR" sz="1800" spc="-1" strike="noStrike">
+              <a:rPr b="0" lang="pt-BR" sz="2000" spc="-1" strike="noStrike">
                 <a:solidFill>
                   <a:srgbClr val="000000"/>
                 </a:solidFill>
@@ -5367,31 +5469,31 @@
                 </a:uFill>
                 <a:latin typeface="Arial"/>
               </a:rPr>
-              <a:t>Third Outline Level</a:t>
+              <a:t>5.º nível da estrutura de tópicos</a:t>
             </a:r>
-            <a:endParaRPr b="0" lang="pt-BR" sz="1800" spc="-1" strike="noStrike">
-              <a:solidFill>
-                <a:srgbClr val="000000"/>
-              </a:solidFill>
-              <a:uFill>
-                <a:solidFill>
-                  <a:srgbClr val="ffffff"/>
-                </a:solidFill>
-              </a:uFill>
-              <a:latin typeface="Arial"/>
-            </a:endParaRPr>
-          </a:p>
-          <a:p>
-            <a:pPr lvl="3" marL="1728000" indent="-216000">
+            <a:endParaRPr b="0" lang="pt-BR" sz="2000" spc="-1" strike="noStrike">
+              <a:solidFill>
+                <a:srgbClr val="000000"/>
+              </a:solidFill>
+              <a:uFill>
+                <a:solidFill>
+                  <a:srgbClr val="ffffff"/>
+                </a:solidFill>
+              </a:uFill>
+              <a:latin typeface="Arial"/>
+            </a:endParaRPr>
+          </a:p>
+          <a:p>
+            <a:pPr lvl="5" marL="2592000" indent="-216000">
               <a:buClr>
                 <a:srgbClr val="000000"/>
               </a:buClr>
-              <a:buSzPct val="75000"/>
-              <a:buFont typeface="Symbol" charset="2"/>
-              <a:buChar char=""/>
+              <a:buSzPct val="45000"/>
+              <a:buFont typeface="Wingdings" charset="2"/>
+              <a:buChar char=""/>
             </a:pPr>
             <a:r>
-              <a:rPr b="0" lang="pt-BR" sz="1800" spc="-1" strike="noStrike">
+              <a:rPr b="0" lang="pt-BR" sz="2000" spc="-1" strike="noStrike">
                 <a:solidFill>
                   <a:srgbClr val="000000"/>
                 </a:solidFill>
@@ -5402,22 +5504,22 @@
                 </a:uFill>
                 <a:latin typeface="Arial"/>
               </a:rPr>
-              <a:t>Fourth Outline Level</a:t>
+              <a:t>6.º nível da estrutura de tópicos</a:t>
             </a:r>
-            <a:endParaRPr b="0" lang="pt-BR" sz="1800" spc="-1" strike="noStrike">
-              <a:solidFill>
-                <a:srgbClr val="000000"/>
-              </a:solidFill>
-              <a:uFill>
-                <a:solidFill>
-                  <a:srgbClr val="ffffff"/>
-                </a:solidFill>
-              </a:uFill>
-              <a:latin typeface="Arial"/>
-            </a:endParaRPr>
-          </a:p>
-          <a:p>
-            <a:pPr lvl="4" marL="2160000" indent="-216000">
+            <a:endParaRPr b="0" lang="pt-BR" sz="2000" spc="-1" strike="noStrike">
+              <a:solidFill>
+                <a:srgbClr val="000000"/>
+              </a:solidFill>
+              <a:uFill>
+                <a:solidFill>
+                  <a:srgbClr val="ffffff"/>
+                </a:solidFill>
+              </a:uFill>
+              <a:latin typeface="Arial"/>
+            </a:endParaRPr>
+          </a:p>
+          <a:p>
+            <a:pPr lvl="6" marL="3024000" indent="-216000">
               <a:buClr>
                 <a:srgbClr val="000000"/>
               </a:buClr>
@@ -5437,77 +5539,7 @@
                 </a:uFill>
                 <a:latin typeface="Arial"/>
               </a:rPr>
-              <a:t>Fifth Outline Level</a:t>
-            </a:r>
-            <a:endParaRPr b="0" lang="pt-BR" sz="2000" spc="-1" strike="noStrike">
-              <a:solidFill>
-                <a:srgbClr val="000000"/>
-              </a:solidFill>
-              <a:uFill>
-                <a:solidFill>
-                  <a:srgbClr val="ffffff"/>
-                </a:solidFill>
-              </a:uFill>
-              <a:latin typeface="Arial"/>
-            </a:endParaRPr>
-          </a:p>
-          <a:p>
-            <a:pPr lvl="5" marL="2592000" indent="-216000">
-              <a:buClr>
-                <a:srgbClr val="000000"/>
-              </a:buClr>
-              <a:buSzPct val="45000"/>
-              <a:buFont typeface="Wingdings" charset="2"/>
-              <a:buChar char=""/>
-            </a:pPr>
-            <a:r>
-              <a:rPr b="0" lang="pt-BR" sz="2000" spc="-1" strike="noStrike">
-                <a:solidFill>
-                  <a:srgbClr val="000000"/>
-                </a:solidFill>
-                <a:uFill>
-                  <a:solidFill>
-                    <a:srgbClr val="ffffff"/>
-                  </a:solidFill>
-                </a:uFill>
-                <a:latin typeface="Arial"/>
-              </a:rPr>
-              <a:t>Sixth Outline Level</a:t>
-            </a:r>
-            <a:endParaRPr b="0" lang="pt-BR" sz="2000" spc="-1" strike="noStrike">
-              <a:solidFill>
-                <a:srgbClr val="000000"/>
-              </a:solidFill>
-              <a:uFill>
-                <a:solidFill>
-                  <a:srgbClr val="ffffff"/>
-                </a:solidFill>
-              </a:uFill>
-              <a:latin typeface="Arial"/>
-            </a:endParaRPr>
-          </a:p>
-          <a:p>
-            <a:pPr lvl="6" marL="3024000" indent="-216000">
-              <a:buClr>
-                <a:srgbClr val="000000"/>
-              </a:buClr>
-              <a:buSzPct val="45000"/>
-              <a:buFont typeface="Wingdings" charset="2"/>
-              <a:buChar char=""/>
-            </a:pPr>
-            <a:r>
-              <a:rPr b="0" lang="pt-BR" sz="2000" spc="-1" strike="noStrike">
-                <a:solidFill>
-                  <a:srgbClr val="000000"/>
-                </a:solidFill>
-                <a:uFill>
-                  <a:solidFill>
-                    <a:srgbClr val="ffffff"/>
-                  </a:solidFill>
-                </a:uFill>
-                <a:latin typeface="Arial"/>
-              </a:rPr>
-              <a:t>Seventh Outline Level</a:t>
+              <a:t>7.º nível da estrutura de tópicos</a:t>
             </a:r>
             <a:endParaRPr b="0" lang="pt-BR" sz="2000" spc="-1" strike="noStrike">
               <a:solidFill>
@@ -5589,8 +5621,9 @@
         <p:txBody>
           <a:bodyPr lIns="0" rIns="0" tIns="0" bIns="0" anchor="ctr"/>
           <a:p>
+            <a:pPr algn="ctr"/>
             <a:r>
-              <a:rPr b="0" lang="pt-BR" sz="1800" spc="-1" strike="noStrike">
+              <a:rPr b="0" lang="pt-BR" sz="4400" spc="-1" strike="noStrike">
                 <a:solidFill>
                   <a:srgbClr val="000000"/>
                 </a:solidFill>
@@ -5601,9 +5634,9 @@
                 </a:uFill>
                 <a:latin typeface="Arial"/>
               </a:rPr>
-              <a:t>Click to edit the title text format</a:t>
+              <a:t>Clique para editar o formato do texto do título</a:t>
             </a:r>
-            <a:endParaRPr b="0" lang="pt-BR" sz="1800" spc="-1" strike="noStrike">
+            <a:endParaRPr b="0" lang="pt-BR" sz="4400" spc="-1" strike="noStrike">
               <a:solidFill>
                 <a:srgbClr val="000000"/>
               </a:solidFill>
@@ -5648,7 +5681,7 @@
               <a:buChar char=""/>
             </a:pPr>
             <a:r>
-              <a:rPr b="0" lang="pt-BR" sz="2800" spc="-1" strike="noStrike">
+              <a:rPr b="0" lang="pt-BR" sz="3200" spc="-1" strike="noStrike">
                 <a:solidFill>
                   <a:srgbClr val="000000"/>
                 </a:solidFill>
@@ -5659,7 +5692,42 @@
                 </a:uFill>
                 <a:latin typeface="Arial"/>
               </a:rPr>
-              <a:t>Click to edit the outline text format</a:t>
+              <a:t>Clique para editar o formato do texto da estrutura de tópicos</a:t>
+            </a:r>
+            <a:endParaRPr b="0" lang="pt-BR" sz="3200" spc="-1" strike="noStrike">
+              <a:solidFill>
+                <a:srgbClr val="000000"/>
+              </a:solidFill>
+              <a:uFill>
+                <a:solidFill>
+                  <a:srgbClr val="ffffff"/>
+                </a:solidFill>
+              </a:uFill>
+              <a:latin typeface="Arial"/>
+            </a:endParaRPr>
+          </a:p>
+          <a:p>
+            <a:pPr lvl="1" marL="864000" indent="-324000">
+              <a:buClr>
+                <a:srgbClr val="000000"/>
+              </a:buClr>
+              <a:buSzPct val="75000"/>
+              <a:buFont typeface="Symbol" charset="2"/>
+              <a:buChar char=""/>
+            </a:pPr>
+            <a:r>
+              <a:rPr b="0" lang="pt-BR" sz="2800" spc="-1" strike="noStrike">
+                <a:solidFill>
+                  <a:srgbClr val="000000"/>
+                </a:solidFill>
+                <a:uFill>
+                  <a:solidFill>
+                    <a:srgbClr val="ffffff"/>
+                  </a:solidFill>
+                </a:uFill>
+                <a:latin typeface="Arial"/>
+              </a:rPr>
+              <a:t>2.º nível da estrutura de tópicos</a:t>
             </a:r>
             <a:endParaRPr b="0" lang="pt-BR" sz="2800" spc="-1" strike="noStrike">
               <a:solidFill>
@@ -5674,7 +5742,42 @@
             </a:endParaRPr>
           </a:p>
           <a:p>
-            <a:pPr lvl="1" marL="864000" indent="-324000">
+            <a:pPr lvl="2" marL="1296000" indent="-288000">
+              <a:buClr>
+                <a:srgbClr val="000000"/>
+              </a:buClr>
+              <a:buSzPct val="45000"/>
+              <a:buFont typeface="Wingdings" charset="2"/>
+              <a:buChar char=""/>
+            </a:pPr>
+            <a:r>
+              <a:rPr b="0" lang="pt-BR" sz="2400" spc="-1" strike="noStrike">
+                <a:solidFill>
+                  <a:srgbClr val="000000"/>
+                </a:solidFill>
+                <a:uFill>
+                  <a:solidFill>
+                    <a:srgbClr val="ffffff"/>
+                  </a:solidFill>
+                </a:uFill>
+                <a:latin typeface="Arial"/>
+              </a:rPr>
+              <a:t>3.º nível da estrutura de tópicos</a:t>
+            </a:r>
+            <a:endParaRPr b="0" lang="pt-BR" sz="2400" spc="-1" strike="noStrike">
+              <a:solidFill>
+                <a:srgbClr val="000000"/>
+              </a:solidFill>
+              <a:uFill>
+                <a:solidFill>
+                  <a:srgbClr val="ffffff"/>
+                </a:solidFill>
+              </a:uFill>
+              <a:latin typeface="Arial"/>
+            </a:endParaRPr>
+          </a:p>
+          <a:p>
+            <a:pPr lvl="3" marL="1728000" indent="-216000">
               <a:buClr>
                 <a:srgbClr val="000000"/>
               </a:buClr>
@@ -5694,7 +5797,7 @@
                 </a:uFill>
                 <a:latin typeface="Arial"/>
               </a:rPr>
-              <a:t>Second Outline Level</a:t>
+              <a:t>4.º nível da estrutura de tópicos</a:t>
             </a:r>
             <a:endParaRPr b="0" lang="pt-BR" sz="2000" spc="-1" strike="noStrike">
               <a:solidFill>
@@ -5709,7 +5812,7 @@
             </a:endParaRPr>
           </a:p>
           <a:p>
-            <a:pPr lvl="2" marL="1296000" indent="-288000">
+            <a:pPr lvl="4" marL="2160000" indent="-216000">
               <a:buClr>
                 <a:srgbClr val="000000"/>
               </a:buClr>
@@ -5718,7 +5821,7 @@
               <a:buChar char=""/>
             </a:pPr>
             <a:r>
-              <a:rPr b="0" lang="pt-BR" sz="1800" spc="-1" strike="noStrike">
+              <a:rPr b="0" lang="pt-BR" sz="2000" spc="-1" strike="noStrike">
                 <a:solidFill>
                   <a:srgbClr val="000000"/>
                 </a:solidFill>
@@ -5729,31 +5832,31 @@
                 </a:uFill>
                 <a:latin typeface="Arial"/>
               </a:rPr>
-              <a:t>Third Outline Level</a:t>
+              <a:t>5.º nível da estrutura de tópicos</a:t>
             </a:r>
-            <a:endParaRPr b="0" lang="pt-BR" sz="1800" spc="-1" strike="noStrike">
-              <a:solidFill>
-                <a:srgbClr val="000000"/>
-              </a:solidFill>
-              <a:uFill>
-                <a:solidFill>
-                  <a:srgbClr val="ffffff"/>
-                </a:solidFill>
-              </a:uFill>
-              <a:latin typeface="Arial"/>
-            </a:endParaRPr>
-          </a:p>
-          <a:p>
-            <a:pPr lvl="3" marL="1728000" indent="-216000">
+            <a:endParaRPr b="0" lang="pt-BR" sz="2000" spc="-1" strike="noStrike">
+              <a:solidFill>
+                <a:srgbClr val="000000"/>
+              </a:solidFill>
+              <a:uFill>
+                <a:solidFill>
+                  <a:srgbClr val="ffffff"/>
+                </a:solidFill>
+              </a:uFill>
+              <a:latin typeface="Arial"/>
+            </a:endParaRPr>
+          </a:p>
+          <a:p>
+            <a:pPr lvl="5" marL="2592000" indent="-216000">
               <a:buClr>
                 <a:srgbClr val="000000"/>
               </a:buClr>
-              <a:buSzPct val="75000"/>
-              <a:buFont typeface="Symbol" charset="2"/>
-              <a:buChar char=""/>
+              <a:buSzPct val="45000"/>
+              <a:buFont typeface="Wingdings" charset="2"/>
+              <a:buChar char=""/>
             </a:pPr>
             <a:r>
-              <a:rPr b="0" lang="pt-BR" sz="1800" spc="-1" strike="noStrike">
+              <a:rPr b="0" lang="pt-BR" sz="2000" spc="-1" strike="noStrike">
                 <a:solidFill>
                   <a:srgbClr val="000000"/>
                 </a:solidFill>
@@ -5764,22 +5867,22 @@
                 </a:uFill>
                 <a:latin typeface="Arial"/>
               </a:rPr>
-              <a:t>Fourth Outline Level</a:t>
+              <a:t>6.º nível da estrutura de tópicos</a:t>
             </a:r>
-            <a:endParaRPr b="0" lang="pt-BR" sz="1800" spc="-1" strike="noStrike">
-              <a:solidFill>
-                <a:srgbClr val="000000"/>
-              </a:solidFill>
-              <a:uFill>
-                <a:solidFill>
-                  <a:srgbClr val="ffffff"/>
-                </a:solidFill>
-              </a:uFill>
-              <a:latin typeface="Arial"/>
-            </a:endParaRPr>
-          </a:p>
-          <a:p>
-            <a:pPr lvl="4" marL="2160000" indent="-216000">
+            <a:endParaRPr b="0" lang="pt-BR" sz="2000" spc="-1" strike="noStrike">
+              <a:solidFill>
+                <a:srgbClr val="000000"/>
+              </a:solidFill>
+              <a:uFill>
+                <a:solidFill>
+                  <a:srgbClr val="ffffff"/>
+                </a:solidFill>
+              </a:uFill>
+              <a:latin typeface="Arial"/>
+            </a:endParaRPr>
+          </a:p>
+          <a:p>
+            <a:pPr lvl="6" marL="3024000" indent="-216000">
               <a:buClr>
                 <a:srgbClr val="000000"/>
               </a:buClr>
@@ -5799,77 +5902,7 @@
                 </a:uFill>
                 <a:latin typeface="Arial"/>
               </a:rPr>
-              <a:t>Fifth Outline Level</a:t>
-            </a:r>
-            <a:endParaRPr b="0" lang="pt-BR" sz="2000" spc="-1" strike="noStrike">
-              <a:solidFill>
-                <a:srgbClr val="000000"/>
-              </a:solidFill>
-              <a:uFill>
-                <a:solidFill>
-                  <a:srgbClr val="ffffff"/>
-                </a:solidFill>
-              </a:uFill>
-              <a:latin typeface="Arial"/>
-            </a:endParaRPr>
-          </a:p>
-          <a:p>
-            <a:pPr lvl="5" marL="2592000" indent="-216000">
-              <a:buClr>
-                <a:srgbClr val="000000"/>
-              </a:buClr>
-              <a:buSzPct val="45000"/>
-              <a:buFont typeface="Wingdings" charset="2"/>
-              <a:buChar char=""/>
-            </a:pPr>
-            <a:r>
-              <a:rPr b="0" lang="pt-BR" sz="2000" spc="-1" strike="noStrike">
-                <a:solidFill>
-                  <a:srgbClr val="000000"/>
-                </a:solidFill>
-                <a:uFill>
-                  <a:solidFill>
-                    <a:srgbClr val="ffffff"/>
-                  </a:solidFill>
-                </a:uFill>
-                <a:latin typeface="Arial"/>
-              </a:rPr>
-              <a:t>Sixth Outline Level</a:t>
-            </a:r>
-            <a:endParaRPr b="0" lang="pt-BR" sz="2000" spc="-1" strike="noStrike">
-              <a:solidFill>
-                <a:srgbClr val="000000"/>
-              </a:solidFill>
-              <a:uFill>
-                <a:solidFill>
-                  <a:srgbClr val="ffffff"/>
-                </a:solidFill>
-              </a:uFill>
-              <a:latin typeface="Arial"/>
-            </a:endParaRPr>
-          </a:p>
-          <a:p>
-            <a:pPr lvl="6" marL="3024000" indent="-216000">
-              <a:buClr>
-                <a:srgbClr val="000000"/>
-              </a:buClr>
-              <a:buSzPct val="45000"/>
-              <a:buFont typeface="Wingdings" charset="2"/>
-              <a:buChar char=""/>
-            </a:pPr>
-            <a:r>
-              <a:rPr b="0" lang="pt-BR" sz="2000" spc="-1" strike="noStrike">
-                <a:solidFill>
-                  <a:srgbClr val="000000"/>
-                </a:solidFill>
-                <a:uFill>
-                  <a:solidFill>
-                    <a:srgbClr val="ffffff"/>
-                  </a:solidFill>
-                </a:uFill>
-                <a:latin typeface="Arial"/>
-              </a:rPr>
-              <a:t>Seventh Outline Level</a:t>
+              <a:t>7.º nível da estrutura de tópicos</a:t>
             </a:r>
             <a:endParaRPr b="0" lang="pt-BR" sz="2000" spc="-1" strike="noStrike">
               <a:solidFill>
@@ -5931,7 +5964,7 @@
         <p:spPr>
           <a:xfrm>
             <a:off x="648000" y="2736000"/>
-            <a:ext cx="7768440" cy="1465920"/>
+            <a:ext cx="7768080" cy="1465560"/>
           </a:xfrm>
           <a:prstGeom prst="rect">
             <a:avLst/>
@@ -6030,7 +6063,7 @@
         <p:spPr>
           <a:xfrm>
             <a:off x="3573720" y="942840"/>
-            <a:ext cx="1870200" cy="1647360"/>
+            <a:ext cx="1869840" cy="1647000"/>
           </a:xfrm>
           <a:prstGeom prst="rect">
             <a:avLst/>
@@ -6098,7 +6131,7 @@
         <p:spPr>
           <a:xfrm>
             <a:off x="457200" y="274680"/>
-            <a:ext cx="8225640" cy="1139040"/>
+            <a:ext cx="8225280" cy="1138680"/>
           </a:xfrm>
           <a:prstGeom prst="rect">
             <a:avLst/>
@@ -6970,7 +7003,7 @@
         <p:spPr>
           <a:xfrm>
             <a:off x="457200" y="274680"/>
-            <a:ext cx="8225640" cy="1139040"/>
+            <a:ext cx="8225280" cy="1138680"/>
           </a:xfrm>
           <a:prstGeom prst="rect">
             <a:avLst/>
@@ -8017,7 +8050,7 @@
                           <a:latin typeface="Arial"/>
                           <a:ea typeface="DejaVu Sans"/>
                         </a:rPr>
-                        <a:t>25/05/2017</a:t>
+                        <a:t>11/05/2017</a:t>
                       </a:r>
                       <a:endParaRPr b="0" lang="pt-BR" sz="1800" spc="-1" strike="noStrike">
                         <a:solidFill>
@@ -9409,7 +9442,7 @@
         <p:spPr>
           <a:xfrm>
             <a:off x="457200" y="274680"/>
-            <a:ext cx="8225640" cy="1139040"/>
+            <a:ext cx="8225280" cy="1138680"/>
           </a:xfrm>
           <a:prstGeom prst="rect">
             <a:avLst/>
@@ -9470,7 +9503,7 @@
         </p:nvGraphicFramePr>
         <p:xfrm>
           <a:off x="755640" y="1253880"/>
-          <a:ext cx="7848000" cy="1668960"/>
+          <a:ext cx="7847640" cy="1668960"/>
         </p:xfrm>
         <a:graphic>
           <a:graphicData uri="http://schemas.openxmlformats.org/drawingml/2006/table">
@@ -10324,7 +10357,7 @@
         <p:spPr>
           <a:xfrm>
             <a:off x="457200" y="274680"/>
-            <a:ext cx="8225640" cy="1139040"/>
+            <a:ext cx="8225280" cy="1138680"/>
           </a:xfrm>
           <a:prstGeom prst="rect">
             <a:avLst/>
@@ -10386,7 +10419,7 @@
         <p:spPr>
           <a:xfrm>
             <a:off x="457200" y="1600200"/>
-            <a:ext cx="8225640" cy="4521960"/>
+            <a:ext cx="8225280" cy="4521600"/>
           </a:xfrm>
           <a:prstGeom prst="rect">
             <a:avLst/>
@@ -10423,7 +10456,7 @@
             </a:endParaRPr>
           </a:p>
           <a:p>
-            <a:pPr marL="343080" indent="-339120" algn="just">
+            <a:pPr marL="343080" indent="-338760" algn="just">
               <a:lnSpc>
                 <a:spcPct val="100000"/>
               </a:lnSpc>
@@ -10479,7 +10512,7 @@
             </a:endParaRPr>
           </a:p>
           <a:p>
-            <a:pPr marL="343080" indent="-339120" algn="just">
+            <a:pPr marL="343080" indent="-338760" algn="just">
               <a:lnSpc>
                 <a:spcPct val="100000"/>
               </a:lnSpc>
@@ -10612,7 +10645,7 @@
         <p:spPr>
           <a:xfrm>
             <a:off x="457200" y="274680"/>
-            <a:ext cx="8225640" cy="1139040"/>
+            <a:ext cx="8225280" cy="1138680"/>
           </a:xfrm>
           <a:prstGeom prst="rect">
             <a:avLst/>
@@ -10674,7 +10707,7 @@
         <p:spPr>
           <a:xfrm>
             <a:off x="457200" y="1600200"/>
-            <a:ext cx="8225640" cy="4521960"/>
+            <a:ext cx="8225280" cy="4521600"/>
           </a:xfrm>
           <a:prstGeom prst="rect">
             <a:avLst/>
@@ -10693,7 +10726,7 @@
         <p:txBody>
           <a:bodyPr lIns="90000" rIns="90000" tIns="45000" bIns="45000"/>
           <a:p>
-            <a:pPr marL="343080" indent="-339120" algn="just">
+            <a:pPr marL="343080" indent="-338760" algn="just">
               <a:lnSpc>
                 <a:spcPct val="100000"/>
               </a:lnSpc>
@@ -10731,7 +10764,7 @@
             </a:endParaRPr>
           </a:p>
           <a:p>
-            <a:pPr marL="343080" indent="-339120">
+            <a:pPr marL="343080" indent="-338760">
               <a:lnSpc>
                 <a:spcPct val="100000"/>
               </a:lnSpc>
@@ -10891,7 +10924,7 @@
         <p:spPr>
           <a:xfrm>
             <a:off x="457200" y="274680"/>
-            <a:ext cx="8225640" cy="1139040"/>
+            <a:ext cx="8225280" cy="1138680"/>
           </a:xfrm>
           <a:prstGeom prst="rect">
             <a:avLst/>
@@ -12048,7 +12081,7 @@
         <p:spPr>
           <a:xfrm>
             <a:off x="457200" y="274680"/>
-            <a:ext cx="8225640" cy="1139040"/>
+            <a:ext cx="8225280" cy="1138680"/>
           </a:xfrm>
           <a:prstGeom prst="rect">
             <a:avLst/>
@@ -13077,7 +13110,7 @@
         <p:spPr>
           <a:xfrm>
             <a:off x="457200" y="274680"/>
-            <a:ext cx="8225640" cy="1139040"/>
+            <a:ext cx="8225280" cy="1138680"/>
           </a:xfrm>
           <a:prstGeom prst="rect">
             <a:avLst/>
@@ -13139,7 +13172,7 @@
         <p:spPr>
           <a:xfrm>
             <a:off x="457200" y="1600200"/>
-            <a:ext cx="8225640" cy="4521960"/>
+            <a:ext cx="8225280" cy="4521600"/>
           </a:xfrm>
           <a:prstGeom prst="rect">
             <a:avLst/>
@@ -13158,7 +13191,7 @@
         <p:txBody>
           <a:bodyPr lIns="90000" rIns="90000" tIns="45000" bIns="45000"/>
           <a:p>
-            <a:pPr marL="343080" indent="-339120">
+            <a:pPr marL="343080" indent="-338760">
               <a:lnSpc>
                 <a:spcPct val="100000"/>
               </a:lnSpc>
@@ -13196,7 +13229,7 @@
             </a:endParaRPr>
           </a:p>
           <a:p>
-            <a:pPr marL="343080" indent="-339120">
+            <a:pPr marL="343080" indent="-338760">
               <a:lnSpc>
                 <a:spcPct val="100000"/>
               </a:lnSpc>
@@ -13234,7 +13267,7 @@
             </a:endParaRPr>
           </a:p>
           <a:p>
-            <a:pPr marL="343080" indent="-339120">
+            <a:pPr marL="343080" indent="-338760">
               <a:lnSpc>
                 <a:spcPct val="100000"/>
               </a:lnSpc>
@@ -13272,7 +13305,7 @@
             </a:endParaRPr>
           </a:p>
           <a:p>
-            <a:pPr marL="343080" indent="-339120">
+            <a:pPr marL="343080" indent="-338760">
               <a:lnSpc>
                 <a:spcPct val="100000"/>
               </a:lnSpc>
@@ -13310,7 +13343,7 @@
             </a:endParaRPr>
           </a:p>
           <a:p>
-            <a:pPr marL="343080" indent="-339120">
+            <a:pPr marL="343080" indent="-338760">
               <a:lnSpc>
                 <a:spcPct val="100000"/>
               </a:lnSpc>
@@ -13348,7 +13381,7 @@
             </a:endParaRPr>
           </a:p>
           <a:p>
-            <a:pPr marL="343080" indent="-339120">
+            <a:pPr marL="343080" indent="-338760">
               <a:lnSpc>
                 <a:spcPct val="100000"/>
               </a:lnSpc>
@@ -13386,7 +13419,7 @@
             </a:endParaRPr>
           </a:p>
           <a:p>
-            <a:pPr marL="343080" indent="-339120">
+            <a:pPr marL="343080" indent="-338760">
               <a:lnSpc>
                 <a:spcPct val="100000"/>
               </a:lnSpc>
@@ -13501,7 +13534,7 @@
         <p:spPr>
           <a:xfrm>
             <a:off x="457200" y="274680"/>
-            <a:ext cx="8224200" cy="1137600"/>
+            <a:ext cx="8223840" cy="1137240"/>
           </a:xfrm>
           <a:prstGeom prst="rect">
             <a:avLst/>
@@ -13563,7 +13596,7 @@
         <p:spPr>
           <a:xfrm>
             <a:off x="457200" y="1600200"/>
-            <a:ext cx="8224200" cy="4520520"/>
+            <a:ext cx="8223840" cy="4520160"/>
           </a:xfrm>
           <a:prstGeom prst="rect">
             <a:avLst/>
@@ -13582,7 +13615,7 @@
         <p:txBody>
           <a:bodyPr lIns="90000" rIns="90000" tIns="45000" bIns="45000"/>
           <a:p>
-            <a:pPr marL="343080" indent="-337680" algn="just">
+            <a:pPr marL="343080" indent="-337320" algn="just">
               <a:lnSpc>
                 <a:spcPct val="100000"/>
               </a:lnSpc>
@@ -13620,7 +13653,7 @@
             </a:endParaRPr>
           </a:p>
           <a:p>
-            <a:pPr lvl="1" marL="864000" indent="-318960" algn="just">
+            <a:pPr lvl="1" marL="864000" indent="-318600" algn="just">
               <a:lnSpc>
                 <a:spcPct val="100000"/>
               </a:lnSpc>
@@ -13718,7 +13751,7 @@
         <p:spPr>
           <a:xfrm>
             <a:off x="457200" y="274680"/>
-            <a:ext cx="8224200" cy="1137600"/>
+            <a:ext cx="8223840" cy="1137240"/>
           </a:xfrm>
           <a:prstGeom prst="rect">
             <a:avLst/>
@@ -13780,7 +13813,7 @@
         <p:spPr>
           <a:xfrm>
             <a:off x="457200" y="1600200"/>
-            <a:ext cx="8224200" cy="4520520"/>
+            <a:ext cx="8223840" cy="4520160"/>
           </a:xfrm>
           <a:prstGeom prst="rect">
             <a:avLst/>
@@ -13799,7 +13832,7 @@
         <p:txBody>
           <a:bodyPr lIns="90000" rIns="90000" tIns="45000" bIns="45000"/>
           <a:p>
-            <a:pPr marL="343080" indent="-337680" algn="just">
+            <a:pPr marL="343080" indent="-337320" algn="just">
               <a:lnSpc>
                 <a:spcPct val="100000"/>
               </a:lnSpc>
@@ -13837,7 +13870,7 @@
             </a:endParaRPr>
           </a:p>
           <a:p>
-            <a:pPr lvl="1" marL="864000" indent="-318960" algn="just">
+            <a:pPr lvl="1" marL="864000" indent="-318600" algn="just">
               <a:lnSpc>
                 <a:spcPct val="100000"/>
               </a:lnSpc>
@@ -13935,7 +13968,7 @@
         <p:spPr>
           <a:xfrm>
             <a:off x="457200" y="274680"/>
-            <a:ext cx="8224200" cy="1137600"/>
+            <a:ext cx="8223840" cy="1137240"/>
           </a:xfrm>
           <a:prstGeom prst="rect">
             <a:avLst/>
@@ -13997,7 +14030,7 @@
         <p:spPr>
           <a:xfrm>
             <a:off x="457200" y="1600200"/>
-            <a:ext cx="8224200" cy="4520520"/>
+            <a:ext cx="8223840" cy="4520160"/>
           </a:xfrm>
           <a:prstGeom prst="rect">
             <a:avLst/>
@@ -14016,7 +14049,7 @@
         <p:txBody>
           <a:bodyPr lIns="90000" rIns="90000" tIns="45000" bIns="45000"/>
           <a:p>
-            <a:pPr marL="343080" indent="-337680" algn="just">
+            <a:pPr marL="343080" indent="-337320" algn="just">
               <a:lnSpc>
                 <a:spcPct val="100000"/>
               </a:lnSpc>
@@ -14054,7 +14087,7 @@
             </a:endParaRPr>
           </a:p>
           <a:p>
-            <a:pPr lvl="1" marL="864000" indent="-318960" algn="just">
+            <a:pPr lvl="1" marL="864000" indent="-318600" algn="just">
               <a:lnSpc>
                 <a:spcPct val="100000"/>
               </a:lnSpc>
@@ -14152,7 +14185,7 @@
         <p:spPr>
           <a:xfrm>
             <a:off x="457200" y="274680"/>
-            <a:ext cx="8224200" cy="1137600"/>
+            <a:ext cx="8223840" cy="1137240"/>
           </a:xfrm>
           <a:prstGeom prst="rect">
             <a:avLst/>
@@ -14214,7 +14247,7 @@
         <p:spPr>
           <a:xfrm>
             <a:off x="457200" y="1600200"/>
-            <a:ext cx="8224200" cy="4520520"/>
+            <a:ext cx="8223840" cy="4520160"/>
           </a:xfrm>
           <a:prstGeom prst="rect">
             <a:avLst/>
@@ -14233,7 +14266,7 @@
         <p:txBody>
           <a:bodyPr lIns="90000" rIns="90000" tIns="45000" bIns="45000"/>
           <a:p>
-            <a:pPr marL="343080" indent="-337680" algn="just">
+            <a:pPr marL="343080" indent="-337320" algn="just">
               <a:lnSpc>
                 <a:spcPct val="100000"/>
               </a:lnSpc>
@@ -14271,7 +14304,7 @@
             </a:endParaRPr>
           </a:p>
           <a:p>
-            <a:pPr lvl="1" marL="864000" indent="-318960" algn="just">
+            <a:pPr lvl="1" marL="864000" indent="-318600" algn="just">
               <a:lnSpc>
                 <a:spcPct val="100000"/>
               </a:lnSpc>
@@ -14369,7 +14402,7 @@
         <p:spPr>
           <a:xfrm>
             <a:off x="457200" y="274680"/>
-            <a:ext cx="8224200" cy="1137600"/>
+            <a:ext cx="8223840" cy="1137240"/>
           </a:xfrm>
           <a:prstGeom prst="rect">
             <a:avLst/>
@@ -14431,7 +14464,7 @@
         <p:spPr>
           <a:xfrm>
             <a:off x="457200" y="1600200"/>
-            <a:ext cx="8224200" cy="4520520"/>
+            <a:ext cx="8223840" cy="4520160"/>
           </a:xfrm>
           <a:prstGeom prst="rect">
             <a:avLst/>
@@ -14450,7 +14483,7 @@
         <p:txBody>
           <a:bodyPr lIns="90000" rIns="90000" tIns="45000" bIns="45000"/>
           <a:p>
-            <a:pPr marL="343080" indent="-337680" algn="just">
+            <a:pPr marL="343080" indent="-337320" algn="just">
               <a:lnSpc>
                 <a:spcPct val="100000"/>
               </a:lnSpc>
@@ -14488,7 +14521,7 @@
             </a:endParaRPr>
           </a:p>
           <a:p>
-            <a:pPr lvl="1" marL="864000" indent="-318960" algn="just">
+            <a:pPr lvl="1" marL="864000" indent="-318600" algn="just">
               <a:lnSpc>
                 <a:spcPct val="100000"/>
               </a:lnSpc>
@@ -14527,7 +14560,7 @@
             </a:endParaRPr>
           </a:p>
           <a:p>
-            <a:pPr lvl="1" marL="864000" indent="-318960" algn="just">
+            <a:pPr lvl="1" marL="864000" indent="-318600" algn="just">
               <a:lnSpc>
                 <a:spcPct val="100000"/>
               </a:lnSpc>
@@ -14625,7 +14658,7 @@
         <p:spPr>
           <a:xfrm>
             <a:off x="457200" y="274680"/>
-            <a:ext cx="8224200" cy="1137600"/>
+            <a:ext cx="8223840" cy="1137240"/>
           </a:xfrm>
           <a:prstGeom prst="rect">
             <a:avLst/>
@@ -14687,7 +14720,7 @@
         <p:spPr>
           <a:xfrm>
             <a:off x="457200" y="1600200"/>
-            <a:ext cx="8224200" cy="4520520"/>
+            <a:ext cx="8223840" cy="4520160"/>
           </a:xfrm>
           <a:prstGeom prst="rect">
             <a:avLst/>
@@ -14706,7 +14739,7 @@
         <p:txBody>
           <a:bodyPr lIns="90000" rIns="90000" tIns="45000" bIns="45000"/>
           <a:p>
-            <a:pPr marL="343080" indent="-337680" algn="just">
+            <a:pPr marL="343080" indent="-337320" algn="just">
               <a:lnSpc>
                 <a:spcPct val="100000"/>
               </a:lnSpc>
@@ -14744,7 +14777,7 @@
             </a:endParaRPr>
           </a:p>
           <a:p>
-            <a:pPr lvl="1" marL="864000" indent="-318960" algn="just">
+            <a:pPr lvl="1" marL="864000" indent="-318600" algn="just">
               <a:lnSpc>
                 <a:spcPct val="100000"/>
               </a:lnSpc>
@@ -14783,7 +14816,7 @@
             </a:endParaRPr>
           </a:p>
           <a:p>
-            <a:pPr lvl="1" marL="864000" indent="-318960" algn="just">
+            <a:pPr lvl="1" marL="864000" indent="-318600" algn="just">
               <a:lnSpc>
                 <a:spcPct val="100000"/>
               </a:lnSpc>
@@ -14881,7 +14914,7 @@
         <p:spPr>
           <a:xfrm>
             <a:off x="457200" y="274680"/>
-            <a:ext cx="8225640" cy="1139040"/>
+            <a:ext cx="8225280" cy="1138680"/>
           </a:xfrm>
           <a:prstGeom prst="rect">
             <a:avLst/>

</xml_diff>